<commit_message>
Feat(chp8): Redaction Exo chapitre 8
</commit_message>
<xml_diff>
--- a/source/Chapitre 8 - Les chaines de caractères.pptx
+++ b/source/Chapitre 8 - Les chaines de caractères.pptx
@@ -5,7 +5,7 @@
     <p:sldMasterId id="2147483804" r:id="rId1"/>
   </p:sldMasterIdLst>
   <p:notesMasterIdLst>
-    <p:notesMasterId r:id="rId24"/>
+    <p:notesMasterId r:id="rId29"/>
   </p:notesMasterIdLst>
   <p:sldIdLst>
     <p:sldId id="257" r:id="rId2"/>
@@ -29,7 +29,12 @@
     <p:sldId id="301" r:id="rId20"/>
     <p:sldId id="304" r:id="rId21"/>
     <p:sldId id="293" r:id="rId22"/>
-    <p:sldId id="284" r:id="rId23"/>
+    <p:sldId id="306" r:id="rId23"/>
+    <p:sldId id="305" r:id="rId24"/>
+    <p:sldId id="307" r:id="rId25"/>
+    <p:sldId id="308" r:id="rId26"/>
+    <p:sldId id="309" r:id="rId27"/>
+    <p:sldId id="284" r:id="rId28"/>
   </p:sldIdLst>
   <p:sldSz cx="12192000" cy="6858000"/>
   <p:notesSz cx="6858000" cy="9144000"/>
@@ -139,7 +144,7 @@
 <file path=ppt/revisionInfo.xml><?xml version="1.0" encoding="utf-8"?>
 <p1510:revInfo xmlns:a="http://schemas.openxmlformats.org/drawingml/2006/main" xmlns:r="http://schemas.openxmlformats.org/officeDocument/2006/relationships" xmlns:p1510="http://schemas.microsoft.com/office/powerpoint/2015/10/main">
   <p1510:revLst>
-    <p1510:client id="{0EB52ED8-BDDA-42B4-90C4-1B322ACD0F02}" v="2683" dt="2024-02-18T17:46:05.730"/>
+    <p1510:client id="{0EB52ED8-BDDA-42B4-90C4-1B322ACD0F02}" v="2783" dt="2024-02-20T14:10:22.272"/>
   </p1510:revLst>
 </p1510:revInfo>
 </file>
@@ -148,8 +153,8 @@
 <pc:chgInfo xmlns:a="http://schemas.openxmlformats.org/drawingml/2006/main" xmlns:r="http://schemas.openxmlformats.org/officeDocument/2006/relationships" xmlns:ac="http://schemas.microsoft.com/office/drawing/2013/main/command" xmlns:pc="http://schemas.microsoft.com/office/powerpoint/2013/main/command">
   <pc:docChgLst>
     <pc:chgData name="Ismaël Tuo" userId="fca7baf0e513a1e6" providerId="LiveId" clId="{0EB52ED8-BDDA-42B4-90C4-1B322ACD0F02}"/>
-    <pc:docChg chg="undo custSel addSld modSld">
-      <pc:chgData name="Ismaël Tuo" userId="fca7baf0e513a1e6" providerId="LiveId" clId="{0EB52ED8-BDDA-42B4-90C4-1B322ACD0F02}" dt="2024-02-18T17:46:15.702" v="15871" actId="1076"/>
+    <pc:docChg chg="undo custSel addSld delSld modSld sldOrd">
+      <pc:chgData name="Ismaël Tuo" userId="fca7baf0e513a1e6" providerId="LiveId" clId="{0EB52ED8-BDDA-42B4-90C4-1B322ACD0F02}" dt="2024-02-20T14:10:38.576" v="23635" actId="1076"/>
       <pc:docMkLst>
         <pc:docMk/>
       </pc:docMkLst>
@@ -199,13 +204,13 @@
         </pc:spChg>
       </pc:sldChg>
       <pc:sldChg chg="addSp delSp modSp mod">
-        <pc:chgData name="Ismaël Tuo" userId="fca7baf0e513a1e6" providerId="LiveId" clId="{0EB52ED8-BDDA-42B4-90C4-1B322ACD0F02}" dt="2024-02-18T15:27:55.711" v="7500" actId="1076"/>
+        <pc:chgData name="Ismaël Tuo" userId="fca7baf0e513a1e6" providerId="LiveId" clId="{0EB52ED8-BDDA-42B4-90C4-1B322ACD0F02}" dt="2024-02-20T11:48:08.510" v="15886" actId="20577"/>
         <pc:sldMkLst>
           <pc:docMk/>
           <pc:sldMk cId="2639441608" sldId="286"/>
         </pc:sldMkLst>
         <pc:spChg chg="add mod">
-          <ac:chgData name="Ismaël Tuo" userId="fca7baf0e513a1e6" providerId="LiveId" clId="{0EB52ED8-BDDA-42B4-90C4-1B322ACD0F02}" dt="2024-02-18T15:27:41.766" v="7496" actId="1076"/>
+          <ac:chgData name="Ismaël Tuo" userId="fca7baf0e513a1e6" providerId="LiveId" clId="{0EB52ED8-BDDA-42B4-90C4-1B322ACD0F02}" dt="2024-02-20T11:48:08.510" v="15886" actId="20577"/>
           <ac:spMkLst>
             <pc:docMk/>
             <pc:sldMk cId="2639441608" sldId="286"/>
@@ -333,13 +338,13 @@
         </pc:picChg>
       </pc:sldChg>
       <pc:sldChg chg="addSp modSp add mod">
-        <pc:chgData name="Ismaël Tuo" userId="fca7baf0e513a1e6" providerId="LiveId" clId="{0EB52ED8-BDDA-42B4-90C4-1B322ACD0F02}" dt="2024-02-18T15:30:40.964" v="7503" actId="1076"/>
+        <pc:chgData name="Ismaël Tuo" userId="fca7baf0e513a1e6" providerId="LiveId" clId="{0EB52ED8-BDDA-42B4-90C4-1B322ACD0F02}" dt="2024-02-20T11:54:04.611" v="15915" actId="20577"/>
         <pc:sldMkLst>
           <pc:docMk/>
           <pc:sldMk cId="2342007768" sldId="288"/>
         </pc:sldMkLst>
         <pc:spChg chg="add mod">
-          <ac:chgData name="Ismaël Tuo" userId="fca7baf0e513a1e6" providerId="LiveId" clId="{0EB52ED8-BDDA-42B4-90C4-1B322ACD0F02}" dt="2024-02-18T15:30:40.964" v="7503" actId="1076"/>
+          <ac:chgData name="Ismaël Tuo" userId="fca7baf0e513a1e6" providerId="LiveId" clId="{0EB52ED8-BDDA-42B4-90C4-1B322ACD0F02}" dt="2024-02-20T11:53:08.117" v="15890" actId="33524"/>
           <ac:spMkLst>
             <pc:docMk/>
             <pc:sldMk cId="2342007768" sldId="288"/>
@@ -355,7 +360,7 @@
           </ac:spMkLst>
         </pc:spChg>
         <pc:spChg chg="add mod">
-          <ac:chgData name="Ismaël Tuo" userId="fca7baf0e513a1e6" providerId="LiveId" clId="{0EB52ED8-BDDA-42B4-90C4-1B322ACD0F02}" dt="2024-01-31T14:42:05.505" v="4894" actId="1076"/>
+          <ac:chgData name="Ismaël Tuo" userId="fca7baf0e513a1e6" providerId="LiveId" clId="{0EB52ED8-BDDA-42B4-90C4-1B322ACD0F02}" dt="2024-02-20T11:53:37.968" v="15909" actId="20577"/>
           <ac:spMkLst>
             <pc:docMk/>
             <pc:sldMk cId="2342007768" sldId="288"/>
@@ -363,7 +368,7 @@
           </ac:spMkLst>
         </pc:spChg>
         <pc:spChg chg="add mod">
-          <ac:chgData name="Ismaël Tuo" userId="fca7baf0e513a1e6" providerId="LiveId" clId="{0EB52ED8-BDDA-42B4-90C4-1B322ACD0F02}" dt="2024-01-31T14:51:28.225" v="5567" actId="20577"/>
+          <ac:chgData name="Ismaël Tuo" userId="fca7baf0e513a1e6" providerId="LiveId" clId="{0EB52ED8-BDDA-42B4-90C4-1B322ACD0F02}" dt="2024-02-20T11:54:04.611" v="15915" actId="20577"/>
           <ac:spMkLst>
             <pc:docMk/>
             <pc:sldMk cId="2342007768" sldId="288"/>
@@ -435,7 +440,7 @@
         </pc:picChg>
       </pc:sldChg>
       <pc:sldChg chg="addSp delSp modSp add mod">
-        <pc:chgData name="Ismaël Tuo" userId="fca7baf0e513a1e6" providerId="LiveId" clId="{0EB52ED8-BDDA-42B4-90C4-1B322ACD0F02}" dt="2024-02-18T15:50:01.731" v="8463" actId="1076"/>
+        <pc:chgData name="Ismaël Tuo" userId="fca7baf0e513a1e6" providerId="LiveId" clId="{0EB52ED8-BDDA-42B4-90C4-1B322ACD0F02}" dt="2024-02-20T11:58:07.047" v="15958" actId="1076"/>
         <pc:sldMkLst>
           <pc:docMk/>
           <pc:sldMk cId="161855368" sldId="290"/>
@@ -489,7 +494,7 @@
           </ac:spMkLst>
         </pc:spChg>
         <pc:spChg chg="mod">
-          <ac:chgData name="Ismaël Tuo" userId="fca7baf0e513a1e6" providerId="LiveId" clId="{0EB52ED8-BDDA-42B4-90C4-1B322ACD0F02}" dt="2024-02-18T15:45:27.168" v="8117" actId="1076"/>
+          <ac:chgData name="Ismaël Tuo" userId="fca7baf0e513a1e6" providerId="LiveId" clId="{0EB52ED8-BDDA-42B4-90C4-1B322ACD0F02}" dt="2024-02-20T11:57:47.736" v="15957" actId="20577"/>
           <ac:spMkLst>
             <pc:docMk/>
             <pc:sldMk cId="161855368" sldId="290"/>
@@ -745,7 +750,7 @@
           </ac:spMkLst>
         </pc:spChg>
         <pc:spChg chg="add mod">
-          <ac:chgData name="Ismaël Tuo" userId="fca7baf0e513a1e6" providerId="LiveId" clId="{0EB52ED8-BDDA-42B4-90C4-1B322ACD0F02}" dt="2024-02-18T15:47:30.223" v="8458" actId="20577"/>
+          <ac:chgData name="Ismaël Tuo" userId="fca7baf0e513a1e6" providerId="LiveId" clId="{0EB52ED8-BDDA-42B4-90C4-1B322ACD0F02}" dt="2024-02-20T11:58:07.047" v="15958" actId="1076"/>
           <ac:spMkLst>
             <pc:docMk/>
             <pc:sldMk cId="161855368" sldId="290"/>
@@ -905,7 +910,7 @@
         </pc:picChg>
       </pc:sldChg>
       <pc:sldChg chg="addSp delSp modSp add mod">
-        <pc:chgData name="Ismaël Tuo" userId="fca7baf0e513a1e6" providerId="LiveId" clId="{0EB52ED8-BDDA-42B4-90C4-1B322ACD0F02}" dt="2024-02-18T16:40:13.317" v="11006" actId="113"/>
+        <pc:chgData name="Ismaël Tuo" userId="fca7baf0e513a1e6" providerId="LiveId" clId="{0EB52ED8-BDDA-42B4-90C4-1B322ACD0F02}" dt="2024-02-20T12:01:13.309" v="15983" actId="20577"/>
         <pc:sldMkLst>
           <pc:docMk/>
           <pc:sldMk cId="402679512" sldId="292"/>
@@ -935,7 +940,7 @@
           </ac:spMkLst>
         </pc:spChg>
         <pc:spChg chg="add mod">
-          <ac:chgData name="Ismaël Tuo" userId="fca7baf0e513a1e6" providerId="LiveId" clId="{0EB52ED8-BDDA-42B4-90C4-1B322ACD0F02}" dt="2024-02-18T16:40:13.317" v="11006" actId="113"/>
+          <ac:chgData name="Ismaël Tuo" userId="fca7baf0e513a1e6" providerId="LiveId" clId="{0EB52ED8-BDDA-42B4-90C4-1B322ACD0F02}" dt="2024-02-20T12:01:13.309" v="15983" actId="20577"/>
           <ac:spMkLst>
             <pc:docMk/>
             <pc:sldMk cId="402679512" sldId="292"/>
@@ -959,12 +964,20 @@
           </ac:picMkLst>
         </pc:picChg>
       </pc:sldChg>
-      <pc:sldChg chg="modSp add mod">
-        <pc:chgData name="Ismaël Tuo" userId="fca7baf0e513a1e6" providerId="LiveId" clId="{0EB52ED8-BDDA-42B4-90C4-1B322ACD0F02}" dt="2024-01-14T12:30:18.667" v="366" actId="20577"/>
+      <pc:sldChg chg="addSp delSp modSp add mod">
+        <pc:chgData name="Ismaël Tuo" userId="fca7baf0e513a1e6" providerId="LiveId" clId="{0EB52ED8-BDDA-42B4-90C4-1B322ACD0F02}" dt="2024-02-20T13:53:24.297" v="23532" actId="1076"/>
         <pc:sldMkLst>
           <pc:docMk/>
           <pc:sldMk cId="1332028687" sldId="293"/>
         </pc:sldMkLst>
+        <pc:spChg chg="add mod">
+          <ac:chgData name="Ismaël Tuo" userId="fca7baf0e513a1e6" providerId="LiveId" clId="{0EB52ED8-BDDA-42B4-90C4-1B322ACD0F02}" dt="2024-02-20T13:51:33.784" v="23361" actId="1076"/>
+          <ac:spMkLst>
+            <pc:docMk/>
+            <pc:sldMk cId="1332028687" sldId="293"/>
+            <ac:spMk id="2" creationId="{598CC1F4-92B5-97D6-5630-8A3701211AA4}"/>
+          </ac:spMkLst>
+        </pc:spChg>
         <pc:spChg chg="mod">
           <ac:chgData name="Ismaël Tuo" userId="fca7baf0e513a1e6" providerId="LiveId" clId="{0EB52ED8-BDDA-42B4-90C4-1B322ACD0F02}" dt="2024-01-14T12:30:18.667" v="366" actId="20577"/>
           <ac:spMkLst>
@@ -973,9 +986,41 @@
             <ac:spMk id="6" creationId="{84F10693-2FE8-EFC8-8DB6-84BFD181D260}"/>
           </ac:spMkLst>
         </pc:spChg>
+        <pc:spChg chg="add mod">
+          <ac:chgData name="Ismaël Tuo" userId="fca7baf0e513a1e6" providerId="LiveId" clId="{0EB52ED8-BDDA-42B4-90C4-1B322ACD0F02}" dt="2024-02-20T13:51:36.392" v="23362" actId="1076"/>
+          <ac:spMkLst>
+            <pc:docMk/>
+            <pc:sldMk cId="1332028687" sldId="293"/>
+            <ac:spMk id="7" creationId="{990321CC-02EF-ED64-0AA9-789ED60F60B1}"/>
+          </ac:spMkLst>
+        </pc:spChg>
+        <pc:spChg chg="add mod">
+          <ac:chgData name="Ismaël Tuo" userId="fca7baf0e513a1e6" providerId="LiveId" clId="{0EB52ED8-BDDA-42B4-90C4-1B322ACD0F02}" dt="2024-02-20T13:51:42.414" v="23364" actId="1076"/>
+          <ac:spMkLst>
+            <pc:docMk/>
+            <pc:sldMk cId="1332028687" sldId="293"/>
+            <ac:spMk id="8" creationId="{11F94C81-3D20-9C49-9F89-80AF942FFD56}"/>
+          </ac:spMkLst>
+        </pc:spChg>
+        <pc:spChg chg="add mod">
+          <ac:chgData name="Ismaël Tuo" userId="fca7baf0e513a1e6" providerId="LiveId" clId="{0EB52ED8-BDDA-42B4-90C4-1B322ACD0F02}" dt="2024-02-20T13:53:24.297" v="23532" actId="1076"/>
+          <ac:spMkLst>
+            <pc:docMk/>
+            <pc:sldMk cId="1332028687" sldId="293"/>
+            <ac:spMk id="9" creationId="{A5FB77B6-2F17-50F4-1633-E3FA7FF11FCC}"/>
+          </ac:spMkLst>
+        </pc:spChg>
+        <pc:spChg chg="del">
+          <ac:chgData name="Ismaël Tuo" userId="fca7baf0e513a1e6" providerId="LiveId" clId="{0EB52ED8-BDDA-42B4-90C4-1B322ACD0F02}" dt="2024-02-20T12:11:42.494" v="16352" actId="478"/>
+          <ac:spMkLst>
+            <pc:docMk/>
+            <pc:sldMk cId="1332028687" sldId="293"/>
+            <ac:spMk id="11" creationId="{C27A3656-3CB0-8161-AE9F-B92FBE4F5083}"/>
+          </ac:spMkLst>
+        </pc:spChg>
       </pc:sldChg>
       <pc:sldChg chg="addSp delSp modSp add mod">
-        <pc:chgData name="Ismaël Tuo" userId="fca7baf0e513a1e6" providerId="LiveId" clId="{0EB52ED8-BDDA-42B4-90C4-1B322ACD0F02}" dt="2024-01-31T13:51:46.084" v="2854" actId="20577"/>
+        <pc:chgData name="Ismaël Tuo" userId="fca7baf0e513a1e6" providerId="LiveId" clId="{0EB52ED8-BDDA-42B4-90C4-1B322ACD0F02}" dt="2024-02-20T11:49:51.994" v="15887" actId="20577"/>
         <pc:sldMkLst>
           <pc:docMk/>
           <pc:sldMk cId="2976560216" sldId="294"/>
@@ -1029,7 +1074,7 @@
           </ac:spMkLst>
         </pc:spChg>
         <pc:spChg chg="add mod">
-          <ac:chgData name="Ismaël Tuo" userId="fca7baf0e513a1e6" providerId="LiveId" clId="{0EB52ED8-BDDA-42B4-90C4-1B322ACD0F02}" dt="2024-01-31T13:51:46.084" v="2854" actId="20577"/>
+          <ac:chgData name="Ismaël Tuo" userId="fca7baf0e513a1e6" providerId="LiveId" clId="{0EB52ED8-BDDA-42B4-90C4-1B322ACD0F02}" dt="2024-02-20T11:49:51.994" v="15887" actId="20577"/>
           <ac:spMkLst>
             <pc:docMk/>
             <pc:sldMk cId="2976560216" sldId="294"/>
@@ -1054,7 +1099,7 @@
         </pc:picChg>
       </pc:sldChg>
       <pc:sldChg chg="addSp delSp modSp add mod">
-        <pc:chgData name="Ismaël Tuo" userId="fca7baf0e513a1e6" providerId="LiveId" clId="{0EB52ED8-BDDA-42B4-90C4-1B322ACD0F02}" dt="2024-02-18T15:30:16.537" v="7501" actId="14100"/>
+        <pc:chgData name="Ismaël Tuo" userId="fca7baf0e513a1e6" providerId="LiveId" clId="{0EB52ED8-BDDA-42B4-90C4-1B322ACD0F02}" dt="2024-02-20T11:52:53.430" v="15889" actId="1076"/>
         <pc:sldMkLst>
           <pc:docMk/>
           <pc:sldMk cId="3570689638" sldId="295"/>
@@ -1156,7 +1201,7 @@
           </ac:picMkLst>
         </pc:picChg>
         <pc:picChg chg="add mod">
-          <ac:chgData name="Ismaël Tuo" userId="fca7baf0e513a1e6" providerId="LiveId" clId="{0EB52ED8-BDDA-42B4-90C4-1B322ACD0F02}" dt="2024-02-18T15:30:16.537" v="7501" actId="14100"/>
+          <ac:chgData name="Ismaël Tuo" userId="fca7baf0e513a1e6" providerId="LiveId" clId="{0EB52ED8-BDDA-42B4-90C4-1B322ACD0F02}" dt="2024-02-20T11:52:53.430" v="15889" actId="1076"/>
           <ac:picMkLst>
             <pc:docMk/>
             <pc:sldMk cId="3570689638" sldId="295"/>
@@ -1165,7 +1210,7 @@
         </pc:picChg>
       </pc:sldChg>
       <pc:sldChg chg="addSp delSp modSp add mod">
-        <pc:chgData name="Ismaël Tuo" userId="fca7baf0e513a1e6" providerId="LiveId" clId="{0EB52ED8-BDDA-42B4-90C4-1B322ACD0F02}" dt="2024-02-18T15:31:51.161" v="7505" actId="14100"/>
+        <pc:chgData name="Ismaël Tuo" userId="fca7baf0e513a1e6" providerId="LiveId" clId="{0EB52ED8-BDDA-42B4-90C4-1B322ACD0F02}" dt="2024-02-20T11:55:24.202" v="15946" actId="20577"/>
         <pc:sldMkLst>
           <pc:docMk/>
           <pc:sldMk cId="4258654424" sldId="296"/>
@@ -1203,7 +1248,7 @@
           </ac:spMkLst>
         </pc:spChg>
         <pc:spChg chg="add mod">
-          <ac:chgData name="Ismaël Tuo" userId="fca7baf0e513a1e6" providerId="LiveId" clId="{0EB52ED8-BDDA-42B4-90C4-1B322ACD0F02}" dt="2024-01-31T14:56:19.697" v="5853" actId="20577"/>
+          <ac:chgData name="Ismaël Tuo" userId="fca7baf0e513a1e6" providerId="LiveId" clId="{0EB52ED8-BDDA-42B4-90C4-1B322ACD0F02}" dt="2024-02-20T11:54:52.369" v="15916" actId="20577"/>
           <ac:spMkLst>
             <pc:docMk/>
             <pc:sldMk cId="4258654424" sldId="296"/>
@@ -1211,7 +1256,7 @@
           </ac:spMkLst>
         </pc:spChg>
         <pc:spChg chg="add mod">
-          <ac:chgData name="Ismaël Tuo" userId="fca7baf0e513a1e6" providerId="LiveId" clId="{0EB52ED8-BDDA-42B4-90C4-1B322ACD0F02}" dt="2024-01-31T14:58:34.445" v="6022" actId="14100"/>
+          <ac:chgData name="Ismaël Tuo" userId="fca7baf0e513a1e6" providerId="LiveId" clId="{0EB52ED8-BDDA-42B4-90C4-1B322ACD0F02}" dt="2024-02-20T11:55:24.202" v="15946" actId="20577"/>
           <ac:spMkLst>
             <pc:docMk/>
             <pc:sldMk cId="4258654424" sldId="296"/>
@@ -1252,13 +1297,13 @@
         </pc:picChg>
       </pc:sldChg>
       <pc:sldChg chg="addSp delSp modSp add mod">
-        <pc:chgData name="Ismaël Tuo" userId="fca7baf0e513a1e6" providerId="LiveId" clId="{0EB52ED8-BDDA-42B4-90C4-1B322ACD0F02}" dt="2024-01-31T15:20:56.197" v="6735" actId="1076"/>
+        <pc:chgData name="Ismaël Tuo" userId="fca7baf0e513a1e6" providerId="LiveId" clId="{0EB52ED8-BDDA-42B4-90C4-1B322ACD0F02}" dt="2024-02-20T11:56:10.747" v="15956" actId="20577"/>
         <pc:sldMkLst>
           <pc:docMk/>
           <pc:sldMk cId="1523225851" sldId="297"/>
         </pc:sldMkLst>
         <pc:spChg chg="add mod">
-          <ac:chgData name="Ismaël Tuo" userId="fca7baf0e513a1e6" providerId="LiveId" clId="{0EB52ED8-BDDA-42B4-90C4-1B322ACD0F02}" dt="2024-01-31T15:20:56.197" v="6735" actId="1076"/>
+          <ac:chgData name="Ismaël Tuo" userId="fca7baf0e513a1e6" providerId="LiveId" clId="{0EB52ED8-BDDA-42B4-90C4-1B322ACD0F02}" dt="2024-02-20T11:56:10.747" v="15956" actId="20577"/>
           <ac:spMkLst>
             <pc:docMk/>
             <pc:sldMk cId="1523225851" sldId="297"/>
@@ -1282,7 +1327,7 @@
           </ac:spMkLst>
         </pc:spChg>
         <pc:spChg chg="add mod">
-          <ac:chgData name="Ismaël Tuo" userId="fca7baf0e513a1e6" providerId="LiveId" clId="{0EB52ED8-BDDA-42B4-90C4-1B322ACD0F02}" dt="2024-01-31T15:20:52.229" v="6733" actId="1076"/>
+          <ac:chgData name="Ismaël Tuo" userId="fca7baf0e513a1e6" providerId="LiveId" clId="{0EB52ED8-BDDA-42B4-90C4-1B322ACD0F02}" dt="2024-02-20T11:55:37.691" v="15948" actId="1076"/>
           <ac:spMkLst>
             <pc:docMk/>
             <pc:sldMk cId="1523225851" sldId="297"/>
@@ -1339,13 +1384,13 @@
         </pc:picChg>
       </pc:sldChg>
       <pc:sldChg chg="addSp modSp add mod">
-        <pc:chgData name="Ismaël Tuo" userId="fca7baf0e513a1e6" providerId="LiveId" clId="{0EB52ED8-BDDA-42B4-90C4-1B322ACD0F02}" dt="2024-02-18T16:56:17.009" v="11879" actId="1076"/>
+        <pc:chgData name="Ismaël Tuo" userId="fca7baf0e513a1e6" providerId="LiveId" clId="{0EB52ED8-BDDA-42B4-90C4-1B322ACD0F02}" dt="2024-02-20T12:01:51.946" v="15991" actId="20577"/>
         <pc:sldMkLst>
           <pc:docMk/>
           <pc:sldMk cId="4166790313" sldId="298"/>
         </pc:sldMkLst>
         <pc:spChg chg="add mod">
-          <ac:chgData name="Ismaël Tuo" userId="fca7baf0e513a1e6" providerId="LiveId" clId="{0EB52ED8-BDDA-42B4-90C4-1B322ACD0F02}" dt="2024-02-18T16:46:20.884" v="11620" actId="1076"/>
+          <ac:chgData name="Ismaël Tuo" userId="fca7baf0e513a1e6" providerId="LiveId" clId="{0EB52ED8-BDDA-42B4-90C4-1B322ACD0F02}" dt="2024-02-20T12:01:51.946" v="15991" actId="20577"/>
           <ac:spMkLst>
             <pc:docMk/>
             <pc:sldMk cId="4166790313" sldId="298"/>
@@ -1369,7 +1414,7 @@
           </ac:spMkLst>
         </pc:spChg>
         <pc:spChg chg="mod">
-          <ac:chgData name="Ismaël Tuo" userId="fca7baf0e513a1e6" providerId="LiveId" clId="{0EB52ED8-BDDA-42B4-90C4-1B322ACD0F02}" dt="2024-02-18T16:43:40.748" v="11305" actId="1076"/>
+          <ac:chgData name="Ismaël Tuo" userId="fca7baf0e513a1e6" providerId="LiveId" clId="{0EB52ED8-BDDA-42B4-90C4-1B322ACD0F02}" dt="2024-02-20T12:01:29.709" v="15987" actId="20577"/>
           <ac:spMkLst>
             <pc:docMk/>
             <pc:sldMk cId="4166790313" sldId="298"/>
@@ -1473,7 +1518,7 @@
         </pc:picChg>
       </pc:sldChg>
       <pc:sldChg chg="addSp delSp modSp add mod">
-        <pc:chgData name="Ismaël Tuo" userId="fca7baf0e513a1e6" providerId="LiveId" clId="{0EB52ED8-BDDA-42B4-90C4-1B322ACD0F02}" dt="2024-02-18T16:15:33.144" v="9684" actId="14100"/>
+        <pc:chgData name="Ismaël Tuo" userId="fca7baf0e513a1e6" providerId="LiveId" clId="{0EB52ED8-BDDA-42B4-90C4-1B322ACD0F02}" dt="2024-02-20T11:58:37.093" v="15967" actId="20577"/>
         <pc:sldMkLst>
           <pc:docMk/>
           <pc:sldMk cId="4189741124" sldId="300"/>
@@ -1487,7 +1532,7 @@
           </ac:spMkLst>
         </pc:spChg>
         <pc:spChg chg="add mod">
-          <ac:chgData name="Ismaël Tuo" userId="fca7baf0e513a1e6" providerId="LiveId" clId="{0EB52ED8-BDDA-42B4-90C4-1B322ACD0F02}" dt="2024-02-18T16:13:33.930" v="9569" actId="1076"/>
+          <ac:chgData name="Ismaël Tuo" userId="fca7baf0e513a1e6" providerId="LiveId" clId="{0EB52ED8-BDDA-42B4-90C4-1B322ACD0F02}" dt="2024-02-20T11:58:37.093" v="15967" actId="20577"/>
           <ac:spMkLst>
             <pc:docMk/>
             <pc:sldMk cId="4189741124" sldId="300"/>
@@ -1591,7 +1636,7 @@
         </pc:spChg>
       </pc:sldChg>
       <pc:sldChg chg="addSp delSp modSp add mod">
-        <pc:chgData name="Ismaël Tuo" userId="fca7baf0e513a1e6" providerId="LiveId" clId="{0EB52ED8-BDDA-42B4-90C4-1B322ACD0F02}" dt="2024-02-18T17:11:16.604" v="12722" actId="20577"/>
+        <pc:chgData name="Ismaël Tuo" userId="fca7baf0e513a1e6" providerId="LiveId" clId="{0EB52ED8-BDDA-42B4-90C4-1B322ACD0F02}" dt="2024-02-20T12:05:58.205" v="16337" actId="1076"/>
         <pc:sldMkLst>
           <pc:docMk/>
           <pc:sldMk cId="3238743357" sldId="302"/>
@@ -1613,7 +1658,7 @@
           </ac:spMkLst>
         </pc:spChg>
         <pc:spChg chg="mod">
-          <ac:chgData name="Ismaël Tuo" userId="fca7baf0e513a1e6" providerId="LiveId" clId="{0EB52ED8-BDDA-42B4-90C4-1B322ACD0F02}" dt="2024-02-18T16:57:51.214" v="12120" actId="20577"/>
+          <ac:chgData name="Ismaël Tuo" userId="fca7baf0e513a1e6" providerId="LiveId" clId="{0EB52ED8-BDDA-42B4-90C4-1B322ACD0F02}" dt="2024-02-20T12:03:49.528" v="16120" actId="20577"/>
           <ac:spMkLst>
             <pc:docMk/>
             <pc:sldMk cId="3238743357" sldId="302"/>
@@ -1621,7 +1666,7 @@
           </ac:spMkLst>
         </pc:spChg>
         <pc:spChg chg="add mod">
-          <ac:chgData name="Ismaël Tuo" userId="fca7baf0e513a1e6" providerId="LiveId" clId="{0EB52ED8-BDDA-42B4-90C4-1B322ACD0F02}" dt="2024-02-18T17:06:21.355" v="12492" actId="1076"/>
+          <ac:chgData name="Ismaël Tuo" userId="fca7baf0e513a1e6" providerId="LiveId" clId="{0EB52ED8-BDDA-42B4-90C4-1B322ACD0F02}" dt="2024-02-20T12:05:58.205" v="16337" actId="1076"/>
           <ac:spMkLst>
             <pc:docMk/>
             <pc:sldMk cId="3238743357" sldId="302"/>
@@ -1629,7 +1674,7 @@
           </ac:spMkLst>
         </pc:spChg>
         <pc:spChg chg="add mod">
-          <ac:chgData name="Ismaël Tuo" userId="fca7baf0e513a1e6" providerId="LiveId" clId="{0EB52ED8-BDDA-42B4-90C4-1B322ACD0F02}" dt="2024-02-18T17:11:16.604" v="12722" actId="20577"/>
+          <ac:chgData name="Ismaël Tuo" userId="fca7baf0e513a1e6" providerId="LiveId" clId="{0EB52ED8-BDDA-42B4-90C4-1B322ACD0F02}" dt="2024-02-20T12:05:54.575" v="16336" actId="1076"/>
           <ac:spMkLst>
             <pc:docMk/>
             <pc:sldMk cId="3238743357" sldId="302"/>
@@ -1678,7 +1723,7 @@
         </pc:picChg>
       </pc:sldChg>
       <pc:sldChg chg="addSp delSp modSp add mod">
-        <pc:chgData name="Ismaël Tuo" userId="fca7baf0e513a1e6" providerId="LiveId" clId="{0EB52ED8-BDDA-42B4-90C4-1B322ACD0F02}" dt="2024-02-18T17:21:16.416" v="13638" actId="1076"/>
+        <pc:chgData name="Ismaël Tuo" userId="fca7baf0e513a1e6" providerId="LiveId" clId="{0EB52ED8-BDDA-42B4-90C4-1B322ACD0F02}" dt="2024-02-20T12:06:40.544" v="16338" actId="20577"/>
         <pc:sldMkLst>
           <pc:docMk/>
           <pc:sldMk cId="1239094899" sldId="303"/>
@@ -1692,7 +1737,7 @@
           </ac:spMkLst>
         </pc:spChg>
         <pc:spChg chg="mod">
-          <ac:chgData name="Ismaël Tuo" userId="fca7baf0e513a1e6" providerId="LiveId" clId="{0EB52ED8-BDDA-42B4-90C4-1B322ACD0F02}" dt="2024-02-18T17:13:01.399" v="12968" actId="20577"/>
+          <ac:chgData name="Ismaël Tuo" userId="fca7baf0e513a1e6" providerId="LiveId" clId="{0EB52ED8-BDDA-42B4-90C4-1B322ACD0F02}" dt="2024-02-20T12:06:40.544" v="16338" actId="20577"/>
           <ac:spMkLst>
             <pc:docMk/>
             <pc:sldMk cId="1239094899" sldId="303"/>
@@ -1749,7 +1794,7 @@
         </pc:picChg>
       </pc:sldChg>
       <pc:sldChg chg="addSp delSp modSp add mod">
-        <pc:chgData name="Ismaël Tuo" userId="fca7baf0e513a1e6" providerId="LiveId" clId="{0EB52ED8-BDDA-42B4-90C4-1B322ACD0F02}" dt="2024-02-18T17:46:15.702" v="15871" actId="1076"/>
+        <pc:chgData name="Ismaël Tuo" userId="fca7baf0e513a1e6" providerId="LiveId" clId="{0EB52ED8-BDDA-42B4-90C4-1B322ACD0F02}" dt="2024-02-20T12:08:38.693" v="16351" actId="20577"/>
         <pc:sldMkLst>
           <pc:docMk/>
           <pc:sldMk cId="2302406874" sldId="304"/>
@@ -1787,7 +1832,7 @@
           </ac:spMkLst>
         </pc:spChg>
         <pc:spChg chg="add mod">
-          <ac:chgData name="Ismaël Tuo" userId="fca7baf0e513a1e6" providerId="LiveId" clId="{0EB52ED8-BDDA-42B4-90C4-1B322ACD0F02}" dt="2024-02-18T17:46:08.809" v="15869" actId="1076"/>
+          <ac:chgData name="Ismaël Tuo" userId="fca7baf0e513a1e6" providerId="LiveId" clId="{0EB52ED8-BDDA-42B4-90C4-1B322ACD0F02}" dt="2024-02-20T12:08:38.693" v="16351" actId="20577"/>
           <ac:spMkLst>
             <pc:docMk/>
             <pc:sldMk cId="2302406874" sldId="304"/>
@@ -1826,6 +1871,208 @@
             <ac:picMk id="17" creationId="{58761255-2FA3-B4C7-B23F-6F91651393C5}"/>
           </ac:picMkLst>
         </pc:picChg>
+      </pc:sldChg>
+      <pc:sldChg chg="addSp delSp modSp add mod">
+        <pc:chgData name="Ismaël Tuo" userId="fca7baf0e513a1e6" providerId="LiveId" clId="{0EB52ED8-BDDA-42B4-90C4-1B322ACD0F02}" dt="2024-02-20T14:01:39.869" v="23593" actId="20577"/>
+        <pc:sldMkLst>
+          <pc:docMk/>
+          <pc:sldMk cId="2465630299" sldId="305"/>
+        </pc:sldMkLst>
+        <pc:spChg chg="mod">
+          <ac:chgData name="Ismaël Tuo" userId="fca7baf0e513a1e6" providerId="LiveId" clId="{0EB52ED8-BDDA-42B4-90C4-1B322ACD0F02}" dt="2024-02-20T12:53:10.023" v="19155" actId="20577"/>
+          <ac:spMkLst>
+            <pc:docMk/>
+            <pc:sldMk cId="2465630299" sldId="305"/>
+            <ac:spMk id="2" creationId="{04BA494E-B5DA-C1B4-708B-1C292F78A3EA}"/>
+          </ac:spMkLst>
+        </pc:spChg>
+        <pc:spChg chg="mod">
+          <ac:chgData name="Ismaël Tuo" userId="fca7baf0e513a1e6" providerId="LiveId" clId="{0EB52ED8-BDDA-42B4-90C4-1B322ACD0F02}" dt="2024-02-20T13:58:30.859" v="23542" actId="20577"/>
+          <ac:spMkLst>
+            <pc:docMk/>
+            <pc:sldMk cId="2465630299" sldId="305"/>
+            <ac:spMk id="7" creationId="{A7FF1985-80EA-EDE1-BA9D-CAAB047B7307}"/>
+          </ac:spMkLst>
+        </pc:spChg>
+        <pc:spChg chg="del">
+          <ac:chgData name="Ismaël Tuo" userId="fca7baf0e513a1e6" providerId="LiveId" clId="{0EB52ED8-BDDA-42B4-90C4-1B322ACD0F02}" dt="2024-02-20T12:32:19.349" v="17999" actId="478"/>
+          <ac:spMkLst>
+            <pc:docMk/>
+            <pc:sldMk cId="2465630299" sldId="305"/>
+            <ac:spMk id="8" creationId="{74390CE2-5BC9-0E4F-3567-4DB62AF3ABD3}"/>
+          </ac:spMkLst>
+        </pc:spChg>
+        <pc:spChg chg="del">
+          <ac:chgData name="Ismaël Tuo" userId="fca7baf0e513a1e6" providerId="LiveId" clId="{0EB52ED8-BDDA-42B4-90C4-1B322ACD0F02}" dt="2024-02-20T12:32:17.400" v="17998" actId="478"/>
+          <ac:spMkLst>
+            <pc:docMk/>
+            <pc:sldMk cId="2465630299" sldId="305"/>
+            <ac:spMk id="9" creationId="{5FD9B0AB-CDC7-EF24-79A8-33E10F48F39D}"/>
+          </ac:spMkLst>
+        </pc:spChg>
+        <pc:spChg chg="add del mod">
+          <ac:chgData name="Ismaël Tuo" userId="fca7baf0e513a1e6" providerId="LiveId" clId="{0EB52ED8-BDDA-42B4-90C4-1B322ACD0F02}" dt="2024-02-20T12:41:04.186" v="18142" actId="22"/>
+          <ac:spMkLst>
+            <pc:docMk/>
+            <pc:sldMk cId="2465630299" sldId="305"/>
+            <ac:spMk id="11" creationId="{DB59BD3F-3615-3F38-2C3B-775243469C70}"/>
+          </ac:spMkLst>
+        </pc:spChg>
+        <pc:spChg chg="add mod">
+          <ac:chgData name="Ismaël Tuo" userId="fca7baf0e513a1e6" providerId="LiveId" clId="{0EB52ED8-BDDA-42B4-90C4-1B322ACD0F02}" dt="2024-02-20T13:12:18.246" v="20613" actId="20577"/>
+          <ac:spMkLst>
+            <pc:docMk/>
+            <pc:sldMk cId="2465630299" sldId="305"/>
+            <ac:spMk id="12" creationId="{B2E75825-AD1D-B5D0-8B6D-52813365B0E7}"/>
+          </ac:spMkLst>
+        </pc:spChg>
+        <pc:spChg chg="add mod">
+          <ac:chgData name="Ismaël Tuo" userId="fca7baf0e513a1e6" providerId="LiveId" clId="{0EB52ED8-BDDA-42B4-90C4-1B322ACD0F02}" dt="2024-02-20T14:01:39.869" v="23593" actId="20577"/>
+          <ac:spMkLst>
+            <pc:docMk/>
+            <pc:sldMk cId="2465630299" sldId="305"/>
+            <ac:spMk id="13" creationId="{92DE3661-AF58-F050-DC4D-88CF7AB0DA89}"/>
+          </ac:spMkLst>
+        </pc:spChg>
+      </pc:sldChg>
+      <pc:sldChg chg="modSp add mod ord">
+        <pc:chgData name="Ismaël Tuo" userId="fca7baf0e513a1e6" providerId="LiveId" clId="{0EB52ED8-BDDA-42B4-90C4-1B322ACD0F02}" dt="2024-02-20T13:57:10.827" v="23535" actId="33524"/>
+        <pc:sldMkLst>
+          <pc:docMk/>
+          <pc:sldMk cId="3783414417" sldId="306"/>
+        </pc:sldMkLst>
+        <pc:spChg chg="mod">
+          <ac:chgData name="Ismaël Tuo" userId="fca7baf0e513a1e6" providerId="LiveId" clId="{0EB52ED8-BDDA-42B4-90C4-1B322ACD0F02}" dt="2024-02-20T13:57:10.827" v="23535" actId="33524"/>
+          <ac:spMkLst>
+            <pc:docMk/>
+            <pc:sldMk cId="3783414417" sldId="306"/>
+            <ac:spMk id="7" creationId="{FDEB7C40-EA75-EDD3-D51E-186545746147}"/>
+          </ac:spMkLst>
+        </pc:spChg>
+      </pc:sldChg>
+      <pc:sldChg chg="delSp modSp add mod">
+        <pc:chgData name="Ismaël Tuo" userId="fca7baf0e513a1e6" providerId="LiveId" clId="{0EB52ED8-BDDA-42B4-90C4-1B322ACD0F02}" dt="2024-02-20T14:02:33.300" v="23595" actId="20577"/>
+        <pc:sldMkLst>
+          <pc:docMk/>
+          <pc:sldMk cId="1149221268" sldId="307"/>
+        </pc:sldMkLst>
+        <pc:spChg chg="mod">
+          <ac:chgData name="Ismaël Tuo" userId="fca7baf0e513a1e6" providerId="LiveId" clId="{0EB52ED8-BDDA-42B4-90C4-1B322ACD0F02}" dt="2024-02-20T14:02:33.300" v="23595" actId="20577"/>
+          <ac:spMkLst>
+            <pc:docMk/>
+            <pc:sldMk cId="1149221268" sldId="307"/>
+            <ac:spMk id="2" creationId="{E3F5CE80-F097-5FFA-4EDB-A588C5514852}"/>
+          </ac:spMkLst>
+        </pc:spChg>
+        <pc:spChg chg="mod">
+          <ac:chgData name="Ismaël Tuo" userId="fca7baf0e513a1e6" providerId="LiveId" clId="{0EB52ED8-BDDA-42B4-90C4-1B322ACD0F02}" dt="2024-02-20T13:27:51.531" v="21998" actId="20577"/>
+          <ac:spMkLst>
+            <pc:docMk/>
+            <pc:sldMk cId="1149221268" sldId="307"/>
+            <ac:spMk id="7" creationId="{26089FA3-1429-ADF1-DAE2-6EF9D4826D95}"/>
+          </ac:spMkLst>
+        </pc:spChg>
+        <pc:spChg chg="del">
+          <ac:chgData name="Ismaël Tuo" userId="fca7baf0e513a1e6" providerId="LiveId" clId="{0EB52ED8-BDDA-42B4-90C4-1B322ACD0F02}" dt="2024-02-20T13:12:26.483" v="20615" actId="478"/>
+          <ac:spMkLst>
+            <pc:docMk/>
+            <pc:sldMk cId="1149221268" sldId="307"/>
+            <ac:spMk id="12" creationId="{108B8071-0D06-4BD7-FD20-0605324FE88E}"/>
+          </ac:spMkLst>
+        </pc:spChg>
+        <pc:spChg chg="del">
+          <ac:chgData name="Ismaël Tuo" userId="fca7baf0e513a1e6" providerId="LiveId" clId="{0EB52ED8-BDDA-42B4-90C4-1B322ACD0F02}" dt="2024-02-20T13:12:28.020" v="20616" actId="478"/>
+          <ac:spMkLst>
+            <pc:docMk/>
+            <pc:sldMk cId="1149221268" sldId="307"/>
+            <ac:spMk id="13" creationId="{A6EEE82F-0B76-CB77-D9A3-CAA78CD46C59}"/>
+          </ac:spMkLst>
+        </pc:spChg>
+      </pc:sldChg>
+      <pc:sldChg chg="modSp add mod">
+        <pc:chgData name="Ismaël Tuo" userId="fca7baf0e513a1e6" providerId="LiveId" clId="{0EB52ED8-BDDA-42B4-90C4-1B322ACD0F02}" dt="2024-02-20T14:07:15.842" v="23597" actId="20577"/>
+        <pc:sldMkLst>
+          <pc:docMk/>
+          <pc:sldMk cId="904226985" sldId="308"/>
+        </pc:sldMkLst>
+        <pc:spChg chg="mod">
+          <ac:chgData name="Ismaël Tuo" userId="fca7baf0e513a1e6" providerId="LiveId" clId="{0EB52ED8-BDDA-42B4-90C4-1B322ACD0F02}" dt="2024-02-20T14:07:15.842" v="23597" actId="20577"/>
+          <ac:spMkLst>
+            <pc:docMk/>
+            <pc:sldMk cId="904226985" sldId="308"/>
+            <ac:spMk id="2" creationId="{9BE65DD0-9CC1-D675-E344-5185A8E7E592}"/>
+          </ac:spMkLst>
+        </pc:spChg>
+        <pc:spChg chg="mod">
+          <ac:chgData name="Ismaël Tuo" userId="fca7baf0e513a1e6" providerId="LiveId" clId="{0EB52ED8-BDDA-42B4-90C4-1B322ACD0F02}" dt="2024-02-20T13:42:26.596" v="23267" actId="20577"/>
+          <ac:spMkLst>
+            <pc:docMk/>
+            <pc:sldMk cId="904226985" sldId="308"/>
+            <ac:spMk id="7" creationId="{00B648EB-E78D-8422-ED63-D01B0D7EF41C}"/>
+          </ac:spMkLst>
+        </pc:spChg>
+      </pc:sldChg>
+      <pc:sldChg chg="addSp modSp add mod">
+        <pc:chgData name="Ismaël Tuo" userId="fca7baf0e513a1e6" providerId="LiveId" clId="{0EB52ED8-BDDA-42B4-90C4-1B322ACD0F02}" dt="2024-02-20T14:10:38.576" v="23635" actId="1076"/>
+        <pc:sldMkLst>
+          <pc:docMk/>
+          <pc:sldMk cId="3738375972" sldId="309"/>
+        </pc:sldMkLst>
+        <pc:spChg chg="mod">
+          <ac:chgData name="Ismaël Tuo" userId="fca7baf0e513a1e6" providerId="LiveId" clId="{0EB52ED8-BDDA-42B4-90C4-1B322ACD0F02}" dt="2024-02-20T14:07:19.777" v="23599" actId="20577"/>
+          <ac:spMkLst>
+            <pc:docMk/>
+            <pc:sldMk cId="3738375972" sldId="309"/>
+            <ac:spMk id="2" creationId="{90F4B3F9-2EEE-96F6-A03C-648C128FC0AD}"/>
+          </ac:spMkLst>
+        </pc:spChg>
+        <pc:spChg chg="mod">
+          <ac:chgData name="Ismaël Tuo" userId="fca7baf0e513a1e6" providerId="LiveId" clId="{0EB52ED8-BDDA-42B4-90C4-1B322ACD0F02}" dt="2024-02-20T14:10:20.501" v="23605" actId="1076"/>
+          <ac:spMkLst>
+            <pc:docMk/>
+            <pc:sldMk cId="3738375972" sldId="309"/>
+            <ac:spMk id="7" creationId="{FF49131C-778E-0C04-8D1A-F576A6DDE97B}"/>
+          </ac:spMkLst>
+        </pc:spChg>
+        <pc:spChg chg="add mod">
+          <ac:chgData name="Ismaël Tuo" userId="fca7baf0e513a1e6" providerId="LiveId" clId="{0EB52ED8-BDDA-42B4-90C4-1B322ACD0F02}" dt="2024-02-20T14:10:18.041" v="23604" actId="1076"/>
+          <ac:spMkLst>
+            <pc:docMk/>
+            <pc:sldMk cId="3738375972" sldId="309"/>
+            <ac:spMk id="8" creationId="{FA8A0F0E-D4E2-D496-6D58-CB291DAA0657}"/>
+          </ac:spMkLst>
+        </pc:spChg>
+        <pc:spChg chg="add mod">
+          <ac:chgData name="Ismaël Tuo" userId="fca7baf0e513a1e6" providerId="LiveId" clId="{0EB52ED8-BDDA-42B4-90C4-1B322ACD0F02}" dt="2024-02-20T14:10:16.120" v="23603" actId="1076"/>
+          <ac:spMkLst>
+            <pc:docMk/>
+            <pc:sldMk cId="3738375972" sldId="309"/>
+            <ac:spMk id="9" creationId="{70CADEEA-B8BD-4059-237C-DF5641FE8781}"/>
+          </ac:spMkLst>
+        </pc:spChg>
+        <pc:spChg chg="add mod">
+          <ac:chgData name="Ismaël Tuo" userId="fca7baf0e513a1e6" providerId="LiveId" clId="{0EB52ED8-BDDA-42B4-90C4-1B322ACD0F02}" dt="2024-02-20T14:10:08.245" v="23600" actId="1076"/>
+          <ac:spMkLst>
+            <pc:docMk/>
+            <pc:sldMk cId="3738375972" sldId="309"/>
+            <ac:spMk id="10" creationId="{0CC0C452-B14A-D713-32C0-4EEAE8D83C06}"/>
+          </ac:spMkLst>
+        </pc:spChg>
+        <pc:spChg chg="add mod">
+          <ac:chgData name="Ismaël Tuo" userId="fca7baf0e513a1e6" providerId="LiveId" clId="{0EB52ED8-BDDA-42B4-90C4-1B322ACD0F02}" dt="2024-02-20T14:10:38.576" v="23635" actId="1076"/>
+          <ac:spMkLst>
+            <pc:docMk/>
+            <pc:sldMk cId="3738375972" sldId="309"/>
+            <ac:spMk id="11" creationId="{67DB418B-C841-7310-7F9E-AD1A86E0D796}"/>
+          </ac:spMkLst>
+        </pc:spChg>
+      </pc:sldChg>
+      <pc:sldChg chg="add del">
+        <pc:chgData name="Ismaël Tuo" userId="fca7baf0e513a1e6" providerId="LiveId" clId="{0EB52ED8-BDDA-42B4-90C4-1B322ACD0F02}" dt="2024-02-20T13:51:48.861" v="23365" actId="2696"/>
+        <pc:sldMkLst>
+          <pc:docMk/>
+          <pc:sldMk cId="554849539" sldId="310"/>
+        </pc:sldMkLst>
       </pc:sldChg>
     </pc:docChg>
   </pc:docChgLst>
@@ -1914,7 +2161,7 @@
           <a:p>
             <a:fld id="{5D1B8971-FAD5-A544-A565-5C81831E2E08}" type="datetimeFigureOut">
               <a:rPr lang="fr-FR" smtClean="0"/>
-              <a:t>18/02/2024</a:t>
+              <a:t>20/02/2024</a:t>
             </a:fld>
             <a:endParaRPr lang="fr-FR"/>
           </a:p>
@@ -2344,7 +2591,7 @@
           <a:p>
             <a:fld id="{446AF453-C717-E044-9B61-C449088DBB9F}" type="datetime1">
               <a:rPr lang="fr-FR" smtClean="0"/>
-              <a:t>18/02/2024</a:t>
+              <a:t>20/02/2024</a:t>
             </a:fld>
             <a:endParaRPr lang="fr-FR"/>
           </a:p>
@@ -2518,7 +2765,7 @@
           <a:p>
             <a:fld id="{0AD74B8B-4B66-A54B-A7E1-EB9F6C09CE67}" type="datetime1">
               <a:rPr lang="fr-FR" smtClean="0"/>
-              <a:t>18/02/2024</a:t>
+              <a:t>20/02/2024</a:t>
             </a:fld>
             <a:endParaRPr lang="fr-FR"/>
           </a:p>
@@ -2702,7 +2949,7 @@
           <a:p>
             <a:fld id="{9584F9F2-42A0-CD42-8013-986AEAF97421}" type="datetime1">
               <a:rPr lang="fr-FR" smtClean="0"/>
-              <a:t>18/02/2024</a:t>
+              <a:t>20/02/2024</a:t>
             </a:fld>
             <a:endParaRPr lang="fr-FR"/>
           </a:p>
@@ -2876,7 +3123,7 @@
           <a:p>
             <a:fld id="{DAB9BD9F-3179-BB4C-96AB-C40862581685}" type="datetime1">
               <a:rPr lang="fr-FR" smtClean="0"/>
-              <a:t>18/02/2024</a:t>
+              <a:t>20/02/2024</a:t>
             </a:fld>
             <a:endParaRPr lang="fr-FR"/>
           </a:p>
@@ -3148,7 +3395,7 @@
           <a:p>
             <a:fld id="{A664DE96-64FF-BC43-8A9C-18ED43A528D6}" type="datetime1">
               <a:rPr lang="fr-FR" smtClean="0"/>
-              <a:t>18/02/2024</a:t>
+              <a:t>20/02/2024</a:t>
             </a:fld>
             <a:endParaRPr lang="fr-FR"/>
           </a:p>
@@ -3384,7 +3631,7 @@
           <a:p>
             <a:fld id="{2C8FE800-9F9B-1C4F-A1CD-9EF46842C4CA}" type="datetime1">
               <a:rPr lang="fr-FR" smtClean="0"/>
-              <a:t>18/02/2024</a:t>
+              <a:t>20/02/2024</a:t>
             </a:fld>
             <a:endParaRPr lang="fr-FR"/>
           </a:p>
@@ -3747,7 +3994,7 @@
           <a:p>
             <a:fld id="{0F7DED4E-8CB4-EF40-A349-EFC02EC7784E}" type="datetime1">
               <a:rPr lang="fr-FR" smtClean="0"/>
-              <a:t>18/02/2024</a:t>
+              <a:t>20/02/2024</a:t>
             </a:fld>
             <a:endParaRPr lang="fr-FR"/>
           </a:p>
@@ -3892,7 +4139,7 @@
           <a:p>
             <a:fld id="{5BB88D77-E8A2-E24F-81D2-817E60779F3E}" type="datetime1">
               <a:rPr lang="fr-FR" smtClean="0"/>
-              <a:t>18/02/2024</a:t>
+              <a:t>20/02/2024</a:t>
             </a:fld>
             <a:endParaRPr lang="fr-FR"/>
           </a:p>
@@ -3991,7 +4238,7 @@
           <a:p>
             <a:fld id="{817F964E-5B57-884A-A1B8-925BFA5276AF}" type="datetime1">
               <a:rPr lang="fr-FR" smtClean="0"/>
-              <a:t>18/02/2024</a:t>
+              <a:t>20/02/2024</a:t>
             </a:fld>
             <a:endParaRPr lang="fr-FR"/>
           </a:p>
@@ -4352,7 +4599,7 @@
           <a:p>
             <a:fld id="{D5636CD0-A2E6-1543-A0E5-C829C16FEE55}" type="datetime1">
               <a:rPr lang="fr-FR" smtClean="0"/>
-              <a:t>18/02/2024</a:t>
+              <a:t>20/02/2024</a:t>
             </a:fld>
             <a:endParaRPr lang="fr-FR"/>
           </a:p>
@@ -4713,7 +4960,7 @@
           <a:p>
             <a:fld id="{CEE5CE4A-5B1A-1846-BA66-722BDB7A9525}" type="datetime1">
               <a:rPr lang="fr-FR" smtClean="0"/>
-              <a:t>18/02/2024</a:t>
+              <a:t>20/02/2024</a:t>
             </a:fld>
             <a:endParaRPr lang="fr-FR"/>
           </a:p>
@@ -4960,7 +5207,7 @@
           <a:p>
             <a:fld id="{55A13D9C-CA6E-9C45-8634-4423EBFFD553}" type="datetime1">
               <a:rPr lang="fr-FR" smtClean="0"/>
-              <a:t>18/02/2024</a:t>
+              <a:t>20/02/2024</a:t>
             </a:fld>
             <a:endParaRPr lang="fr-FR"/>
           </a:p>
@@ -6236,7 +6483,7 @@
                 <a:latin typeface="Times New Roman" panose="02020603050405020304" pitchFamily="18" charset="0"/>
                 <a:cs typeface="Times New Roman" panose="02020603050405020304" pitchFamily="18" charset="0"/>
               </a:rPr>
-              <a:t>Une chaîne de caractères par définition est une séquence de caractères. Chaque caractère dans une chaîne de caractères est identifiée par une position appelée indice dont le premier est 0.</a:t>
+              <a:t>Une chaîne de caractères par définition est une séquence de caractères. Chaque caractère dans une chaîne de caractères est identifié par une position appelée indice dont le premier est 0.</a:t>
             </a:r>
           </a:p>
         </p:txBody>
@@ -7752,8 +7999,8 @@
           </p:sp>
         </p:grpSp>
       </p:grpSp>
-      <mc:AlternateContent xmlns:mc="http://schemas.openxmlformats.org/markup-compatibility/2006" xmlns:a14="http://schemas.microsoft.com/office/drawing/2010/main">
-        <mc:Choice Requires="a14">
+      <mc:AlternateContent xmlns:mc="http://schemas.openxmlformats.org/markup-compatibility/2006">
+        <mc:Choice xmlns:a14="http://schemas.microsoft.com/office/drawing/2010/main" Requires="a14">
           <p:sp>
             <p:nvSpPr>
               <p:cNvPr id="55" name="ZoneTexte 54">
@@ -7768,7 +8015,7 @@
             </p:nvSpPr>
             <p:spPr>
               <a:xfrm>
-                <a:off x="414824" y="3503590"/>
+                <a:off x="428128" y="3430574"/>
                 <a:ext cx="11178450" cy="707886"/>
               </a:xfrm>
               <a:prstGeom prst="rect">
@@ -7846,7 +8093,7 @@
             </p:txBody>
           </p:sp>
         </mc:Choice>
-        <mc:Fallback xmlns="">
+        <mc:Fallback>
           <p:sp>
             <p:nvSpPr>
               <p:cNvPr id="55" name="ZoneTexte 54">
@@ -7863,7 +8110,7 @@
             </p:nvSpPr>
             <p:spPr>
               <a:xfrm>
-                <a:off x="414824" y="3503590"/>
+                <a:off x="428128" y="3430574"/>
                 <a:ext cx="11178450" cy="707886"/>
               </a:xfrm>
               <a:prstGeom prst="rect">
@@ -8180,7 +8427,7 @@
                 <a:latin typeface="Times New Roman" panose="02020603050405020304" pitchFamily="18" charset="0"/>
                 <a:cs typeface="Times New Roman" panose="02020603050405020304" pitchFamily="18" charset="0"/>
               </a:rPr>
-              <a:t>Le caractère situé à l’indice -1 correspond au dernier caractère la chaine.</a:t>
+              <a:t>Le caractère situé à l’indice -1 correspond au dernier caractère de la chaine.</a:t>
             </a:r>
           </a:p>
           <a:p>
@@ -9918,7 +10165,7 @@
                 <a:latin typeface="Times New Roman" panose="02020603050405020304" pitchFamily="18" charset="0"/>
                 <a:cs typeface="Times New Roman" panose="02020603050405020304" pitchFamily="18" charset="0"/>
               </a:rPr>
-              <a:t>Dans l’extraction d’une chaine quand on spécifie un indice de fin celle-ci est toujours exclu soir l’intervalle [début, fin[.</a:t>
+              <a:t>Dans l’extraction d’une chaine quand on spécifie un indice de fin celui-ci est toujours exclu soit l’intervalle [début, fin[.</a:t>
             </a:r>
           </a:p>
         </p:txBody>
@@ -10158,14 +10405,14 @@
                 <a:latin typeface="Times New Roman" panose="02020603050405020304" pitchFamily="18" charset="0"/>
                 <a:cs typeface="Times New Roman" panose="02020603050405020304" pitchFamily="18" charset="0"/>
               </a:rPr>
-              <a:t>Chapitre 2 </a:t>
+              <a:t>Chapitre 2, </a:t>
             </a:r>
             <a:r>
               <a:rPr lang="fr-FR" sz="2000" dirty="0">
                 <a:latin typeface="Times New Roman" panose="02020603050405020304" pitchFamily="18" charset="0"/>
                 <a:cs typeface="Times New Roman" panose="02020603050405020304" pitchFamily="18" charset="0"/>
               </a:rPr>
-              <a:t>sur les variables sont de façon imagée des cases dans lesquelles Python va stocker des valeurs identifiées par une étiquette appelée nom de variable. </a:t>
+              <a:t>les variables sont de façon imagée des cases dans lesquelles Python va stocker des valeurs identifiées par une étiquette appelée nom de variable. </a:t>
             </a:r>
           </a:p>
         </p:txBody>
@@ -10256,7 +10503,7 @@
                 <a:latin typeface="Times New Roman" panose="02020603050405020304" pitchFamily="18" charset="0"/>
                 <a:cs typeface="Times New Roman" panose="02020603050405020304" pitchFamily="18" charset="0"/>
               </a:rPr>
-              <a:t>qui permet d’avoir l’identifiant de l’adresse mémoire ou la variable a été stockée. Cette valeur change à chaque exécution d’un programme.</a:t>
+              <a:t>qui permet d’avoir l’identifiant de l’adresse mémoire ou la variable a été stockée. Cette valeur change à chaque exécution du programme.</a:t>
             </a:r>
           </a:p>
         </p:txBody>
@@ -10308,19 +10555,8 @@
                 <a:latin typeface="Times New Roman" panose="02020603050405020304" pitchFamily="18" charset="0"/>
                 <a:cs typeface="Times New Roman" panose="02020603050405020304" pitchFamily="18" charset="0"/>
               </a:rPr>
-              <a:t> permettra d’avoir le numéro de la case ou est stockée la valeur </a:t>
-            </a:r>
-            <a:r>
-              <a:rPr lang="fr-FR" sz="2000">
-                <a:latin typeface="Times New Roman" panose="02020603050405020304" pitchFamily="18" charset="0"/>
-                <a:cs typeface="Times New Roman" panose="02020603050405020304" pitchFamily="18" charset="0"/>
-              </a:rPr>
-              <a:t>d’une variable.</a:t>
-            </a:r>
-            <a:endParaRPr lang="fr-FR" sz="2000" dirty="0">
-              <a:latin typeface="Times New Roman" panose="02020603050405020304" pitchFamily="18" charset="0"/>
-              <a:cs typeface="Times New Roman" panose="02020603050405020304" pitchFamily="18" charset="0"/>
-            </a:endParaRPr>
+              <a:t> permettra d’avoir le numéro de la case ou est stockée la valeur d’une variable.</a:t>
+            </a:r>
           </a:p>
         </p:txBody>
       </p:sp>
@@ -10448,8 +10684,8 @@
           </a:p>
         </p:txBody>
       </p:sp>
-      <mc:AlternateContent xmlns:mc="http://schemas.openxmlformats.org/markup-compatibility/2006">
-        <mc:Choice xmlns:a14="http://schemas.microsoft.com/office/drawing/2010/main" Requires="a14">
+      <mc:AlternateContent xmlns:mc="http://schemas.openxmlformats.org/markup-compatibility/2006" xmlns:a14="http://schemas.microsoft.com/office/drawing/2010/main">
+        <mc:Choice Requires="a14">
           <p:sp>
             <p:nvSpPr>
               <p:cNvPr id="6" name="ZoneTexte 5">
@@ -10504,7 +10740,7 @@
             </p:txBody>
           </p:sp>
         </mc:Choice>
-        <mc:Fallback>
+        <mc:Fallback xmlns="">
           <p:sp>
             <p:nvSpPr>
               <p:cNvPr id="6" name="ZoneTexte 5">
@@ -10564,7 +10800,7 @@
         <p:spPr>
           <a:xfrm>
             <a:off x="410603" y="787913"/>
-            <a:ext cx="11359108" cy="707886"/>
+            <a:ext cx="11485650" cy="707886"/>
           </a:xfrm>
           <a:prstGeom prst="rect">
             <a:avLst/>
@@ -10596,21 +10832,21 @@
                 <a:latin typeface="Times New Roman" panose="02020603050405020304" pitchFamily="18" charset="0"/>
                 <a:cs typeface="Times New Roman" panose="02020603050405020304" pitchFamily="18" charset="0"/>
               </a:rPr>
-              <a:t>ne renvoie pas tout le temps le même numéro de case par exemple quand on utilise la fonction </a:t>
+              <a:t>ne renvoie pas tout le temps le même numéro de case. Par exemple quand on utilise la fonction </a:t>
             </a:r>
             <a:r>
               <a:rPr lang="fr-FR" sz="2000" b="1" dirty="0">
                 <a:latin typeface="Times New Roman" panose="02020603050405020304" pitchFamily="18" charset="0"/>
                 <a:cs typeface="Times New Roman" panose="02020603050405020304" pitchFamily="18" charset="0"/>
               </a:rPr>
-              <a:t>Python </a:t>
+              <a:t>input, </a:t>
             </a:r>
             <a:r>
               <a:rPr lang="fr-FR" sz="2000" dirty="0">
                 <a:latin typeface="Times New Roman" panose="02020603050405020304" pitchFamily="18" charset="0"/>
                 <a:cs typeface="Times New Roman" panose="02020603050405020304" pitchFamily="18" charset="0"/>
               </a:rPr>
-              <a:t>utilise une case différente pour stocker la saisie de l’utilisateur. </a:t>
+              <a:t>la saisie de l’utilisateur est stockée dans une nouvelle case.</a:t>
             </a:r>
           </a:p>
         </p:txBody>
@@ -10668,8 +10904,8 @@
         </p:nvSpPr>
         <p:spPr>
           <a:xfrm>
-            <a:off x="397564" y="3835342"/>
-            <a:ext cx="11359108" cy="1015663"/>
+            <a:off x="397564" y="3900971"/>
+            <a:ext cx="11359108" cy="1323439"/>
           </a:xfrm>
           <a:prstGeom prst="rect">
             <a:avLst/>
@@ -10701,7 +10937,7 @@
                 <a:latin typeface="Times New Roman" panose="02020603050405020304" pitchFamily="18" charset="0"/>
                 <a:cs typeface="Times New Roman" panose="02020603050405020304" pitchFamily="18" charset="0"/>
               </a:rPr>
-              <a:t>renvoyait la même valeur parce les variables contiennent les mêmes valeurs or dans le cas d’input on ne sait pas ce que va fournir l’utilisateur si cette valeur existe ou non sauf si on convertit et qu’on a la même valeur qu’une déjà stockée.</a:t>
+              <a:t>renvoyait la même valeur parce les variables contiennent les mêmes valeurs or dans le cas d’input on ne sait pas ce que va fournir l’utilisateur et si la valeur qu’il va saisir existe ou non. Après saisie de l’utilisateur si on convertit et qu’on a la même valeur qu’une déjà stockée, l’identifiant devient celui de la valeur actuellement stockée.</a:t>
             </a:r>
           </a:p>
         </p:txBody>
@@ -10750,7 +10986,7 @@
         </p:nvSpPr>
         <p:spPr>
           <a:xfrm>
-            <a:off x="397564" y="5008258"/>
+            <a:off x="397564" y="5319618"/>
             <a:ext cx="11794436" cy="707886"/>
           </a:xfrm>
           <a:prstGeom prst="rect">
@@ -10868,8 +11104,8 @@
           </a:p>
         </p:txBody>
       </p:sp>
-      <mc:AlternateContent xmlns:mc="http://schemas.openxmlformats.org/markup-compatibility/2006">
-        <mc:Choice xmlns:a14="http://schemas.microsoft.com/office/drawing/2010/main" Requires="a14">
+      <mc:AlternateContent xmlns:mc="http://schemas.openxmlformats.org/markup-compatibility/2006" xmlns:a14="http://schemas.microsoft.com/office/drawing/2010/main">
+        <mc:Choice Requires="a14">
           <p:sp>
             <p:nvSpPr>
               <p:cNvPr id="6" name="ZoneTexte 5">
@@ -10924,7 +11160,7 @@
             </p:txBody>
           </p:sp>
         </mc:Choice>
-        <mc:Fallback>
+        <mc:Fallback xmlns="">
           <p:sp>
             <p:nvSpPr>
               <p:cNvPr id="6" name="ZoneTexte 5">
@@ -11022,7 +11258,7 @@
                     <a:latin typeface="Times New Roman" panose="02020603050405020304" pitchFamily="18" charset="0"/>
                     <a:cs typeface="Times New Roman" panose="02020603050405020304" pitchFamily="18" charset="0"/>
                   </a:rPr>
-                  <a:t> ne mute pas à une nouveau id comme c’est le cas pour les entiers.</a:t>
+                  <a:t> ne mute pas à un nouveau id comme c’est le cas pour les entiers.</a:t>
                 </a:r>
               </a:p>
             </p:txBody>
@@ -11703,8 +11939,8 @@
           </a:p>
         </p:txBody>
       </p:sp>
-      <mc:AlternateContent xmlns:mc="http://schemas.openxmlformats.org/markup-compatibility/2006">
-        <mc:Choice xmlns:a14="http://schemas.microsoft.com/office/drawing/2010/main" Requires="a14">
+      <mc:AlternateContent xmlns:mc="http://schemas.openxmlformats.org/markup-compatibility/2006" xmlns:a14="http://schemas.microsoft.com/office/drawing/2010/main">
+        <mc:Choice Requires="a14">
           <p:sp>
             <p:nvSpPr>
               <p:cNvPr id="8" name="ZoneTexte 7">
@@ -12050,7 +12286,7 @@
             </p:txBody>
           </p:sp>
         </mc:Choice>
-        <mc:Fallback>
+        <mc:Fallback xmlns="">
           <p:sp>
             <p:nvSpPr>
               <p:cNvPr id="8" name="ZoneTexte 7">
@@ -12688,8 +12924,8 @@
           </a:p>
         </p:txBody>
       </p:sp>
-      <mc:AlternateContent xmlns:mc="http://schemas.openxmlformats.org/markup-compatibility/2006">
-        <mc:Choice xmlns:a14="http://schemas.microsoft.com/office/drawing/2010/main" Requires="a14">
+      <mc:AlternateContent xmlns:mc="http://schemas.openxmlformats.org/markup-compatibility/2006" xmlns:a14="http://schemas.microsoft.com/office/drawing/2010/main">
+        <mc:Choice Requires="a14">
           <p:sp>
             <p:nvSpPr>
               <p:cNvPr id="6" name="ZoneTexte 5">
@@ -12783,7 +13019,7 @@
             </p:txBody>
           </p:sp>
         </mc:Choice>
-        <mc:Fallback>
+        <mc:Fallback xmlns="">
           <p:sp>
             <p:nvSpPr>
               <p:cNvPr id="6" name="ZoneTexte 5">
@@ -13004,7 +13240,7 @@
                     <a:latin typeface="Times New Roman" panose="02020603050405020304" pitchFamily="18" charset="0"/>
                     <a:cs typeface="Times New Roman" panose="02020603050405020304" pitchFamily="18" charset="0"/>
                   </a:rPr>
-                  <a:t> sera Faux car même si on la même valeur les types sont différent.</a:t>
+                  <a:t> sera Faux car même s’ils ont la même valeur les types sont différent.</a:t>
                 </a:r>
               </a:p>
             </p:txBody>
@@ -13036,7 +13272,7 @@
               <a:blipFill>
                 <a:blip r:embed="rId5"/>
                 <a:stretch>
-                  <a:fillRect l="-545" t="-2994" b="-9581"/>
+                  <a:fillRect l="-545" t="-2994" r="-1091" b="-9581"/>
                 </a:stretch>
               </a:blipFill>
             </p:spPr>
@@ -13181,48 +13417,6 @@
           </a:p>
         </p:txBody>
       </p:sp>
-      <p:sp>
-        <p:nvSpPr>
-          <p:cNvPr id="11" name="ZoneTexte 10">
-            <a:extLst>
-              <a:ext uri="{FF2B5EF4-FFF2-40B4-BE49-F238E27FC236}">
-                <a16:creationId xmlns:a16="http://schemas.microsoft.com/office/drawing/2014/main" id="{C27A3656-3CB0-8161-AE9F-B92FBE4F5083}"/>
-              </a:ext>
-            </a:extLst>
-          </p:cNvPr>
-          <p:cNvSpPr txBox="1"/>
-          <p:nvPr/>
-        </p:nvSpPr>
-        <p:spPr>
-          <a:xfrm>
-            <a:off x="500932" y="941801"/>
-            <a:ext cx="9192515" cy="400110"/>
-          </a:xfrm>
-          <a:prstGeom prst="rect">
-            <a:avLst/>
-          </a:prstGeom>
-          <a:noFill/>
-        </p:spPr>
-        <p:txBody>
-          <a:bodyPr wrap="square" rtlCol="0">
-            <a:spAutoFit/>
-          </a:bodyPr>
-          <a:lstStyle/>
-          <a:p>
-            <a:pPr marL="342900" indent="-342900">
-              <a:buFont typeface="+mj-lt"/>
-              <a:buAutoNum type="arabicPeriod"/>
-            </a:pPr>
-            <a:r>
-              <a:rPr lang="fr-FR" sz="2000" dirty="0">
-                <a:latin typeface="Times New Roman" panose="02020603050405020304" pitchFamily="18" charset="0"/>
-                <a:cs typeface="Times New Roman" panose="02020603050405020304" pitchFamily="18" charset="0"/>
-              </a:rPr>
-              <a:t>XXX</a:t>
-            </a:r>
-          </a:p>
-        </p:txBody>
-      </p:sp>
       <p:cxnSp>
         <p:nvCxnSpPr>
           <p:cNvPr id="3" name="Connecteur droit 2">
@@ -13262,6 +13456,218 @@
           </a:fontRef>
         </p:style>
       </p:cxnSp>
+      <p:sp>
+        <p:nvSpPr>
+          <p:cNvPr id="2" name="ZoneTexte 1">
+            <a:extLst>
+              <a:ext uri="{FF2B5EF4-FFF2-40B4-BE49-F238E27FC236}">
+                <a16:creationId xmlns:a16="http://schemas.microsoft.com/office/drawing/2014/main" id="{598CC1F4-92B5-97D6-5630-8A3701211AA4}"/>
+              </a:ext>
+            </a:extLst>
+          </p:cNvPr>
+          <p:cNvSpPr txBox="1"/>
+          <p:nvPr/>
+        </p:nvSpPr>
+        <p:spPr>
+          <a:xfrm>
+            <a:off x="397564" y="711780"/>
+            <a:ext cx="11569148" cy="400110"/>
+          </a:xfrm>
+          <a:prstGeom prst="rect">
+            <a:avLst/>
+          </a:prstGeom>
+          <a:noFill/>
+        </p:spPr>
+        <p:txBody>
+          <a:bodyPr wrap="square" rtlCol="0">
+            <a:spAutoFit/>
+          </a:bodyPr>
+          <a:lstStyle/>
+          <a:p>
+            <a:r>
+              <a:rPr lang="fr-FR" sz="2000" b="1" u="sng" dirty="0">
+                <a:latin typeface="Times New Roman" panose="02020603050405020304" pitchFamily="18" charset="0"/>
+                <a:cs typeface="Times New Roman" panose="02020603050405020304" pitchFamily="18" charset="0"/>
+              </a:rPr>
+              <a:t>Exercice 1</a:t>
+            </a:r>
+          </a:p>
+        </p:txBody>
+      </p:sp>
+      <p:sp>
+        <p:nvSpPr>
+          <p:cNvPr id="7" name="ZoneTexte 6">
+            <a:extLst>
+              <a:ext uri="{FF2B5EF4-FFF2-40B4-BE49-F238E27FC236}">
+                <a16:creationId xmlns:a16="http://schemas.microsoft.com/office/drawing/2014/main" id="{990321CC-02EF-ED64-0AA9-789ED60F60B1}"/>
+              </a:ext>
+            </a:extLst>
+          </p:cNvPr>
+          <p:cNvSpPr txBox="1"/>
+          <p:nvPr/>
+        </p:nvSpPr>
+        <p:spPr>
+          <a:xfrm>
+            <a:off x="397564" y="1090885"/>
+            <a:ext cx="11088982" cy="2554545"/>
+          </a:xfrm>
+          <a:prstGeom prst="rect">
+            <a:avLst/>
+          </a:prstGeom>
+          <a:noFill/>
+        </p:spPr>
+        <p:txBody>
+          <a:bodyPr wrap="square" rtlCol="0">
+            <a:spAutoFit/>
+          </a:bodyPr>
+          <a:lstStyle>
+            <a:defPPr>
+              <a:defRPr lang="en-US"/>
+            </a:defPPr>
+            <a:lvl1pPr>
+              <a:defRPr sz="2000"/>
+            </a:lvl1pPr>
+          </a:lstStyle>
+          <a:p>
+            <a:r>
+              <a:rPr lang="fr-FR" dirty="0">
+                <a:latin typeface="Times New Roman" panose="02020603050405020304" pitchFamily="18" charset="0"/>
+                <a:cs typeface="Times New Roman" panose="02020603050405020304" pitchFamily="18" charset="0"/>
+              </a:rPr>
+              <a:t>Soit un utilisateur dont le nom d’utilisateur est « Christophe » et son mot de passe « chris1234 ».</a:t>
+            </a:r>
+          </a:p>
+          <a:p>
+            <a:r>
+              <a:rPr lang="fr-FR" dirty="0">
+                <a:latin typeface="Times New Roman" panose="02020603050405020304" pitchFamily="18" charset="0"/>
+                <a:cs typeface="Times New Roman" panose="02020603050405020304" pitchFamily="18" charset="0"/>
+              </a:rPr>
+              <a:t>Ecrire un programme qui demande à l’utilisateur son nom d’utilisateur et son mot de passe, le programme doit afficher « Nom d’utilisateur et/ou mot de passe incorrect(s) ». Si l’une des deux valeurs est incorrecte sinon afficher « Bienvenue Christophe ! ».</a:t>
+            </a:r>
+          </a:p>
+          <a:p>
+            <a:r>
+              <a:rPr lang="fr-FR" dirty="0">
+                <a:latin typeface="Times New Roman" panose="02020603050405020304" pitchFamily="18" charset="0"/>
+                <a:cs typeface="Times New Roman" panose="02020603050405020304" pitchFamily="18" charset="0"/>
+              </a:rPr>
+              <a:t>Une condition à respecter est d’appliquer l’égalité stricte sur le mot de passe pas sur le nom d’utilisateur c’est-à-dire si l’utilisateur écrit « </a:t>
+            </a:r>
+            <a:r>
+              <a:rPr lang="fr-FR" dirty="0" err="1">
+                <a:latin typeface="Times New Roman" panose="02020603050405020304" pitchFamily="18" charset="0"/>
+                <a:cs typeface="Times New Roman" panose="02020603050405020304" pitchFamily="18" charset="0"/>
+              </a:rPr>
+              <a:t>christophe</a:t>
+            </a:r>
+            <a:r>
+              <a:rPr lang="fr-FR" dirty="0">
+                <a:latin typeface="Times New Roman" panose="02020603050405020304" pitchFamily="18" charset="0"/>
+                <a:cs typeface="Times New Roman" panose="02020603050405020304" pitchFamily="18" charset="0"/>
+              </a:rPr>
+              <a:t> », « </a:t>
+            </a:r>
+            <a:r>
+              <a:rPr lang="fr-FR" dirty="0" err="1">
+                <a:latin typeface="Times New Roman" panose="02020603050405020304" pitchFamily="18" charset="0"/>
+                <a:cs typeface="Times New Roman" panose="02020603050405020304" pitchFamily="18" charset="0"/>
+              </a:rPr>
+              <a:t>cHristophe</a:t>
+            </a:r>
+            <a:r>
+              <a:rPr lang="fr-FR" dirty="0">
+                <a:latin typeface="Times New Roman" panose="02020603050405020304" pitchFamily="18" charset="0"/>
+                <a:cs typeface="Times New Roman" panose="02020603050405020304" pitchFamily="18" charset="0"/>
+              </a:rPr>
+              <a:t> »… ou le nom d’utilisateur avec des espaces en début ou fin tant que le mot de passe est correct il doit être accepté. Ne pas appliquer la différence entre majuscule et minuscule sur le nom d’utilisateur.</a:t>
+            </a:r>
+          </a:p>
+        </p:txBody>
+      </p:sp>
+      <p:sp>
+        <p:nvSpPr>
+          <p:cNvPr id="8" name="ZoneTexte 7">
+            <a:extLst>
+              <a:ext uri="{FF2B5EF4-FFF2-40B4-BE49-F238E27FC236}">
+                <a16:creationId xmlns:a16="http://schemas.microsoft.com/office/drawing/2014/main" id="{11F94C81-3D20-9C49-9F89-80AF942FFD56}"/>
+              </a:ext>
+            </a:extLst>
+          </p:cNvPr>
+          <p:cNvSpPr txBox="1"/>
+          <p:nvPr/>
+        </p:nvSpPr>
+        <p:spPr>
+          <a:xfrm>
+            <a:off x="397564" y="3645430"/>
+            <a:ext cx="11569148" cy="400110"/>
+          </a:xfrm>
+          <a:prstGeom prst="rect">
+            <a:avLst/>
+          </a:prstGeom>
+          <a:noFill/>
+        </p:spPr>
+        <p:txBody>
+          <a:bodyPr wrap="square" rtlCol="0">
+            <a:spAutoFit/>
+          </a:bodyPr>
+          <a:lstStyle/>
+          <a:p>
+            <a:r>
+              <a:rPr lang="fr-FR" sz="2000" b="1" u="sng" dirty="0">
+                <a:latin typeface="Times New Roman" panose="02020603050405020304" pitchFamily="18" charset="0"/>
+                <a:cs typeface="Times New Roman" panose="02020603050405020304" pitchFamily="18" charset="0"/>
+              </a:rPr>
+              <a:t>Exercice 2</a:t>
+            </a:r>
+          </a:p>
+        </p:txBody>
+      </p:sp>
+      <p:sp>
+        <p:nvSpPr>
+          <p:cNvPr id="9" name="ZoneTexte 8">
+            <a:extLst>
+              <a:ext uri="{FF2B5EF4-FFF2-40B4-BE49-F238E27FC236}">
+                <a16:creationId xmlns:a16="http://schemas.microsoft.com/office/drawing/2014/main" id="{A5FB77B6-2F17-50F4-1633-E3FA7FF11FCC}"/>
+              </a:ext>
+            </a:extLst>
+          </p:cNvPr>
+          <p:cNvSpPr txBox="1"/>
+          <p:nvPr/>
+        </p:nvSpPr>
+        <p:spPr>
+          <a:xfrm>
+            <a:off x="500932" y="4045540"/>
+            <a:ext cx="11088982" cy="1631216"/>
+          </a:xfrm>
+          <a:prstGeom prst="rect">
+            <a:avLst/>
+          </a:prstGeom>
+          <a:noFill/>
+        </p:spPr>
+        <p:txBody>
+          <a:bodyPr wrap="square" rtlCol="0">
+            <a:spAutoFit/>
+          </a:bodyPr>
+          <a:lstStyle>
+            <a:defPPr>
+              <a:defRPr lang="en-US"/>
+            </a:defPPr>
+            <a:lvl1pPr>
+              <a:defRPr sz="2000"/>
+            </a:lvl1pPr>
+          </a:lstStyle>
+          <a:p>
+            <a:r>
+              <a:rPr lang="fr-FR" dirty="0">
+                <a:latin typeface="Times New Roman" panose="02020603050405020304" pitchFamily="18" charset="0"/>
+                <a:cs typeface="Times New Roman" panose="02020603050405020304" pitchFamily="18" charset="0"/>
+              </a:rPr>
+              <a:t>Ecrire un programme qui demande un mot à l’utilisateur, ensuite le programme doit afficher le pluriel du mot. Par exemple ajouter « s » si le mot est du type « chat », pour les mots se terminant par « s » comme « souris » ne pas mettre au pluriel afficher le mot tel quel, si le mot se termine par « al » le pluriel deviendra « aux » comme « Cheval » qui donnera « Chevaux ». On ne tiendra pas compte des exceptions des pluriels de la langue française. Mettre le code qui va renvoyer le pluriel dans une fonction.</a:t>
+            </a:r>
+          </a:p>
+        </p:txBody>
+      </p:sp>
     </p:spTree>
     <p:extLst>
       <p:ext uri="{BB962C8B-B14F-4D97-AF65-F5344CB8AC3E}">
@@ -13276,6 +13682,2256 @@
 </file>
 
 <file path=ppt/slides/slide22.xml><?xml version="1.0" encoding="utf-8"?>
+<p:sld xmlns:a="http://schemas.openxmlformats.org/drawingml/2006/main" xmlns:r="http://schemas.openxmlformats.org/officeDocument/2006/relationships" xmlns:p="http://schemas.openxmlformats.org/presentationml/2006/main">
+  <p:cSld>
+    <p:spTree>
+      <p:nvGrpSpPr>
+        <p:cNvPr id="1" name="">
+          <a:extLst>
+            <a:ext uri="{FF2B5EF4-FFF2-40B4-BE49-F238E27FC236}">
+              <a16:creationId xmlns:a16="http://schemas.microsoft.com/office/drawing/2014/main" id="{5AEE6306-E632-FBA8-B204-BCB8AE6AA3D4}"/>
+            </a:ext>
+          </a:extLst>
+        </p:cNvPr>
+        <p:cNvGrpSpPr/>
+        <p:nvPr/>
+      </p:nvGrpSpPr>
+      <p:grpSpPr>
+        <a:xfrm>
+          <a:off x="0" y="0"/>
+          <a:ext cx="0" cy="0"/>
+          <a:chOff x="0" y="0"/>
+          <a:chExt cx="0" cy="0"/>
+        </a:xfrm>
+      </p:grpSpPr>
+      <p:sp>
+        <p:nvSpPr>
+          <p:cNvPr id="4" name="Espace réservé du pied de page 3">
+            <a:extLst>
+              <a:ext uri="{FF2B5EF4-FFF2-40B4-BE49-F238E27FC236}">
+                <a16:creationId xmlns:a16="http://schemas.microsoft.com/office/drawing/2014/main" id="{A0E725D8-EB0F-DF5F-3572-E2F5168E4C2A}"/>
+              </a:ext>
+            </a:extLst>
+          </p:cNvPr>
+          <p:cNvSpPr>
+            <a:spLocks noGrp="1"/>
+          </p:cNvSpPr>
+          <p:nvPr>
+            <p:ph type="ftr" sz="quarter" idx="11"/>
+          </p:nvPr>
+        </p:nvSpPr>
+        <p:spPr/>
+        <p:txBody>
+          <a:bodyPr/>
+          <a:lstStyle/>
+          <a:p>
+            <a:r>
+              <a:rPr lang="fr-FR"/>
+              <a:t>Cours: Python | Auteur: TUO N. Ismaël Maurice 
+</a:t>
+            </a:r>
+          </a:p>
+        </p:txBody>
+      </p:sp>
+      <p:sp>
+        <p:nvSpPr>
+          <p:cNvPr id="5" name="Espace réservé du numéro de diapositive 4">
+            <a:extLst>
+              <a:ext uri="{FF2B5EF4-FFF2-40B4-BE49-F238E27FC236}">
+                <a16:creationId xmlns:a16="http://schemas.microsoft.com/office/drawing/2014/main" id="{7FA03DC5-5ADA-C2E0-5072-F9289B3FBE70}"/>
+              </a:ext>
+            </a:extLst>
+          </p:cNvPr>
+          <p:cNvSpPr>
+            <a:spLocks noGrp="1"/>
+          </p:cNvSpPr>
+          <p:nvPr>
+            <p:ph type="sldNum" sz="quarter" idx="12"/>
+          </p:nvPr>
+        </p:nvSpPr>
+        <p:spPr/>
+        <p:txBody>
+          <a:bodyPr/>
+          <a:lstStyle/>
+          <a:p>
+            <a:fld id="{B8C3BB88-DD29-4D42-B62E-D7D541DB4348}" type="slidenum">
+              <a:rPr lang="fr-FR" smtClean="0"/>
+              <a:t>22</a:t>
+            </a:fld>
+            <a:endParaRPr lang="fr-FR"/>
+          </a:p>
+        </p:txBody>
+      </p:sp>
+      <p:sp>
+        <p:nvSpPr>
+          <p:cNvPr id="6" name="ZoneTexte 5">
+            <a:extLst>
+              <a:ext uri="{FF2B5EF4-FFF2-40B4-BE49-F238E27FC236}">
+                <a16:creationId xmlns:a16="http://schemas.microsoft.com/office/drawing/2014/main" id="{86D0F3C7-1B77-E4AD-7EC3-EF183B64EC9D}"/>
+              </a:ext>
+            </a:extLst>
+          </p:cNvPr>
+          <p:cNvSpPr txBox="1"/>
+          <p:nvPr/>
+        </p:nvSpPr>
+        <p:spPr>
+          <a:xfrm>
+            <a:off x="397564" y="218526"/>
+            <a:ext cx="5795005" cy="461665"/>
+          </a:xfrm>
+          <a:prstGeom prst="rect">
+            <a:avLst/>
+          </a:prstGeom>
+          <a:noFill/>
+        </p:spPr>
+        <p:txBody>
+          <a:bodyPr wrap="square" rtlCol="0">
+            <a:spAutoFit/>
+          </a:bodyPr>
+          <a:lstStyle/>
+          <a:p>
+            <a:r>
+              <a:rPr lang="fr-FR" sz="2400" b="1" dirty="0">
+                <a:latin typeface="Times New Roman" panose="02020603050405020304" pitchFamily="18" charset="0"/>
+                <a:cs typeface="Times New Roman" panose="02020603050405020304" pitchFamily="18" charset="0"/>
+              </a:rPr>
+              <a:t>Exercices</a:t>
+            </a:r>
+          </a:p>
+        </p:txBody>
+      </p:sp>
+      <p:cxnSp>
+        <p:nvCxnSpPr>
+          <p:cNvPr id="3" name="Connecteur droit 2">
+            <a:extLst>
+              <a:ext uri="{FF2B5EF4-FFF2-40B4-BE49-F238E27FC236}">
+                <a16:creationId xmlns:a16="http://schemas.microsoft.com/office/drawing/2014/main" id="{270E7E7C-3107-0766-F498-749A239909AA}"/>
+              </a:ext>
+            </a:extLst>
+          </p:cNvPr>
+          <p:cNvCxnSpPr>
+            <a:cxnSpLocks/>
+          </p:cNvCxnSpPr>
+          <p:nvPr/>
+        </p:nvCxnSpPr>
+        <p:spPr>
+          <a:xfrm>
+            <a:off x="500932" y="680191"/>
+            <a:ext cx="11178450" cy="0"/>
+          </a:xfrm>
+          <a:prstGeom prst="line">
+            <a:avLst/>
+          </a:prstGeom>
+          <a:ln/>
+        </p:spPr>
+        <p:style>
+          <a:lnRef idx="3">
+            <a:schemeClr val="accent3"/>
+          </a:lnRef>
+          <a:fillRef idx="0">
+            <a:schemeClr val="accent3"/>
+          </a:fillRef>
+          <a:effectRef idx="2">
+            <a:schemeClr val="accent3"/>
+          </a:effectRef>
+          <a:fontRef idx="minor">
+            <a:schemeClr val="tx1"/>
+          </a:fontRef>
+        </p:style>
+      </p:cxnSp>
+      <p:sp>
+        <p:nvSpPr>
+          <p:cNvPr id="2" name="ZoneTexte 1">
+            <a:extLst>
+              <a:ext uri="{FF2B5EF4-FFF2-40B4-BE49-F238E27FC236}">
+                <a16:creationId xmlns:a16="http://schemas.microsoft.com/office/drawing/2014/main" id="{3A137C0E-2596-CB3B-D0FC-1CDF1F2757F4}"/>
+              </a:ext>
+            </a:extLst>
+          </p:cNvPr>
+          <p:cNvSpPr txBox="1"/>
+          <p:nvPr/>
+        </p:nvSpPr>
+        <p:spPr>
+          <a:xfrm>
+            <a:off x="397565" y="859559"/>
+            <a:ext cx="11569148" cy="400110"/>
+          </a:xfrm>
+          <a:prstGeom prst="rect">
+            <a:avLst/>
+          </a:prstGeom>
+          <a:noFill/>
+        </p:spPr>
+        <p:txBody>
+          <a:bodyPr wrap="square" rtlCol="0">
+            <a:spAutoFit/>
+          </a:bodyPr>
+          <a:lstStyle/>
+          <a:p>
+            <a:r>
+              <a:rPr lang="fr-FR" sz="2000" b="1" u="sng" dirty="0">
+                <a:latin typeface="Times New Roman" panose="02020603050405020304" pitchFamily="18" charset="0"/>
+                <a:cs typeface="Times New Roman" panose="02020603050405020304" pitchFamily="18" charset="0"/>
+              </a:rPr>
+              <a:t>Exercice 3</a:t>
+            </a:r>
+          </a:p>
+        </p:txBody>
+      </p:sp>
+      <mc:AlternateContent xmlns:mc="http://schemas.openxmlformats.org/markup-compatibility/2006">
+        <mc:Choice xmlns:a14="http://schemas.microsoft.com/office/drawing/2010/main" Requires="a14">
+          <p:sp>
+            <p:nvSpPr>
+              <p:cNvPr id="7" name="ZoneTexte 6">
+                <a:extLst>
+                  <a:ext uri="{FF2B5EF4-FFF2-40B4-BE49-F238E27FC236}">
+                    <a16:creationId xmlns:a16="http://schemas.microsoft.com/office/drawing/2014/main" id="{FDEB7C40-EA75-EDD3-D51E-186545746147}"/>
+                  </a:ext>
+                </a:extLst>
+              </p:cNvPr>
+              <p:cNvSpPr txBox="1"/>
+              <p:nvPr/>
+            </p:nvSpPr>
+            <p:spPr>
+              <a:xfrm>
+                <a:off x="397564" y="1354297"/>
+                <a:ext cx="11088982" cy="4149406"/>
+              </a:xfrm>
+              <a:prstGeom prst="rect">
+                <a:avLst/>
+              </a:prstGeom>
+              <a:noFill/>
+            </p:spPr>
+            <p:txBody>
+              <a:bodyPr wrap="square" rtlCol="0">
+                <a:spAutoFit/>
+              </a:bodyPr>
+              <a:lstStyle>
+                <a:defPPr>
+                  <a:defRPr lang="en-US"/>
+                </a:defPPr>
+                <a:lvl1pPr>
+                  <a:defRPr sz="2000"/>
+                </a:lvl1pPr>
+              </a:lstStyle>
+              <a:p>
+                <a:r>
+                  <a:rPr lang="fr-FR" dirty="0">
+                    <a:latin typeface="Times New Roman" panose="02020603050405020304" pitchFamily="18" charset="0"/>
+                    <a:cs typeface="Times New Roman" panose="02020603050405020304" pitchFamily="18" charset="0"/>
+                  </a:rPr>
+                  <a:t>La distance de </a:t>
+                </a:r>
+                <a:r>
+                  <a:rPr lang="fr-FR" dirty="0" err="1">
+                    <a:latin typeface="Times New Roman" panose="02020603050405020304" pitchFamily="18" charset="0"/>
+                    <a:cs typeface="Times New Roman" panose="02020603050405020304" pitchFamily="18" charset="0"/>
+                  </a:rPr>
+                  <a:t>Hamming</a:t>
+                </a:r>
+                <a:r>
+                  <a:rPr lang="fr-FR" dirty="0">
+                    <a:latin typeface="Times New Roman" panose="02020603050405020304" pitchFamily="18" charset="0"/>
+                    <a:cs typeface="Times New Roman" panose="02020603050405020304" pitchFamily="18" charset="0"/>
+                  </a:rPr>
+                  <a:t> entre deux mots de même longueur est le nombre d’endroits où les lettres sont différentes.</a:t>
+                </a:r>
+              </a:p>
+              <a:p>
+                <a:r>
+                  <a:rPr lang="fr-FR" dirty="0">
+                    <a:latin typeface="Times New Roman" panose="02020603050405020304" pitchFamily="18" charset="0"/>
+                    <a:cs typeface="Times New Roman" panose="02020603050405020304" pitchFamily="18" charset="0"/>
+                  </a:rPr>
+                  <a:t>Par exemple:</a:t>
+                </a:r>
+              </a:p>
+              <a:p>
+                <a:pPr/>
+                <a14:m>
+                  <m:oMathPara xmlns:m="http://schemas.openxmlformats.org/officeDocument/2006/math">
+                    <m:oMathParaPr>
+                      <m:jc m:val="centerGroup"/>
+                    </m:oMathParaPr>
+                    <m:oMath xmlns:m="http://schemas.openxmlformats.org/officeDocument/2006/math">
+                      <m:sPre>
+                        <m:sPrePr>
+                          <m:ctrlPr>
+                            <a:rPr lang="fr-FR" i="1" smtClean="0">
+                              <a:effectLst/>
+                              <a:latin typeface="Cambria Math" panose="02040503050406030204" pitchFamily="18" charset="0"/>
+                            </a:rPr>
+                          </m:ctrlPr>
+                        </m:sPrePr>
+                        <m:sub>
+                          <m:r>
+                            <a:rPr lang="fr-FR" sz="2000" i="1">
+                              <a:solidFill>
+                                <a:srgbClr val="FF0000"/>
+                              </a:solidFill>
+                              <a:effectLst/>
+                              <a:latin typeface="Cambria Math" panose="02040503050406030204" pitchFamily="18" charset="0"/>
+                              <a:ea typeface="Calibri" panose="020F0502020204030204" pitchFamily="34" charset="0"/>
+                              <a:cs typeface="Times New Roman" panose="02020603050405020304" pitchFamily="18" charset="0"/>
+                            </a:rPr>
+                            <m:t>𝑆</m:t>
+                          </m:r>
+                          <m:r>
+                            <a:rPr lang="fr-FR" sz="2000" i="1">
+                              <a:effectLst/>
+                              <a:latin typeface="Cambria Math" panose="02040503050406030204" pitchFamily="18" charset="0"/>
+                              <a:ea typeface="Calibri" panose="020F0502020204030204" pitchFamily="34" charset="0"/>
+                              <a:cs typeface="Times New Roman" panose="02020603050405020304" pitchFamily="18" charset="0"/>
+                            </a:rPr>
+                            <m:t>𝐴</m:t>
+                          </m:r>
+                          <m:r>
+                            <a:rPr lang="fr-FR" sz="2000" i="1">
+                              <a:solidFill>
+                                <a:srgbClr val="FF0000"/>
+                              </a:solidFill>
+                              <a:effectLst/>
+                              <a:latin typeface="Cambria Math" panose="02040503050406030204" pitchFamily="18" charset="0"/>
+                              <a:ea typeface="Calibri" panose="020F0502020204030204" pitchFamily="34" charset="0"/>
+                              <a:cs typeface="Times New Roman" panose="02020603050405020304" pitchFamily="18" charset="0"/>
+                            </a:rPr>
+                            <m:t>𝑉</m:t>
+                          </m:r>
+                          <m:r>
+                            <a:rPr lang="fr-FR" sz="2000" i="1">
+                              <a:effectLst/>
+                              <a:latin typeface="Cambria Math" panose="02040503050406030204" pitchFamily="18" charset="0"/>
+                              <a:ea typeface="Calibri" panose="020F0502020204030204" pitchFamily="34" charset="0"/>
+                              <a:cs typeface="Times New Roman" panose="02020603050405020304" pitchFamily="18" charset="0"/>
+                            </a:rPr>
+                            <m:t>𝑂𝑁</m:t>
+                          </m:r>
+                        </m:sub>
+                        <m:sup>
+                          <m:r>
+                            <a:rPr lang="fr-FR" sz="2000" i="1">
+                              <a:solidFill>
+                                <a:srgbClr val="FF0000"/>
+                              </a:solidFill>
+                              <a:effectLst/>
+                              <a:latin typeface="Cambria Math" panose="02040503050406030204" pitchFamily="18" charset="0"/>
+                              <a:ea typeface="Calibri" panose="020F0502020204030204" pitchFamily="34" charset="0"/>
+                              <a:cs typeface="Times New Roman" panose="02020603050405020304" pitchFamily="18" charset="0"/>
+                            </a:rPr>
+                            <m:t>𝐽</m:t>
+                          </m:r>
+                          <m:r>
+                            <a:rPr lang="fr-FR" sz="2000" i="1">
+                              <a:effectLst/>
+                              <a:latin typeface="Cambria Math" panose="02040503050406030204" pitchFamily="18" charset="0"/>
+                              <a:ea typeface="Calibri" panose="020F0502020204030204" pitchFamily="34" charset="0"/>
+                              <a:cs typeface="Times New Roman" panose="02020603050405020304" pitchFamily="18" charset="0"/>
+                            </a:rPr>
+                            <m:t>𝐴</m:t>
+                          </m:r>
+                          <m:r>
+                            <a:rPr lang="fr-FR" sz="2000" i="1">
+                              <a:solidFill>
+                                <a:srgbClr val="FF0000"/>
+                              </a:solidFill>
+                              <a:effectLst/>
+                              <a:latin typeface="Cambria Math" panose="02040503050406030204" pitchFamily="18" charset="0"/>
+                              <a:ea typeface="Calibri" panose="020F0502020204030204" pitchFamily="34" charset="0"/>
+                              <a:cs typeface="Times New Roman" panose="02020603050405020304" pitchFamily="18" charset="0"/>
+                            </a:rPr>
+                            <m:t>𝑃</m:t>
+                          </m:r>
+                          <m:r>
+                            <a:rPr lang="fr-FR" sz="2000" i="1">
+                              <a:effectLst/>
+                              <a:latin typeface="Cambria Math" panose="02040503050406030204" pitchFamily="18" charset="0"/>
+                              <a:ea typeface="Calibri" panose="020F0502020204030204" pitchFamily="34" charset="0"/>
+                              <a:cs typeface="Times New Roman" panose="02020603050405020304" pitchFamily="18" charset="0"/>
+                            </a:rPr>
+                            <m:t>𝑂𝑁</m:t>
+                          </m:r>
+                        </m:sup>
+                        <m:e>
+                          <m:r>
+                            <a:rPr lang="fr-FR" sz="2000" i="1">
+                              <a:effectLst/>
+                              <a:latin typeface="Cambria Math" panose="02040503050406030204" pitchFamily="18" charset="0"/>
+                              <a:ea typeface="Calibri" panose="020F0502020204030204" pitchFamily="34" charset="0"/>
+                              <a:cs typeface="Times New Roman" panose="02020603050405020304" pitchFamily="18" charset="0"/>
+                            </a:rPr>
+                            <m:t>=&gt;</m:t>
+                          </m:r>
+                          <m:r>
+                            <a:rPr lang="fr-FR" sz="2000" i="1">
+                              <a:effectLst/>
+                              <a:latin typeface="Cambria Math" panose="02040503050406030204" pitchFamily="18" charset="0"/>
+                              <a:ea typeface="Calibri" panose="020F0502020204030204" pitchFamily="34" charset="0"/>
+                              <a:cs typeface="Times New Roman" panose="02020603050405020304" pitchFamily="18" charset="0"/>
+                            </a:rPr>
+                            <m:t>𝑎</m:t>
+                          </m:r>
+                          <m:r>
+                            <a:rPr lang="fr-FR" sz="2000" i="1">
+                              <a:effectLst/>
+                              <a:latin typeface="Cambria Math" panose="02040503050406030204" pitchFamily="18" charset="0"/>
+                              <a:ea typeface="Calibri" panose="020F0502020204030204" pitchFamily="34" charset="0"/>
+                              <a:cs typeface="Times New Roman" panose="02020603050405020304" pitchFamily="18" charset="0"/>
+                            </a:rPr>
+                            <m:t> </m:t>
+                          </m:r>
+                          <m:r>
+                            <a:rPr lang="fr-FR" sz="2000" i="1">
+                              <a:effectLst/>
+                              <a:latin typeface="Cambria Math" panose="02040503050406030204" pitchFamily="18" charset="0"/>
+                              <a:ea typeface="Calibri" panose="020F0502020204030204" pitchFamily="34" charset="0"/>
+                              <a:cs typeface="Times New Roman" panose="02020603050405020304" pitchFamily="18" charset="0"/>
+                            </a:rPr>
+                            <m:t>𝑝𝑜𝑢𝑟</m:t>
+                          </m:r>
+                          <m:r>
+                            <a:rPr lang="fr-FR" sz="2000" i="1">
+                              <a:effectLst/>
+                              <a:latin typeface="Cambria Math" panose="02040503050406030204" pitchFamily="18" charset="0"/>
+                              <a:ea typeface="Calibri" panose="020F0502020204030204" pitchFamily="34" charset="0"/>
+                              <a:cs typeface="Times New Roman" panose="02020603050405020304" pitchFamily="18" charset="0"/>
+                            </a:rPr>
+                            <m:t> </m:t>
+                          </m:r>
+                          <m:r>
+                            <a:rPr lang="fr-FR" sz="2000" i="1">
+                              <a:effectLst/>
+                              <a:latin typeface="Cambria Math" panose="02040503050406030204" pitchFamily="18" charset="0"/>
+                              <a:ea typeface="Calibri" panose="020F0502020204030204" pitchFamily="34" charset="0"/>
+                              <a:cs typeface="Times New Roman" panose="02020603050405020304" pitchFamily="18" charset="0"/>
+                            </a:rPr>
+                            <m:t>𝑑𝑖𝑠𝑡𝑎𝑛𝑐𝑒</m:t>
+                          </m:r>
+                          <m:r>
+                            <a:rPr lang="fr-FR" sz="2000" i="1">
+                              <a:effectLst/>
+                              <a:latin typeface="Cambria Math" panose="02040503050406030204" pitchFamily="18" charset="0"/>
+                              <a:ea typeface="Calibri" panose="020F0502020204030204" pitchFamily="34" charset="0"/>
+                              <a:cs typeface="Times New Roman" panose="02020603050405020304" pitchFamily="18" charset="0"/>
+                            </a:rPr>
+                            <m:t> </m:t>
+                          </m:r>
+                          <m:r>
+                            <a:rPr lang="fr-FR" sz="2000" i="1">
+                              <a:effectLst/>
+                              <a:latin typeface="Cambria Math" panose="02040503050406030204" pitchFamily="18" charset="0"/>
+                              <a:ea typeface="Calibri" panose="020F0502020204030204" pitchFamily="34" charset="0"/>
+                              <a:cs typeface="Times New Roman" panose="02020603050405020304" pitchFamily="18" charset="0"/>
+                            </a:rPr>
+                            <m:t>𝑑𝑒</m:t>
+                          </m:r>
+                          <m:r>
+                            <a:rPr lang="fr-FR" sz="2000" i="1">
+                              <a:effectLst/>
+                              <a:latin typeface="Cambria Math" panose="02040503050406030204" pitchFamily="18" charset="0"/>
+                              <a:ea typeface="Calibri" panose="020F0502020204030204" pitchFamily="34" charset="0"/>
+                              <a:cs typeface="Times New Roman" panose="02020603050405020304" pitchFamily="18" charset="0"/>
+                            </a:rPr>
+                            <m:t> </m:t>
+                          </m:r>
+                          <m:r>
+                            <a:rPr lang="fr-FR" sz="2000" i="1">
+                              <a:effectLst/>
+                              <a:latin typeface="Cambria Math" panose="02040503050406030204" pitchFamily="18" charset="0"/>
+                              <a:ea typeface="Calibri" panose="020F0502020204030204" pitchFamily="34" charset="0"/>
+                              <a:cs typeface="Times New Roman" panose="02020603050405020304" pitchFamily="18" charset="0"/>
+                            </a:rPr>
+                            <m:t>𝐻𝑎𝑚𝑚𝑖𝑛𝑔</m:t>
+                          </m:r>
+                          <m:r>
+                            <a:rPr lang="fr-FR" sz="2000" i="1">
+                              <a:effectLst/>
+                              <a:latin typeface="Cambria Math" panose="02040503050406030204" pitchFamily="18" charset="0"/>
+                              <a:ea typeface="Calibri" panose="020F0502020204030204" pitchFamily="34" charset="0"/>
+                              <a:cs typeface="Times New Roman" panose="02020603050405020304" pitchFamily="18" charset="0"/>
+                            </a:rPr>
+                            <m:t> 2</m:t>
+                          </m:r>
+                        </m:e>
+                      </m:sPre>
+                    </m:oMath>
+                  </m:oMathPara>
+                </a14:m>
+                <a:endParaRPr lang="fr-FR" dirty="0">
+                  <a:latin typeface="Times New Roman" panose="02020603050405020304" pitchFamily="18" charset="0"/>
+                  <a:cs typeface="Times New Roman" panose="02020603050405020304" pitchFamily="18" charset="0"/>
+                </a:endParaRPr>
+              </a:p>
+              <a:p>
+                <a:r>
+                  <a:rPr lang="fr-FR" dirty="0">
+                    <a:latin typeface="Times New Roman" panose="02020603050405020304" pitchFamily="18" charset="0"/>
+                    <a:cs typeface="Times New Roman" panose="02020603050405020304" pitchFamily="18" charset="0"/>
+                  </a:rPr>
+                  <a:t>Car la première lettre de Japon est différente de la première lettre de Savon, les troisièmes lettres aussi sont différentes.</a:t>
+                </a:r>
+              </a:p>
+              <a:p>
+                <a:r>
+                  <a:rPr lang="fr-FR" dirty="0">
+                    <a:latin typeface="Times New Roman" panose="02020603050405020304" pitchFamily="18" charset="0"/>
+                    <a:cs typeface="Times New Roman" panose="02020603050405020304" pitchFamily="18" charset="0"/>
+                  </a:rPr>
+                  <a:t>Ecrire un programme qui demande à l’utilisateur deux mots de mêmes longueurs et ensuite affiche la distance de </a:t>
+                </a:r>
+                <a:r>
+                  <a:rPr lang="fr-FR" dirty="0" err="1">
+                    <a:latin typeface="Times New Roman" panose="02020603050405020304" pitchFamily="18" charset="0"/>
+                    <a:cs typeface="Times New Roman" panose="02020603050405020304" pitchFamily="18" charset="0"/>
+                  </a:rPr>
+                  <a:t>Hamming</a:t>
+                </a:r>
+                <a:r>
+                  <a:rPr lang="fr-FR" dirty="0">
+                    <a:latin typeface="Times New Roman" panose="02020603050405020304" pitchFamily="18" charset="0"/>
+                    <a:cs typeface="Times New Roman" panose="02020603050405020304" pitchFamily="18" charset="0"/>
+                  </a:rPr>
+                  <a:t> entre les deux mots.</a:t>
+                </a:r>
+              </a:p>
+              <a:p>
+                <a:r>
+                  <a:rPr lang="fr-FR" dirty="0">
+                    <a:latin typeface="Times New Roman" panose="02020603050405020304" pitchFamily="18" charset="0"/>
+                    <a:cs typeface="Times New Roman" panose="02020603050405020304" pitchFamily="18" charset="0"/>
+                  </a:rPr>
+                  <a:t>Attention on ne doit pas tenir compte des majuscules et des minuscules Japon, SAVON doit donner comme distance de </a:t>
+                </a:r>
+                <a:r>
+                  <a:rPr lang="fr-FR" dirty="0" err="1">
+                    <a:latin typeface="Times New Roman" panose="02020603050405020304" pitchFamily="18" charset="0"/>
+                    <a:cs typeface="Times New Roman" panose="02020603050405020304" pitchFamily="18" charset="0"/>
+                  </a:rPr>
+                  <a:t>Hamming</a:t>
+                </a:r>
+                <a:r>
+                  <a:rPr lang="fr-FR" dirty="0">
+                    <a:latin typeface="Times New Roman" panose="02020603050405020304" pitchFamily="18" charset="0"/>
+                    <a:cs typeface="Times New Roman" panose="02020603050405020304" pitchFamily="18" charset="0"/>
+                  </a:rPr>
+                  <a:t> 2.</a:t>
+                </a:r>
+              </a:p>
+              <a:p>
+                <a:r>
+                  <a:rPr lang="fr-FR" dirty="0">
+                    <a:latin typeface="Times New Roman" panose="02020603050405020304" pitchFamily="18" charset="0"/>
+                    <a:cs typeface="Times New Roman" panose="02020603050405020304" pitchFamily="18" charset="0"/>
+                  </a:rPr>
+                  <a:t>Afficher un message d’erreur si l’utilisateur fournir une chaine vide ou des mots de longueurs différentes.</a:t>
+                </a:r>
+              </a:p>
+              <a:p>
+                <a:r>
+                  <a:rPr lang="fr-FR" dirty="0">
+                    <a:latin typeface="Times New Roman" panose="02020603050405020304" pitchFamily="18" charset="0"/>
+                    <a:cs typeface="Times New Roman" panose="02020603050405020304" pitchFamily="18" charset="0"/>
+                  </a:rPr>
+                  <a:t>Le calcul de la valeur de </a:t>
+                </a:r>
+                <a:r>
+                  <a:rPr lang="fr-FR" dirty="0" err="1">
+                    <a:latin typeface="Times New Roman" panose="02020603050405020304" pitchFamily="18" charset="0"/>
+                    <a:cs typeface="Times New Roman" panose="02020603050405020304" pitchFamily="18" charset="0"/>
+                  </a:rPr>
+                  <a:t>Hamming</a:t>
+                </a:r>
+                <a:r>
+                  <a:rPr lang="fr-FR" dirty="0">
+                    <a:latin typeface="Times New Roman" panose="02020603050405020304" pitchFamily="18" charset="0"/>
+                    <a:cs typeface="Times New Roman" panose="02020603050405020304" pitchFamily="18" charset="0"/>
+                  </a:rPr>
+                  <a:t> doit être effectué dans une fonction qui prend en paramètre deux mots et renvoie un entier qui correspond à la distance de </a:t>
+                </a:r>
+                <a:r>
+                  <a:rPr lang="fr-FR" dirty="0" err="1">
+                    <a:latin typeface="Times New Roman" panose="02020603050405020304" pitchFamily="18" charset="0"/>
+                    <a:cs typeface="Times New Roman" panose="02020603050405020304" pitchFamily="18" charset="0"/>
+                  </a:rPr>
+                  <a:t>Hamming</a:t>
+                </a:r>
+                <a:r>
+                  <a:rPr lang="fr-FR" dirty="0">
+                    <a:latin typeface="Times New Roman" panose="02020603050405020304" pitchFamily="18" charset="0"/>
+                    <a:cs typeface="Times New Roman" panose="02020603050405020304" pitchFamily="18" charset="0"/>
+                  </a:rPr>
+                  <a:t>.</a:t>
+                </a:r>
+              </a:p>
+            </p:txBody>
+          </p:sp>
+        </mc:Choice>
+        <mc:Fallback>
+          <p:sp>
+            <p:nvSpPr>
+              <p:cNvPr id="7" name="ZoneTexte 6">
+                <a:extLst>
+                  <a:ext uri="{FF2B5EF4-FFF2-40B4-BE49-F238E27FC236}">
+                    <a16:creationId xmlns:a16="http://schemas.microsoft.com/office/drawing/2014/main" id="{FDEB7C40-EA75-EDD3-D51E-186545746147}"/>
+                  </a:ext>
+                </a:extLst>
+              </p:cNvPr>
+              <p:cNvSpPr txBox="1">
+                <a:spLocks noRot="1" noChangeAspect="1" noMove="1" noResize="1" noEditPoints="1" noAdjustHandles="1" noChangeArrowheads="1" noChangeShapeType="1" noTextEdit="1"/>
+              </p:cNvSpPr>
+              <p:nvPr/>
+            </p:nvSpPr>
+            <p:spPr>
+              <a:xfrm>
+                <a:off x="397564" y="1354297"/>
+                <a:ext cx="11088982" cy="4149406"/>
+              </a:xfrm>
+              <a:prstGeom prst="rect">
+                <a:avLst/>
+              </a:prstGeom>
+              <a:blipFill>
+                <a:blip r:embed="rId2"/>
+                <a:stretch>
+                  <a:fillRect l="-550" t="-734" r="-935" b="-1615"/>
+                </a:stretch>
+              </a:blipFill>
+            </p:spPr>
+            <p:txBody>
+              <a:bodyPr/>
+              <a:lstStyle/>
+              <a:p>
+                <a:r>
+                  <a:rPr lang="fr-FR">
+                    <a:noFill/>
+                  </a:rPr>
+                  <a:t> </a:t>
+                </a:r>
+              </a:p>
+            </p:txBody>
+          </p:sp>
+        </mc:Fallback>
+      </mc:AlternateContent>
+    </p:spTree>
+    <p:extLst>
+      <p:ext uri="{BB962C8B-B14F-4D97-AF65-F5344CB8AC3E}">
+        <p14:creationId xmlns:p14="http://schemas.microsoft.com/office/powerpoint/2010/main" val="3783414417"/>
+      </p:ext>
+    </p:extLst>
+  </p:cSld>
+  <p:clrMapOvr>
+    <a:masterClrMapping/>
+  </p:clrMapOvr>
+</p:sld>
+</file>
+
+<file path=ppt/slides/slide23.xml><?xml version="1.0" encoding="utf-8"?>
+<p:sld xmlns:a="http://schemas.openxmlformats.org/drawingml/2006/main" xmlns:r="http://schemas.openxmlformats.org/officeDocument/2006/relationships" xmlns:p="http://schemas.openxmlformats.org/presentationml/2006/main">
+  <p:cSld>
+    <p:spTree>
+      <p:nvGrpSpPr>
+        <p:cNvPr id="1" name="">
+          <a:extLst>
+            <a:ext uri="{FF2B5EF4-FFF2-40B4-BE49-F238E27FC236}">
+              <a16:creationId xmlns:a16="http://schemas.microsoft.com/office/drawing/2014/main" id="{20DAB2F5-DB2D-6597-92B5-C894A60E32DC}"/>
+            </a:ext>
+          </a:extLst>
+        </p:cNvPr>
+        <p:cNvGrpSpPr/>
+        <p:nvPr/>
+      </p:nvGrpSpPr>
+      <p:grpSpPr>
+        <a:xfrm>
+          <a:off x="0" y="0"/>
+          <a:ext cx="0" cy="0"/>
+          <a:chOff x="0" y="0"/>
+          <a:chExt cx="0" cy="0"/>
+        </a:xfrm>
+      </p:grpSpPr>
+      <p:sp>
+        <p:nvSpPr>
+          <p:cNvPr id="4" name="Espace réservé du pied de page 3">
+            <a:extLst>
+              <a:ext uri="{FF2B5EF4-FFF2-40B4-BE49-F238E27FC236}">
+                <a16:creationId xmlns:a16="http://schemas.microsoft.com/office/drawing/2014/main" id="{078DFBF2-F4E1-6984-A362-9E4EA5C4EB29}"/>
+              </a:ext>
+            </a:extLst>
+          </p:cNvPr>
+          <p:cNvSpPr>
+            <a:spLocks noGrp="1"/>
+          </p:cNvSpPr>
+          <p:nvPr>
+            <p:ph type="ftr" sz="quarter" idx="11"/>
+          </p:nvPr>
+        </p:nvSpPr>
+        <p:spPr/>
+        <p:txBody>
+          <a:bodyPr/>
+          <a:lstStyle/>
+          <a:p>
+            <a:r>
+              <a:rPr lang="fr-FR"/>
+              <a:t>Cours: Python | Auteur: TUO N. Ismaël Maurice 
+</a:t>
+            </a:r>
+          </a:p>
+        </p:txBody>
+      </p:sp>
+      <p:sp>
+        <p:nvSpPr>
+          <p:cNvPr id="5" name="Espace réservé du numéro de diapositive 4">
+            <a:extLst>
+              <a:ext uri="{FF2B5EF4-FFF2-40B4-BE49-F238E27FC236}">
+                <a16:creationId xmlns:a16="http://schemas.microsoft.com/office/drawing/2014/main" id="{3EC376C4-A90D-AFAA-1480-3418EB0BBB10}"/>
+              </a:ext>
+            </a:extLst>
+          </p:cNvPr>
+          <p:cNvSpPr>
+            <a:spLocks noGrp="1"/>
+          </p:cNvSpPr>
+          <p:nvPr>
+            <p:ph type="sldNum" sz="quarter" idx="12"/>
+          </p:nvPr>
+        </p:nvSpPr>
+        <p:spPr/>
+        <p:txBody>
+          <a:bodyPr/>
+          <a:lstStyle/>
+          <a:p>
+            <a:fld id="{B8C3BB88-DD29-4D42-B62E-D7D541DB4348}" type="slidenum">
+              <a:rPr lang="fr-FR" smtClean="0"/>
+              <a:t>23</a:t>
+            </a:fld>
+            <a:endParaRPr lang="fr-FR"/>
+          </a:p>
+        </p:txBody>
+      </p:sp>
+      <p:sp>
+        <p:nvSpPr>
+          <p:cNvPr id="6" name="ZoneTexte 5">
+            <a:extLst>
+              <a:ext uri="{FF2B5EF4-FFF2-40B4-BE49-F238E27FC236}">
+                <a16:creationId xmlns:a16="http://schemas.microsoft.com/office/drawing/2014/main" id="{D49CC799-0669-2ADB-6257-E405DC5A16D6}"/>
+              </a:ext>
+            </a:extLst>
+          </p:cNvPr>
+          <p:cNvSpPr txBox="1"/>
+          <p:nvPr/>
+        </p:nvSpPr>
+        <p:spPr>
+          <a:xfrm>
+            <a:off x="397564" y="218526"/>
+            <a:ext cx="5795005" cy="461665"/>
+          </a:xfrm>
+          <a:prstGeom prst="rect">
+            <a:avLst/>
+          </a:prstGeom>
+          <a:noFill/>
+        </p:spPr>
+        <p:txBody>
+          <a:bodyPr wrap="square" rtlCol="0">
+            <a:spAutoFit/>
+          </a:bodyPr>
+          <a:lstStyle/>
+          <a:p>
+            <a:r>
+              <a:rPr lang="fr-FR" sz="2400" b="1" dirty="0">
+                <a:latin typeface="Times New Roman" panose="02020603050405020304" pitchFamily="18" charset="0"/>
+                <a:cs typeface="Times New Roman" panose="02020603050405020304" pitchFamily="18" charset="0"/>
+              </a:rPr>
+              <a:t>Exercices</a:t>
+            </a:r>
+          </a:p>
+        </p:txBody>
+      </p:sp>
+      <p:cxnSp>
+        <p:nvCxnSpPr>
+          <p:cNvPr id="3" name="Connecteur droit 2">
+            <a:extLst>
+              <a:ext uri="{FF2B5EF4-FFF2-40B4-BE49-F238E27FC236}">
+                <a16:creationId xmlns:a16="http://schemas.microsoft.com/office/drawing/2014/main" id="{75346BF9-966F-AE77-21D0-4FFCAF01CFBD}"/>
+              </a:ext>
+            </a:extLst>
+          </p:cNvPr>
+          <p:cNvCxnSpPr>
+            <a:cxnSpLocks/>
+          </p:cNvCxnSpPr>
+          <p:nvPr/>
+        </p:nvCxnSpPr>
+        <p:spPr>
+          <a:xfrm>
+            <a:off x="500932" y="680191"/>
+            <a:ext cx="11178450" cy="0"/>
+          </a:xfrm>
+          <a:prstGeom prst="line">
+            <a:avLst/>
+          </a:prstGeom>
+          <a:ln/>
+        </p:spPr>
+        <p:style>
+          <a:lnRef idx="3">
+            <a:schemeClr val="accent3"/>
+          </a:lnRef>
+          <a:fillRef idx="0">
+            <a:schemeClr val="accent3"/>
+          </a:fillRef>
+          <a:effectRef idx="2">
+            <a:schemeClr val="accent3"/>
+          </a:effectRef>
+          <a:fontRef idx="minor">
+            <a:schemeClr val="tx1"/>
+          </a:fontRef>
+        </p:style>
+      </p:cxnSp>
+      <p:sp>
+        <p:nvSpPr>
+          <p:cNvPr id="2" name="ZoneTexte 1">
+            <a:extLst>
+              <a:ext uri="{FF2B5EF4-FFF2-40B4-BE49-F238E27FC236}">
+                <a16:creationId xmlns:a16="http://schemas.microsoft.com/office/drawing/2014/main" id="{04BA494E-B5DA-C1B4-708B-1C292F78A3EA}"/>
+              </a:ext>
+            </a:extLst>
+          </p:cNvPr>
+          <p:cNvSpPr txBox="1"/>
+          <p:nvPr/>
+        </p:nvSpPr>
+        <p:spPr>
+          <a:xfrm>
+            <a:off x="397565" y="859559"/>
+            <a:ext cx="11569148" cy="400110"/>
+          </a:xfrm>
+          <a:prstGeom prst="rect">
+            <a:avLst/>
+          </a:prstGeom>
+          <a:noFill/>
+        </p:spPr>
+        <p:txBody>
+          <a:bodyPr wrap="square" rtlCol="0">
+            <a:spAutoFit/>
+          </a:bodyPr>
+          <a:lstStyle/>
+          <a:p>
+            <a:r>
+              <a:rPr lang="fr-FR" sz="2000" b="1" u="sng" dirty="0">
+                <a:latin typeface="Times New Roman" panose="02020603050405020304" pitchFamily="18" charset="0"/>
+                <a:cs typeface="Times New Roman" panose="02020603050405020304" pitchFamily="18" charset="0"/>
+              </a:rPr>
+              <a:t>Exercice 4</a:t>
+            </a:r>
+          </a:p>
+        </p:txBody>
+      </p:sp>
+      <mc:AlternateContent xmlns:mc="http://schemas.openxmlformats.org/markup-compatibility/2006">
+        <mc:Choice xmlns:a14="http://schemas.microsoft.com/office/drawing/2010/main" Requires="a14">
+          <p:sp>
+            <p:nvSpPr>
+              <p:cNvPr id="7" name="ZoneTexte 6">
+                <a:extLst>
+                  <a:ext uri="{FF2B5EF4-FFF2-40B4-BE49-F238E27FC236}">
+                    <a16:creationId xmlns:a16="http://schemas.microsoft.com/office/drawing/2014/main" id="{A7FF1985-80EA-EDE1-BA9D-CAAB047B7307}"/>
+                  </a:ext>
+                </a:extLst>
+              </p:cNvPr>
+              <p:cNvSpPr txBox="1"/>
+              <p:nvPr/>
+            </p:nvSpPr>
+            <p:spPr>
+              <a:xfrm>
+                <a:off x="397564" y="1354297"/>
+                <a:ext cx="11088982" cy="1323439"/>
+              </a:xfrm>
+              <a:prstGeom prst="rect">
+                <a:avLst/>
+              </a:prstGeom>
+              <a:noFill/>
+            </p:spPr>
+            <p:txBody>
+              <a:bodyPr wrap="square" rtlCol="0">
+                <a:spAutoFit/>
+              </a:bodyPr>
+              <a:lstStyle>
+                <a:defPPr>
+                  <a:defRPr lang="en-US"/>
+                </a:defPPr>
+                <a:lvl1pPr>
+                  <a:defRPr sz="2000"/>
+                </a:lvl1pPr>
+              </a:lstStyle>
+              <a:p>
+                <a:r>
+                  <a:rPr lang="fr-FR" dirty="0">
+                    <a:latin typeface="Times New Roman" panose="02020603050405020304" pitchFamily="18" charset="0"/>
+                    <a:cs typeface="Times New Roman" panose="02020603050405020304" pitchFamily="18" charset="0"/>
+                  </a:rPr>
+                  <a:t>Ecrire une fonction </a:t>
+                </a:r>
+                <a:r>
+                  <a:rPr lang="fr-FR" i="1" dirty="0">
+                    <a:latin typeface="Times New Roman" panose="02020603050405020304" pitchFamily="18" charset="0"/>
+                    <a:cs typeface="Times New Roman" panose="02020603050405020304" pitchFamily="18" charset="0"/>
+                  </a:rPr>
+                  <a:t>verlan()</a:t>
+                </a:r>
+                <a:r>
+                  <a:rPr lang="fr-FR" dirty="0">
+                    <a:latin typeface="Times New Roman" panose="02020603050405020304" pitchFamily="18" charset="0"/>
+                    <a:cs typeface="Times New Roman" panose="02020603050405020304" pitchFamily="18" charset="0"/>
+                  </a:rPr>
+                  <a:t>, qui permet de renvoyer un mot à l’envers. Par exemple </a:t>
+                </a:r>
+                <a14:m>
+                  <m:oMath xmlns:m="http://schemas.openxmlformats.org/officeDocument/2006/math">
+                    <m:r>
+                      <a:rPr lang="fr-FR" b="0" i="1" smtClean="0">
+                        <a:latin typeface="Cambria Math" panose="02040503050406030204" pitchFamily="18" charset="0"/>
+                        <a:cs typeface="Times New Roman" panose="02020603050405020304" pitchFamily="18" charset="0"/>
+                      </a:rPr>
+                      <m:t>𝑣𝑒𝑟𝑙𝑎𝑛</m:t>
+                    </m:r>
+                    <m:r>
+                      <a:rPr lang="fr-FR" b="0" i="1" smtClean="0">
+                        <a:latin typeface="Cambria Math" panose="02040503050406030204" pitchFamily="18" charset="0"/>
+                        <a:cs typeface="Times New Roman" panose="02020603050405020304" pitchFamily="18" charset="0"/>
+                      </a:rPr>
+                      <m:t>("</m:t>
+                    </m:r>
+                    <m:r>
+                      <a:rPr lang="fr-FR" b="0" i="1" smtClean="0">
+                        <a:latin typeface="Cambria Math" panose="02040503050406030204" pitchFamily="18" charset="0"/>
+                        <a:cs typeface="Times New Roman" panose="02020603050405020304" pitchFamily="18" charset="0"/>
+                      </a:rPr>
+                      <m:t>𝑚𝑜𝑡</m:t>
+                    </m:r>
+                    <m:r>
+                      <a:rPr lang="fr-FR" b="0" i="1" smtClean="0">
+                        <a:latin typeface="Cambria Math" panose="02040503050406030204" pitchFamily="18" charset="0"/>
+                        <a:cs typeface="Times New Roman" panose="02020603050405020304" pitchFamily="18" charset="0"/>
+                      </a:rPr>
+                      <m:t>"</m:t>
+                    </m:r>
+                  </m:oMath>
+                </a14:m>
+                <a:r>
+                  <a:rPr lang="fr-FR" dirty="0">
+                    <a:latin typeface="Times New Roman" panose="02020603050405020304" pitchFamily="18" charset="0"/>
+                    <a:cs typeface="Times New Roman" panose="02020603050405020304" pitchFamily="18" charset="0"/>
+                  </a:rPr>
+                  <a:t>) doit renvoyer « tom ».</a:t>
+                </a:r>
+              </a:p>
+              <a:p>
+                <a:r>
+                  <a:rPr lang="fr-FR" dirty="0">
+                    <a:latin typeface="Times New Roman" panose="02020603050405020304" pitchFamily="18" charset="0"/>
+                    <a:cs typeface="Times New Roman" panose="02020603050405020304" pitchFamily="18" charset="0"/>
+                  </a:rPr>
+                  <a:t>Dans la fonction main écrire un programme qui va demander à l’utilisateur un mot et afficher le verlan du mot.</a:t>
+                </a:r>
+              </a:p>
+            </p:txBody>
+          </p:sp>
+        </mc:Choice>
+        <mc:Fallback>
+          <p:sp>
+            <p:nvSpPr>
+              <p:cNvPr id="7" name="ZoneTexte 6">
+                <a:extLst>
+                  <a:ext uri="{FF2B5EF4-FFF2-40B4-BE49-F238E27FC236}">
+                    <a16:creationId xmlns:a16="http://schemas.microsoft.com/office/drawing/2014/main" id="{A7FF1985-80EA-EDE1-BA9D-CAAB047B7307}"/>
+                  </a:ext>
+                </a:extLst>
+              </p:cNvPr>
+              <p:cNvSpPr txBox="1">
+                <a:spLocks noRot="1" noChangeAspect="1" noMove="1" noResize="1" noEditPoints="1" noAdjustHandles="1" noChangeArrowheads="1" noChangeShapeType="1" noTextEdit="1"/>
+              </p:cNvSpPr>
+              <p:nvPr/>
+            </p:nvSpPr>
+            <p:spPr>
+              <a:xfrm>
+                <a:off x="397564" y="1354297"/>
+                <a:ext cx="11088982" cy="1323439"/>
+              </a:xfrm>
+              <a:prstGeom prst="rect">
+                <a:avLst/>
+              </a:prstGeom>
+              <a:blipFill>
+                <a:blip r:embed="rId2"/>
+                <a:stretch>
+                  <a:fillRect l="-550" t="-2304" b="-7373"/>
+                </a:stretch>
+              </a:blipFill>
+            </p:spPr>
+            <p:txBody>
+              <a:bodyPr/>
+              <a:lstStyle/>
+              <a:p>
+                <a:r>
+                  <a:rPr lang="fr-FR">
+                    <a:noFill/>
+                  </a:rPr>
+                  <a:t> </a:t>
+                </a:r>
+              </a:p>
+            </p:txBody>
+          </p:sp>
+        </mc:Fallback>
+      </mc:AlternateContent>
+      <p:sp>
+        <p:nvSpPr>
+          <p:cNvPr id="12" name="ZoneTexte 11">
+            <a:extLst>
+              <a:ext uri="{FF2B5EF4-FFF2-40B4-BE49-F238E27FC236}">
+                <a16:creationId xmlns:a16="http://schemas.microsoft.com/office/drawing/2014/main" id="{B2E75825-AD1D-B5D0-8B6D-52813365B0E7}"/>
+              </a:ext>
+            </a:extLst>
+          </p:cNvPr>
+          <p:cNvSpPr txBox="1"/>
+          <p:nvPr/>
+        </p:nvSpPr>
+        <p:spPr>
+          <a:xfrm>
+            <a:off x="407995" y="2789769"/>
+            <a:ext cx="11569148" cy="400110"/>
+          </a:xfrm>
+          <a:prstGeom prst="rect">
+            <a:avLst/>
+          </a:prstGeom>
+          <a:noFill/>
+        </p:spPr>
+        <p:txBody>
+          <a:bodyPr wrap="square" rtlCol="0">
+            <a:spAutoFit/>
+          </a:bodyPr>
+          <a:lstStyle/>
+          <a:p>
+            <a:r>
+              <a:rPr lang="fr-FR" sz="2000" b="1" u="sng" dirty="0">
+                <a:latin typeface="Times New Roman" panose="02020603050405020304" pitchFamily="18" charset="0"/>
+                <a:cs typeface="Times New Roman" panose="02020603050405020304" pitchFamily="18" charset="0"/>
+              </a:rPr>
+              <a:t>Exercice 5</a:t>
+            </a:r>
+          </a:p>
+        </p:txBody>
+      </p:sp>
+      <p:sp>
+        <p:nvSpPr>
+          <p:cNvPr id="13" name="ZoneTexte 12">
+            <a:extLst>
+              <a:ext uri="{FF2B5EF4-FFF2-40B4-BE49-F238E27FC236}">
+                <a16:creationId xmlns:a16="http://schemas.microsoft.com/office/drawing/2014/main" id="{92DE3661-AF58-F050-DC4D-88CF7AB0DA89}"/>
+              </a:ext>
+            </a:extLst>
+          </p:cNvPr>
+          <p:cNvSpPr txBox="1"/>
+          <p:nvPr/>
+        </p:nvSpPr>
+        <p:spPr>
+          <a:xfrm>
+            <a:off x="368140" y="3189879"/>
+            <a:ext cx="11088982" cy="2554545"/>
+          </a:xfrm>
+          <a:prstGeom prst="rect">
+            <a:avLst/>
+          </a:prstGeom>
+          <a:noFill/>
+        </p:spPr>
+        <p:txBody>
+          <a:bodyPr wrap="square" rtlCol="0">
+            <a:spAutoFit/>
+          </a:bodyPr>
+          <a:lstStyle>
+            <a:defPPr>
+              <a:defRPr lang="en-US"/>
+            </a:defPPr>
+            <a:lvl1pPr>
+              <a:defRPr sz="2000"/>
+            </a:lvl1pPr>
+          </a:lstStyle>
+          <a:p>
+            <a:r>
+              <a:rPr lang="fr-FR" dirty="0">
+                <a:latin typeface="Times New Roman" panose="02020603050405020304" pitchFamily="18" charset="0"/>
+                <a:cs typeface="Times New Roman" panose="02020603050405020304" pitchFamily="18" charset="0"/>
+              </a:rPr>
+              <a:t>Ecrire une fonction qui prend en paramètre un mot et renvoie </a:t>
+            </a:r>
+            <a:r>
+              <a:rPr lang="fr-FR" dirty="0" err="1">
+                <a:latin typeface="Times New Roman" panose="02020603050405020304" pitchFamily="18" charset="0"/>
+                <a:cs typeface="Times New Roman" panose="02020603050405020304" pitchFamily="18" charset="0"/>
+              </a:rPr>
+              <a:t>True</a:t>
+            </a:r>
+            <a:r>
+              <a:rPr lang="fr-FR" dirty="0">
+                <a:latin typeface="Times New Roman" panose="02020603050405020304" pitchFamily="18" charset="0"/>
+                <a:cs typeface="Times New Roman" panose="02020603050405020304" pitchFamily="18" charset="0"/>
+              </a:rPr>
+              <a:t> si le mot est un palindrome sinon False.</a:t>
+            </a:r>
+          </a:p>
+          <a:p>
+            <a:r>
+              <a:rPr lang="fr-FR" dirty="0">
+                <a:latin typeface="Times New Roman" panose="02020603050405020304" pitchFamily="18" charset="0"/>
+                <a:cs typeface="Times New Roman" panose="02020603050405020304" pitchFamily="18" charset="0"/>
+              </a:rPr>
+              <a:t>Un palindrome est un mot qui s’écrit indifféremment de gauche à droite ou de droite à gauche. Peu importe le sens de lecture ou d’écriture on obtient le même mot. Par exemple « SOS » ou « RADAR » est un palindrome par contre « TOTO » n’est pas un palindrome car l’inverse donne « OTOT ».</a:t>
+            </a:r>
+          </a:p>
+          <a:p>
+            <a:r>
+              <a:rPr lang="fr-FR" dirty="0">
+                <a:latin typeface="Times New Roman" panose="02020603050405020304" pitchFamily="18" charset="0"/>
+                <a:cs typeface="Times New Roman" panose="02020603050405020304" pitchFamily="18" charset="0"/>
+              </a:rPr>
+              <a:t>Ecrire un programme qui va demander un mot à l’utilisateur. Ensuite le programme doit appeler la fonction de palindrome pour vérifier si le mot est un palindrome ou non et afficher le résultat par exemple si l’utilisateur entre « TOTO » on doit afficher « Le mot ‘TOTO’ n’est pas un palindrome. »</a:t>
+            </a:r>
+          </a:p>
+          <a:p>
+            <a:r>
+              <a:rPr lang="fr-FR" dirty="0">
+                <a:latin typeface="Times New Roman" panose="02020603050405020304" pitchFamily="18" charset="0"/>
+                <a:cs typeface="Times New Roman" panose="02020603050405020304" pitchFamily="18" charset="0"/>
+              </a:rPr>
+              <a:t>On doit gérer les cas d’erreur.</a:t>
+            </a:r>
+          </a:p>
+        </p:txBody>
+      </p:sp>
+    </p:spTree>
+    <p:extLst>
+      <p:ext uri="{BB962C8B-B14F-4D97-AF65-F5344CB8AC3E}">
+        <p14:creationId xmlns:p14="http://schemas.microsoft.com/office/powerpoint/2010/main" val="2465630299"/>
+      </p:ext>
+    </p:extLst>
+  </p:cSld>
+  <p:clrMapOvr>
+    <a:masterClrMapping/>
+  </p:clrMapOvr>
+</p:sld>
+</file>
+
+<file path=ppt/slides/slide24.xml><?xml version="1.0" encoding="utf-8"?>
+<p:sld xmlns:a="http://schemas.openxmlformats.org/drawingml/2006/main" xmlns:r="http://schemas.openxmlformats.org/officeDocument/2006/relationships" xmlns:p="http://schemas.openxmlformats.org/presentationml/2006/main">
+  <p:cSld>
+    <p:spTree>
+      <p:nvGrpSpPr>
+        <p:cNvPr id="1" name="">
+          <a:extLst>
+            <a:ext uri="{FF2B5EF4-FFF2-40B4-BE49-F238E27FC236}">
+              <a16:creationId xmlns:a16="http://schemas.microsoft.com/office/drawing/2014/main" id="{C04139A4-C380-ACB4-0D21-663A19A3FC77}"/>
+            </a:ext>
+          </a:extLst>
+        </p:cNvPr>
+        <p:cNvGrpSpPr/>
+        <p:nvPr/>
+      </p:nvGrpSpPr>
+      <p:grpSpPr>
+        <a:xfrm>
+          <a:off x="0" y="0"/>
+          <a:ext cx="0" cy="0"/>
+          <a:chOff x="0" y="0"/>
+          <a:chExt cx="0" cy="0"/>
+        </a:xfrm>
+      </p:grpSpPr>
+      <p:sp>
+        <p:nvSpPr>
+          <p:cNvPr id="4" name="Espace réservé du pied de page 3">
+            <a:extLst>
+              <a:ext uri="{FF2B5EF4-FFF2-40B4-BE49-F238E27FC236}">
+                <a16:creationId xmlns:a16="http://schemas.microsoft.com/office/drawing/2014/main" id="{7C798B24-3FE6-5B41-F38B-8FD4EE9988A5}"/>
+              </a:ext>
+            </a:extLst>
+          </p:cNvPr>
+          <p:cNvSpPr>
+            <a:spLocks noGrp="1"/>
+          </p:cNvSpPr>
+          <p:nvPr>
+            <p:ph type="ftr" sz="quarter" idx="11"/>
+          </p:nvPr>
+        </p:nvSpPr>
+        <p:spPr/>
+        <p:txBody>
+          <a:bodyPr/>
+          <a:lstStyle/>
+          <a:p>
+            <a:r>
+              <a:rPr lang="fr-FR"/>
+              <a:t>Cours: Python | Auteur: TUO N. Ismaël Maurice 
+</a:t>
+            </a:r>
+          </a:p>
+        </p:txBody>
+      </p:sp>
+      <p:sp>
+        <p:nvSpPr>
+          <p:cNvPr id="5" name="Espace réservé du numéro de diapositive 4">
+            <a:extLst>
+              <a:ext uri="{FF2B5EF4-FFF2-40B4-BE49-F238E27FC236}">
+                <a16:creationId xmlns:a16="http://schemas.microsoft.com/office/drawing/2014/main" id="{6B564BD6-D2BF-5844-AABD-57BA6C2F1B98}"/>
+              </a:ext>
+            </a:extLst>
+          </p:cNvPr>
+          <p:cNvSpPr>
+            <a:spLocks noGrp="1"/>
+          </p:cNvSpPr>
+          <p:nvPr>
+            <p:ph type="sldNum" sz="quarter" idx="12"/>
+          </p:nvPr>
+        </p:nvSpPr>
+        <p:spPr/>
+        <p:txBody>
+          <a:bodyPr/>
+          <a:lstStyle/>
+          <a:p>
+            <a:fld id="{B8C3BB88-DD29-4D42-B62E-D7D541DB4348}" type="slidenum">
+              <a:rPr lang="fr-FR" smtClean="0"/>
+              <a:t>24</a:t>
+            </a:fld>
+            <a:endParaRPr lang="fr-FR"/>
+          </a:p>
+        </p:txBody>
+      </p:sp>
+      <p:sp>
+        <p:nvSpPr>
+          <p:cNvPr id="6" name="ZoneTexte 5">
+            <a:extLst>
+              <a:ext uri="{FF2B5EF4-FFF2-40B4-BE49-F238E27FC236}">
+                <a16:creationId xmlns:a16="http://schemas.microsoft.com/office/drawing/2014/main" id="{545E178C-5714-EAA8-7FE1-CA19D6929A1B}"/>
+              </a:ext>
+            </a:extLst>
+          </p:cNvPr>
+          <p:cNvSpPr txBox="1"/>
+          <p:nvPr/>
+        </p:nvSpPr>
+        <p:spPr>
+          <a:xfrm>
+            <a:off x="397564" y="218526"/>
+            <a:ext cx="5795005" cy="461665"/>
+          </a:xfrm>
+          <a:prstGeom prst="rect">
+            <a:avLst/>
+          </a:prstGeom>
+          <a:noFill/>
+        </p:spPr>
+        <p:txBody>
+          <a:bodyPr wrap="square" rtlCol="0">
+            <a:spAutoFit/>
+          </a:bodyPr>
+          <a:lstStyle/>
+          <a:p>
+            <a:r>
+              <a:rPr lang="fr-FR" sz="2400" b="1" dirty="0">
+                <a:latin typeface="Times New Roman" panose="02020603050405020304" pitchFamily="18" charset="0"/>
+                <a:cs typeface="Times New Roman" panose="02020603050405020304" pitchFamily="18" charset="0"/>
+              </a:rPr>
+              <a:t>Exercices</a:t>
+            </a:r>
+          </a:p>
+        </p:txBody>
+      </p:sp>
+      <p:cxnSp>
+        <p:nvCxnSpPr>
+          <p:cNvPr id="3" name="Connecteur droit 2">
+            <a:extLst>
+              <a:ext uri="{FF2B5EF4-FFF2-40B4-BE49-F238E27FC236}">
+                <a16:creationId xmlns:a16="http://schemas.microsoft.com/office/drawing/2014/main" id="{A5A2E4EC-914E-2FE8-7CFC-D729E22CEBE5}"/>
+              </a:ext>
+            </a:extLst>
+          </p:cNvPr>
+          <p:cNvCxnSpPr>
+            <a:cxnSpLocks/>
+          </p:cNvCxnSpPr>
+          <p:nvPr/>
+        </p:nvCxnSpPr>
+        <p:spPr>
+          <a:xfrm>
+            <a:off x="500932" y="680191"/>
+            <a:ext cx="11178450" cy="0"/>
+          </a:xfrm>
+          <a:prstGeom prst="line">
+            <a:avLst/>
+          </a:prstGeom>
+          <a:ln/>
+        </p:spPr>
+        <p:style>
+          <a:lnRef idx="3">
+            <a:schemeClr val="accent3"/>
+          </a:lnRef>
+          <a:fillRef idx="0">
+            <a:schemeClr val="accent3"/>
+          </a:fillRef>
+          <a:effectRef idx="2">
+            <a:schemeClr val="accent3"/>
+          </a:effectRef>
+          <a:fontRef idx="minor">
+            <a:schemeClr val="tx1"/>
+          </a:fontRef>
+        </p:style>
+      </p:cxnSp>
+      <p:sp>
+        <p:nvSpPr>
+          <p:cNvPr id="2" name="ZoneTexte 1">
+            <a:extLst>
+              <a:ext uri="{FF2B5EF4-FFF2-40B4-BE49-F238E27FC236}">
+                <a16:creationId xmlns:a16="http://schemas.microsoft.com/office/drawing/2014/main" id="{E3F5CE80-F097-5FFA-4EDB-A588C5514852}"/>
+              </a:ext>
+            </a:extLst>
+          </p:cNvPr>
+          <p:cNvSpPr txBox="1"/>
+          <p:nvPr/>
+        </p:nvSpPr>
+        <p:spPr>
+          <a:xfrm>
+            <a:off x="397565" y="859559"/>
+            <a:ext cx="11569148" cy="400110"/>
+          </a:xfrm>
+          <a:prstGeom prst="rect">
+            <a:avLst/>
+          </a:prstGeom>
+          <a:noFill/>
+        </p:spPr>
+        <p:txBody>
+          <a:bodyPr wrap="square" rtlCol="0">
+            <a:spAutoFit/>
+          </a:bodyPr>
+          <a:lstStyle/>
+          <a:p>
+            <a:r>
+              <a:rPr lang="fr-FR" sz="2000" b="1" u="sng" dirty="0">
+                <a:latin typeface="Times New Roman" panose="02020603050405020304" pitchFamily="18" charset="0"/>
+                <a:cs typeface="Times New Roman" panose="02020603050405020304" pitchFamily="18" charset="0"/>
+              </a:rPr>
+              <a:t>Mini projet 1</a:t>
+            </a:r>
+          </a:p>
+        </p:txBody>
+      </p:sp>
+      <p:sp>
+        <p:nvSpPr>
+          <p:cNvPr id="7" name="ZoneTexte 6">
+            <a:extLst>
+              <a:ext uri="{FF2B5EF4-FFF2-40B4-BE49-F238E27FC236}">
+                <a16:creationId xmlns:a16="http://schemas.microsoft.com/office/drawing/2014/main" id="{26089FA3-1429-ADF1-DAE2-6EF9D4826D95}"/>
+              </a:ext>
+            </a:extLst>
+          </p:cNvPr>
+          <p:cNvSpPr txBox="1"/>
+          <p:nvPr/>
+        </p:nvSpPr>
+        <p:spPr>
+          <a:xfrm>
+            <a:off x="397564" y="1354297"/>
+            <a:ext cx="11088982" cy="3477875"/>
+          </a:xfrm>
+          <a:prstGeom prst="rect">
+            <a:avLst/>
+          </a:prstGeom>
+          <a:noFill/>
+        </p:spPr>
+        <p:txBody>
+          <a:bodyPr wrap="square" rtlCol="0">
+            <a:spAutoFit/>
+          </a:bodyPr>
+          <a:lstStyle>
+            <a:defPPr>
+              <a:defRPr lang="en-US"/>
+            </a:defPPr>
+            <a:lvl1pPr>
+              <a:defRPr sz="2000"/>
+            </a:lvl1pPr>
+          </a:lstStyle>
+          <a:p>
+            <a:r>
+              <a:rPr lang="fr-FR" dirty="0">
+                <a:latin typeface="Times New Roman" panose="02020603050405020304" pitchFamily="18" charset="0"/>
+                <a:cs typeface="Times New Roman" panose="02020603050405020304" pitchFamily="18" charset="0"/>
+              </a:rPr>
+              <a:t>Créer un programme qui lorsqu’il démarre affiche le menu suivant: pluriel de mot, verlan de mot, vérification palindrome, calcul de la distance de </a:t>
+            </a:r>
+            <a:r>
+              <a:rPr lang="fr-FR" dirty="0" err="1">
+                <a:latin typeface="Times New Roman" panose="02020603050405020304" pitchFamily="18" charset="0"/>
+                <a:cs typeface="Times New Roman" panose="02020603050405020304" pitchFamily="18" charset="0"/>
+              </a:rPr>
+              <a:t>Hamming</a:t>
+            </a:r>
+            <a:r>
+              <a:rPr lang="fr-FR" dirty="0">
+                <a:latin typeface="Times New Roman" panose="02020603050405020304" pitchFamily="18" charset="0"/>
+                <a:cs typeface="Times New Roman" panose="02020603050405020304" pitchFamily="18" charset="0"/>
+              </a:rPr>
+              <a:t>, nombre de mots d’une phrase, nombre de caractères dans une phrase (différent de l’espace), nombre de consonnes d’une phrase, nombre de voyelle d’une phrase.</a:t>
+            </a:r>
+          </a:p>
+          <a:p>
+            <a:r>
+              <a:rPr lang="fr-FR" dirty="0">
+                <a:latin typeface="Times New Roman" panose="02020603050405020304" pitchFamily="18" charset="0"/>
+                <a:cs typeface="Times New Roman" panose="02020603050405020304" pitchFamily="18" charset="0"/>
+              </a:rPr>
+              <a:t>L’utilisateur devra faire le choix d’une option.</a:t>
+            </a:r>
+          </a:p>
+          <a:p>
+            <a:r>
+              <a:rPr lang="fr-FR" dirty="0">
+                <a:latin typeface="Times New Roman" panose="02020603050405020304" pitchFamily="18" charset="0"/>
+                <a:cs typeface="Times New Roman" panose="02020603050405020304" pitchFamily="18" charset="0"/>
+              </a:rPr>
+              <a:t>En fonction du choix demander les paramètres à l’utilisateur par exemple si le choix est palindrome on demandera un mot à l’utilisateur, si le choix est le calcul de la distance de </a:t>
+            </a:r>
+            <a:r>
+              <a:rPr lang="fr-FR" dirty="0" err="1">
+                <a:latin typeface="Times New Roman" panose="02020603050405020304" pitchFamily="18" charset="0"/>
+                <a:cs typeface="Times New Roman" panose="02020603050405020304" pitchFamily="18" charset="0"/>
+              </a:rPr>
+              <a:t>Hamming</a:t>
+            </a:r>
+            <a:r>
+              <a:rPr lang="fr-FR" dirty="0">
+                <a:latin typeface="Times New Roman" panose="02020603050405020304" pitchFamily="18" charset="0"/>
+                <a:cs typeface="Times New Roman" panose="02020603050405020304" pitchFamily="18" charset="0"/>
+              </a:rPr>
+              <a:t> on demandera deux mots à l’utilisateur.</a:t>
+            </a:r>
+          </a:p>
+          <a:p>
+            <a:r>
+              <a:rPr lang="fr-FR" dirty="0">
+                <a:latin typeface="Times New Roman" panose="02020603050405020304" pitchFamily="18" charset="0"/>
+                <a:cs typeface="Times New Roman" panose="02020603050405020304" pitchFamily="18" charset="0"/>
+              </a:rPr>
+              <a:t>Après saisie des paramètres si aucune erreur, afficher le résultat de l’opération.</a:t>
+            </a:r>
+          </a:p>
+          <a:p>
+            <a:r>
+              <a:rPr lang="fr-FR" dirty="0">
+                <a:latin typeface="Times New Roman" panose="02020603050405020304" pitchFamily="18" charset="0"/>
+                <a:cs typeface="Times New Roman" panose="02020603050405020304" pitchFamily="18" charset="0"/>
+              </a:rPr>
+              <a:t>Certaines fonctions ont déjà été créées dans les exercices précédents importer les modules déjà créés et si nécessaire créer de nouveaux modules pour les autres opérations. </a:t>
+            </a:r>
+          </a:p>
+        </p:txBody>
+      </p:sp>
+    </p:spTree>
+    <p:extLst>
+      <p:ext uri="{BB962C8B-B14F-4D97-AF65-F5344CB8AC3E}">
+        <p14:creationId xmlns:p14="http://schemas.microsoft.com/office/powerpoint/2010/main" val="1149221268"/>
+      </p:ext>
+    </p:extLst>
+  </p:cSld>
+  <p:clrMapOvr>
+    <a:masterClrMapping/>
+  </p:clrMapOvr>
+</p:sld>
+</file>
+
+<file path=ppt/slides/slide25.xml><?xml version="1.0" encoding="utf-8"?>
+<p:sld xmlns:a="http://schemas.openxmlformats.org/drawingml/2006/main" xmlns:r="http://schemas.openxmlformats.org/officeDocument/2006/relationships" xmlns:p="http://schemas.openxmlformats.org/presentationml/2006/main">
+  <p:cSld>
+    <p:spTree>
+      <p:nvGrpSpPr>
+        <p:cNvPr id="1" name="">
+          <a:extLst>
+            <a:ext uri="{FF2B5EF4-FFF2-40B4-BE49-F238E27FC236}">
+              <a16:creationId xmlns:a16="http://schemas.microsoft.com/office/drawing/2014/main" id="{CAEBCB0B-08C0-9ED8-B9E2-4E7476BFC459}"/>
+            </a:ext>
+          </a:extLst>
+        </p:cNvPr>
+        <p:cNvGrpSpPr/>
+        <p:nvPr/>
+      </p:nvGrpSpPr>
+      <p:grpSpPr>
+        <a:xfrm>
+          <a:off x="0" y="0"/>
+          <a:ext cx="0" cy="0"/>
+          <a:chOff x="0" y="0"/>
+          <a:chExt cx="0" cy="0"/>
+        </a:xfrm>
+      </p:grpSpPr>
+      <p:sp>
+        <p:nvSpPr>
+          <p:cNvPr id="4" name="Espace réservé du pied de page 3">
+            <a:extLst>
+              <a:ext uri="{FF2B5EF4-FFF2-40B4-BE49-F238E27FC236}">
+                <a16:creationId xmlns:a16="http://schemas.microsoft.com/office/drawing/2014/main" id="{5173318A-CA81-BC24-8B44-7BBA88DA2256}"/>
+              </a:ext>
+            </a:extLst>
+          </p:cNvPr>
+          <p:cNvSpPr>
+            <a:spLocks noGrp="1"/>
+          </p:cNvSpPr>
+          <p:nvPr>
+            <p:ph type="ftr" sz="quarter" idx="11"/>
+          </p:nvPr>
+        </p:nvSpPr>
+        <p:spPr/>
+        <p:txBody>
+          <a:bodyPr/>
+          <a:lstStyle/>
+          <a:p>
+            <a:r>
+              <a:rPr lang="fr-FR"/>
+              <a:t>Cours: Python | Auteur: TUO N. Ismaël Maurice 
+</a:t>
+            </a:r>
+          </a:p>
+        </p:txBody>
+      </p:sp>
+      <p:sp>
+        <p:nvSpPr>
+          <p:cNvPr id="5" name="Espace réservé du numéro de diapositive 4">
+            <a:extLst>
+              <a:ext uri="{FF2B5EF4-FFF2-40B4-BE49-F238E27FC236}">
+                <a16:creationId xmlns:a16="http://schemas.microsoft.com/office/drawing/2014/main" id="{901101FB-269C-6D4A-5678-0A559D3DB5B3}"/>
+              </a:ext>
+            </a:extLst>
+          </p:cNvPr>
+          <p:cNvSpPr>
+            <a:spLocks noGrp="1"/>
+          </p:cNvSpPr>
+          <p:nvPr>
+            <p:ph type="sldNum" sz="quarter" idx="12"/>
+          </p:nvPr>
+        </p:nvSpPr>
+        <p:spPr/>
+        <p:txBody>
+          <a:bodyPr/>
+          <a:lstStyle/>
+          <a:p>
+            <a:fld id="{B8C3BB88-DD29-4D42-B62E-D7D541DB4348}" type="slidenum">
+              <a:rPr lang="fr-FR" smtClean="0"/>
+              <a:t>25</a:t>
+            </a:fld>
+            <a:endParaRPr lang="fr-FR"/>
+          </a:p>
+        </p:txBody>
+      </p:sp>
+      <p:sp>
+        <p:nvSpPr>
+          <p:cNvPr id="6" name="ZoneTexte 5">
+            <a:extLst>
+              <a:ext uri="{FF2B5EF4-FFF2-40B4-BE49-F238E27FC236}">
+                <a16:creationId xmlns:a16="http://schemas.microsoft.com/office/drawing/2014/main" id="{3CF9FBF4-E69B-2757-8AD4-B210CE49F4C1}"/>
+              </a:ext>
+            </a:extLst>
+          </p:cNvPr>
+          <p:cNvSpPr txBox="1"/>
+          <p:nvPr/>
+        </p:nvSpPr>
+        <p:spPr>
+          <a:xfrm>
+            <a:off x="397564" y="218526"/>
+            <a:ext cx="5795005" cy="461665"/>
+          </a:xfrm>
+          <a:prstGeom prst="rect">
+            <a:avLst/>
+          </a:prstGeom>
+          <a:noFill/>
+        </p:spPr>
+        <p:txBody>
+          <a:bodyPr wrap="square" rtlCol="0">
+            <a:spAutoFit/>
+          </a:bodyPr>
+          <a:lstStyle/>
+          <a:p>
+            <a:r>
+              <a:rPr lang="fr-FR" sz="2400" b="1" dirty="0">
+                <a:latin typeface="Times New Roman" panose="02020603050405020304" pitchFamily="18" charset="0"/>
+                <a:cs typeface="Times New Roman" panose="02020603050405020304" pitchFamily="18" charset="0"/>
+              </a:rPr>
+              <a:t>Exercices</a:t>
+            </a:r>
+          </a:p>
+        </p:txBody>
+      </p:sp>
+      <p:cxnSp>
+        <p:nvCxnSpPr>
+          <p:cNvPr id="3" name="Connecteur droit 2">
+            <a:extLst>
+              <a:ext uri="{FF2B5EF4-FFF2-40B4-BE49-F238E27FC236}">
+                <a16:creationId xmlns:a16="http://schemas.microsoft.com/office/drawing/2014/main" id="{837D4DEF-7A01-871E-91EE-6DE1BA002851}"/>
+              </a:ext>
+            </a:extLst>
+          </p:cNvPr>
+          <p:cNvCxnSpPr>
+            <a:cxnSpLocks/>
+          </p:cNvCxnSpPr>
+          <p:nvPr/>
+        </p:nvCxnSpPr>
+        <p:spPr>
+          <a:xfrm>
+            <a:off x="500932" y="680191"/>
+            <a:ext cx="11178450" cy="0"/>
+          </a:xfrm>
+          <a:prstGeom prst="line">
+            <a:avLst/>
+          </a:prstGeom>
+          <a:ln/>
+        </p:spPr>
+        <p:style>
+          <a:lnRef idx="3">
+            <a:schemeClr val="accent3"/>
+          </a:lnRef>
+          <a:fillRef idx="0">
+            <a:schemeClr val="accent3"/>
+          </a:fillRef>
+          <a:effectRef idx="2">
+            <a:schemeClr val="accent3"/>
+          </a:effectRef>
+          <a:fontRef idx="minor">
+            <a:schemeClr val="tx1"/>
+          </a:fontRef>
+        </p:style>
+      </p:cxnSp>
+      <p:sp>
+        <p:nvSpPr>
+          <p:cNvPr id="2" name="ZoneTexte 1">
+            <a:extLst>
+              <a:ext uri="{FF2B5EF4-FFF2-40B4-BE49-F238E27FC236}">
+                <a16:creationId xmlns:a16="http://schemas.microsoft.com/office/drawing/2014/main" id="{9BE65DD0-9CC1-D675-E344-5185A8E7E592}"/>
+              </a:ext>
+            </a:extLst>
+          </p:cNvPr>
+          <p:cNvSpPr txBox="1"/>
+          <p:nvPr/>
+        </p:nvSpPr>
+        <p:spPr>
+          <a:xfrm>
+            <a:off x="397565" y="859559"/>
+            <a:ext cx="11569148" cy="400110"/>
+          </a:xfrm>
+          <a:prstGeom prst="rect">
+            <a:avLst/>
+          </a:prstGeom>
+          <a:noFill/>
+        </p:spPr>
+        <p:txBody>
+          <a:bodyPr wrap="square" rtlCol="0">
+            <a:spAutoFit/>
+          </a:bodyPr>
+          <a:lstStyle/>
+          <a:p>
+            <a:r>
+              <a:rPr lang="fr-FR" sz="2000" b="1" u="sng" dirty="0">
+                <a:latin typeface="Times New Roman" panose="02020603050405020304" pitchFamily="18" charset="0"/>
+                <a:cs typeface="Times New Roman" panose="02020603050405020304" pitchFamily="18" charset="0"/>
+              </a:rPr>
+              <a:t>Mini projet 2</a:t>
+            </a:r>
+          </a:p>
+        </p:txBody>
+      </p:sp>
+      <p:sp>
+        <p:nvSpPr>
+          <p:cNvPr id="7" name="ZoneTexte 6">
+            <a:extLst>
+              <a:ext uri="{FF2B5EF4-FFF2-40B4-BE49-F238E27FC236}">
+                <a16:creationId xmlns:a16="http://schemas.microsoft.com/office/drawing/2014/main" id="{00B648EB-E78D-8422-ED63-D01B0D7EF41C}"/>
+              </a:ext>
+            </a:extLst>
+          </p:cNvPr>
+          <p:cNvSpPr txBox="1"/>
+          <p:nvPr/>
+        </p:nvSpPr>
+        <p:spPr>
+          <a:xfrm>
+            <a:off x="397564" y="1354297"/>
+            <a:ext cx="11088982" cy="4401205"/>
+          </a:xfrm>
+          <a:prstGeom prst="rect">
+            <a:avLst/>
+          </a:prstGeom>
+          <a:noFill/>
+        </p:spPr>
+        <p:txBody>
+          <a:bodyPr wrap="square" rtlCol="0">
+            <a:spAutoFit/>
+          </a:bodyPr>
+          <a:lstStyle>
+            <a:defPPr>
+              <a:defRPr lang="en-US"/>
+            </a:defPPr>
+            <a:lvl1pPr>
+              <a:defRPr sz="2000"/>
+            </a:lvl1pPr>
+          </a:lstStyle>
+          <a:p>
+            <a:r>
+              <a:rPr lang="fr-FR" dirty="0">
+                <a:latin typeface="Times New Roman" panose="02020603050405020304" pitchFamily="18" charset="0"/>
+                <a:cs typeface="Times New Roman" panose="02020603050405020304" pitchFamily="18" charset="0"/>
+              </a:rPr>
+              <a:t>Une molécule d’ADN est formée d’environ six milliards de nucléotides. Dans un brin d’ADN il y’a seulement quatre types de nucléotides qui sont notés A, C, T ou G. Une séquence de d’ADN est donc un long mot de la forme: TAAATTACGA…. </a:t>
+            </a:r>
+          </a:p>
+          <a:p>
+            <a:endParaRPr lang="fr-FR" dirty="0">
+              <a:latin typeface="Times New Roman" panose="02020603050405020304" pitchFamily="18" charset="0"/>
+              <a:cs typeface="Times New Roman" panose="02020603050405020304" pitchFamily="18" charset="0"/>
+            </a:endParaRPr>
+          </a:p>
+          <a:p>
+            <a:r>
+              <a:rPr lang="fr-FR" dirty="0">
+                <a:latin typeface="Times New Roman" panose="02020603050405020304" pitchFamily="18" charset="0"/>
+                <a:cs typeface="Times New Roman" panose="02020603050405020304" pitchFamily="18" charset="0"/>
+              </a:rPr>
+              <a:t>Ecrire une fonction </a:t>
+            </a:r>
+            <a:r>
+              <a:rPr lang="fr-FR" i="1" dirty="0" err="1">
+                <a:latin typeface="Times New Roman" panose="02020603050405020304" pitchFamily="18" charset="0"/>
+                <a:cs typeface="Times New Roman" panose="02020603050405020304" pitchFamily="18" charset="0"/>
+              </a:rPr>
+              <a:t>presence_de_sequence</a:t>
+            </a:r>
+            <a:r>
+              <a:rPr lang="fr-FR" i="1" dirty="0">
+                <a:latin typeface="Times New Roman" panose="02020603050405020304" pitchFamily="18" charset="0"/>
+                <a:cs typeface="Times New Roman" panose="02020603050405020304" pitchFamily="18" charset="0"/>
+              </a:rPr>
+              <a:t>() </a:t>
+            </a:r>
+            <a:r>
+              <a:rPr lang="fr-FR" dirty="0">
+                <a:latin typeface="Times New Roman" panose="02020603050405020304" pitchFamily="18" charset="0"/>
+                <a:cs typeface="Times New Roman" panose="02020603050405020304" pitchFamily="18" charset="0"/>
+              </a:rPr>
+              <a:t>qui teste si une séquence de base contient une séquence de nucléotides donnée composée uniquement de A, C, T ou G. La fonction doit prendre en paramètres la séquence de base et la séquence à chercher.</a:t>
+            </a:r>
+          </a:p>
+          <a:p>
+            <a:endParaRPr lang="fr-FR" dirty="0">
+              <a:latin typeface="Times New Roman" panose="02020603050405020304" pitchFamily="18" charset="0"/>
+              <a:cs typeface="Times New Roman" panose="02020603050405020304" pitchFamily="18" charset="0"/>
+            </a:endParaRPr>
+          </a:p>
+          <a:p>
+            <a:r>
+              <a:rPr lang="fr-FR" dirty="0">
+                <a:latin typeface="Times New Roman" panose="02020603050405020304" pitchFamily="18" charset="0"/>
+                <a:cs typeface="Times New Roman" panose="02020603050405020304" pitchFamily="18" charset="0"/>
+              </a:rPr>
+              <a:t>Un crime a été commis dans un château. On a récupéré deux brins d’ADN, provenant de deux positions éloignées de l’ADN du coupable. Il y’a quatre suspects, dont on a la séquence d’ADN. L’objectif est d’écrire un programme pour trouver le suspect.</a:t>
+            </a:r>
+          </a:p>
+          <a:p>
+            <a:endParaRPr lang="fr-FR" dirty="0">
+              <a:latin typeface="Times New Roman" panose="02020603050405020304" pitchFamily="18" charset="0"/>
+              <a:cs typeface="Times New Roman" panose="02020603050405020304" pitchFamily="18" charset="0"/>
+            </a:endParaRPr>
+          </a:p>
+          <a:p>
+            <a:r>
+              <a:rPr lang="fr-FR" dirty="0">
+                <a:latin typeface="Times New Roman" panose="02020603050405020304" pitchFamily="18" charset="0"/>
+                <a:cs typeface="Times New Roman" panose="02020603050405020304" pitchFamily="18" charset="0"/>
+              </a:rPr>
+              <a:t>Premier code du coupable: CATA</a:t>
+            </a:r>
+          </a:p>
+          <a:p>
+            <a:r>
+              <a:rPr lang="fr-FR" dirty="0">
+                <a:latin typeface="Times New Roman" panose="02020603050405020304" pitchFamily="18" charset="0"/>
+                <a:cs typeface="Times New Roman" panose="02020603050405020304" pitchFamily="18" charset="0"/>
+              </a:rPr>
+              <a:t>Deuxième code du couple: ATGC</a:t>
+            </a:r>
+          </a:p>
+        </p:txBody>
+      </p:sp>
+    </p:spTree>
+    <p:extLst>
+      <p:ext uri="{BB962C8B-B14F-4D97-AF65-F5344CB8AC3E}">
+        <p14:creationId xmlns:p14="http://schemas.microsoft.com/office/powerpoint/2010/main" val="904226985"/>
+      </p:ext>
+    </p:extLst>
+  </p:cSld>
+  <p:clrMapOvr>
+    <a:masterClrMapping/>
+  </p:clrMapOvr>
+</p:sld>
+</file>
+
+<file path=ppt/slides/slide26.xml><?xml version="1.0" encoding="utf-8"?>
+<p:sld xmlns:a="http://schemas.openxmlformats.org/drawingml/2006/main" xmlns:r="http://schemas.openxmlformats.org/officeDocument/2006/relationships" xmlns:p="http://schemas.openxmlformats.org/presentationml/2006/main">
+  <p:cSld>
+    <p:spTree>
+      <p:nvGrpSpPr>
+        <p:cNvPr id="1" name="">
+          <a:extLst>
+            <a:ext uri="{FF2B5EF4-FFF2-40B4-BE49-F238E27FC236}">
+              <a16:creationId xmlns:a16="http://schemas.microsoft.com/office/drawing/2014/main" id="{8B8E7F84-4AC1-D7E1-631E-436AF0982344}"/>
+            </a:ext>
+          </a:extLst>
+        </p:cNvPr>
+        <p:cNvGrpSpPr/>
+        <p:nvPr/>
+      </p:nvGrpSpPr>
+      <p:grpSpPr>
+        <a:xfrm>
+          <a:off x="0" y="0"/>
+          <a:ext cx="0" cy="0"/>
+          <a:chOff x="0" y="0"/>
+          <a:chExt cx="0" cy="0"/>
+        </a:xfrm>
+      </p:grpSpPr>
+      <p:sp>
+        <p:nvSpPr>
+          <p:cNvPr id="4" name="Espace réservé du pied de page 3">
+            <a:extLst>
+              <a:ext uri="{FF2B5EF4-FFF2-40B4-BE49-F238E27FC236}">
+                <a16:creationId xmlns:a16="http://schemas.microsoft.com/office/drawing/2014/main" id="{00F64E29-85BF-39E8-FD12-21E812784276}"/>
+              </a:ext>
+            </a:extLst>
+          </p:cNvPr>
+          <p:cNvSpPr>
+            <a:spLocks noGrp="1"/>
+          </p:cNvSpPr>
+          <p:nvPr>
+            <p:ph type="ftr" sz="quarter" idx="11"/>
+          </p:nvPr>
+        </p:nvSpPr>
+        <p:spPr/>
+        <p:txBody>
+          <a:bodyPr/>
+          <a:lstStyle/>
+          <a:p>
+            <a:r>
+              <a:rPr lang="fr-FR"/>
+              <a:t>Cours: Python | Auteur: TUO N. Ismaël Maurice 
+</a:t>
+            </a:r>
+          </a:p>
+        </p:txBody>
+      </p:sp>
+      <p:sp>
+        <p:nvSpPr>
+          <p:cNvPr id="5" name="Espace réservé du numéro de diapositive 4">
+            <a:extLst>
+              <a:ext uri="{FF2B5EF4-FFF2-40B4-BE49-F238E27FC236}">
+                <a16:creationId xmlns:a16="http://schemas.microsoft.com/office/drawing/2014/main" id="{4ED3554F-9E90-F73A-0C31-3CCB641BAF4B}"/>
+              </a:ext>
+            </a:extLst>
+          </p:cNvPr>
+          <p:cNvSpPr>
+            <a:spLocks noGrp="1"/>
+          </p:cNvSpPr>
+          <p:nvPr>
+            <p:ph type="sldNum" sz="quarter" idx="12"/>
+          </p:nvPr>
+        </p:nvSpPr>
+        <p:spPr/>
+        <p:txBody>
+          <a:bodyPr/>
+          <a:lstStyle/>
+          <a:p>
+            <a:fld id="{B8C3BB88-DD29-4D42-B62E-D7D541DB4348}" type="slidenum">
+              <a:rPr lang="fr-FR" smtClean="0"/>
+              <a:t>26</a:t>
+            </a:fld>
+            <a:endParaRPr lang="fr-FR"/>
+          </a:p>
+        </p:txBody>
+      </p:sp>
+      <p:sp>
+        <p:nvSpPr>
+          <p:cNvPr id="6" name="ZoneTexte 5">
+            <a:extLst>
+              <a:ext uri="{FF2B5EF4-FFF2-40B4-BE49-F238E27FC236}">
+                <a16:creationId xmlns:a16="http://schemas.microsoft.com/office/drawing/2014/main" id="{D6A73F3D-0F77-9562-B7F5-79B86B2F626E}"/>
+              </a:ext>
+            </a:extLst>
+          </p:cNvPr>
+          <p:cNvSpPr txBox="1"/>
+          <p:nvPr/>
+        </p:nvSpPr>
+        <p:spPr>
+          <a:xfrm>
+            <a:off x="397564" y="218526"/>
+            <a:ext cx="5795005" cy="461665"/>
+          </a:xfrm>
+          <a:prstGeom prst="rect">
+            <a:avLst/>
+          </a:prstGeom>
+          <a:noFill/>
+        </p:spPr>
+        <p:txBody>
+          <a:bodyPr wrap="square" rtlCol="0">
+            <a:spAutoFit/>
+          </a:bodyPr>
+          <a:lstStyle/>
+          <a:p>
+            <a:r>
+              <a:rPr lang="fr-FR" sz="2400" b="1" dirty="0">
+                <a:latin typeface="Times New Roman" panose="02020603050405020304" pitchFamily="18" charset="0"/>
+                <a:cs typeface="Times New Roman" panose="02020603050405020304" pitchFamily="18" charset="0"/>
+              </a:rPr>
+              <a:t>Exercices</a:t>
+            </a:r>
+          </a:p>
+        </p:txBody>
+      </p:sp>
+      <p:cxnSp>
+        <p:nvCxnSpPr>
+          <p:cNvPr id="3" name="Connecteur droit 2">
+            <a:extLst>
+              <a:ext uri="{FF2B5EF4-FFF2-40B4-BE49-F238E27FC236}">
+                <a16:creationId xmlns:a16="http://schemas.microsoft.com/office/drawing/2014/main" id="{B6D6AB20-DD88-8474-ACC1-D50F090D5790}"/>
+              </a:ext>
+            </a:extLst>
+          </p:cNvPr>
+          <p:cNvCxnSpPr>
+            <a:cxnSpLocks/>
+          </p:cNvCxnSpPr>
+          <p:nvPr/>
+        </p:nvCxnSpPr>
+        <p:spPr>
+          <a:xfrm>
+            <a:off x="500932" y="680191"/>
+            <a:ext cx="11178450" cy="0"/>
+          </a:xfrm>
+          <a:prstGeom prst="line">
+            <a:avLst/>
+          </a:prstGeom>
+          <a:ln/>
+        </p:spPr>
+        <p:style>
+          <a:lnRef idx="3">
+            <a:schemeClr val="accent3"/>
+          </a:lnRef>
+          <a:fillRef idx="0">
+            <a:schemeClr val="accent3"/>
+          </a:fillRef>
+          <a:effectRef idx="2">
+            <a:schemeClr val="accent3"/>
+          </a:effectRef>
+          <a:fontRef idx="minor">
+            <a:schemeClr val="tx1"/>
+          </a:fontRef>
+        </p:style>
+      </p:cxnSp>
+      <p:sp>
+        <p:nvSpPr>
+          <p:cNvPr id="2" name="ZoneTexte 1">
+            <a:extLst>
+              <a:ext uri="{FF2B5EF4-FFF2-40B4-BE49-F238E27FC236}">
+                <a16:creationId xmlns:a16="http://schemas.microsoft.com/office/drawing/2014/main" id="{90F4B3F9-2EEE-96F6-A03C-648C128FC0AD}"/>
+              </a:ext>
+            </a:extLst>
+          </p:cNvPr>
+          <p:cNvSpPr txBox="1"/>
+          <p:nvPr/>
+        </p:nvSpPr>
+        <p:spPr>
+          <a:xfrm>
+            <a:off x="397565" y="859559"/>
+            <a:ext cx="11569148" cy="400110"/>
+          </a:xfrm>
+          <a:prstGeom prst="rect">
+            <a:avLst/>
+          </a:prstGeom>
+          <a:noFill/>
+        </p:spPr>
+        <p:txBody>
+          <a:bodyPr wrap="square" rtlCol="0">
+            <a:spAutoFit/>
+          </a:bodyPr>
+          <a:lstStyle/>
+          <a:p>
+            <a:r>
+              <a:rPr lang="fr-FR" sz="2000" b="1" u="sng" dirty="0">
+                <a:latin typeface="Times New Roman" panose="02020603050405020304" pitchFamily="18" charset="0"/>
+                <a:cs typeface="Times New Roman" panose="02020603050405020304" pitchFamily="18" charset="0"/>
+              </a:rPr>
+              <a:t>Mini projet 2 suite</a:t>
+            </a:r>
+          </a:p>
+        </p:txBody>
+      </p:sp>
+      <p:sp>
+        <p:nvSpPr>
+          <p:cNvPr id="7" name="ZoneTexte 6">
+            <a:extLst>
+              <a:ext uri="{FF2B5EF4-FFF2-40B4-BE49-F238E27FC236}">
+                <a16:creationId xmlns:a16="http://schemas.microsoft.com/office/drawing/2014/main" id="{FF49131C-778E-0C04-8D1A-F576A6DDE97B}"/>
+              </a:ext>
+            </a:extLst>
+          </p:cNvPr>
+          <p:cNvSpPr txBox="1"/>
+          <p:nvPr/>
+        </p:nvSpPr>
+        <p:spPr>
+          <a:xfrm>
+            <a:off x="397564" y="1748062"/>
+            <a:ext cx="11088982" cy="1015663"/>
+          </a:xfrm>
+          <a:prstGeom prst="rect">
+            <a:avLst/>
+          </a:prstGeom>
+          <a:noFill/>
+        </p:spPr>
+        <p:txBody>
+          <a:bodyPr wrap="square" rtlCol="0">
+            <a:spAutoFit/>
+          </a:bodyPr>
+          <a:lstStyle>
+            <a:defPPr>
+              <a:defRPr lang="en-US"/>
+            </a:defPPr>
+            <a:lvl1pPr>
+              <a:defRPr sz="2000"/>
+            </a:lvl1pPr>
+          </a:lstStyle>
+          <a:p>
+            <a:r>
+              <a:rPr lang="fr-FR" dirty="0">
+                <a:latin typeface="Times New Roman" panose="02020603050405020304" pitchFamily="18" charset="0"/>
+                <a:cs typeface="Times New Roman" panose="02020603050405020304" pitchFamily="18" charset="0"/>
+              </a:rPr>
+              <a:t>ADN du Mr Léo</a:t>
+            </a:r>
+          </a:p>
+          <a:p>
+            <a:r>
+              <a:rPr lang="fr-FR" dirty="0"/>
+              <a:t>CCTGGAGGGTGGCCCCACCGGCCGAGACAGCGAGCATATGCAGGAAGCGGCAGGAATAAGGAAAAGCAGC</a:t>
+            </a:r>
+            <a:endParaRPr lang="fr-FR" dirty="0">
+              <a:latin typeface="Times New Roman" panose="02020603050405020304" pitchFamily="18" charset="0"/>
+              <a:cs typeface="Times New Roman" panose="02020603050405020304" pitchFamily="18" charset="0"/>
+            </a:endParaRPr>
+          </a:p>
+        </p:txBody>
+      </p:sp>
+      <p:sp>
+        <p:nvSpPr>
+          <p:cNvPr id="8" name="ZoneTexte 7">
+            <a:extLst>
+              <a:ext uri="{FF2B5EF4-FFF2-40B4-BE49-F238E27FC236}">
+                <a16:creationId xmlns:a16="http://schemas.microsoft.com/office/drawing/2014/main" id="{FA8A0F0E-D4E2-D496-6D58-CB291DAA0657}"/>
+              </a:ext>
+            </a:extLst>
+          </p:cNvPr>
+          <p:cNvSpPr txBox="1"/>
+          <p:nvPr/>
+        </p:nvSpPr>
+        <p:spPr>
+          <a:xfrm>
+            <a:off x="397564" y="2877132"/>
+            <a:ext cx="11088982" cy="1015663"/>
+          </a:xfrm>
+          <a:prstGeom prst="rect">
+            <a:avLst/>
+          </a:prstGeom>
+          <a:noFill/>
+        </p:spPr>
+        <p:txBody>
+          <a:bodyPr wrap="square" rtlCol="0">
+            <a:spAutoFit/>
+          </a:bodyPr>
+          <a:lstStyle>
+            <a:defPPr>
+              <a:defRPr lang="en-US"/>
+            </a:defPPr>
+            <a:lvl1pPr>
+              <a:defRPr sz="2000"/>
+            </a:lvl1pPr>
+          </a:lstStyle>
+          <a:p>
+            <a:r>
+              <a:rPr lang="fr-FR" dirty="0">
+                <a:latin typeface="Times New Roman" panose="02020603050405020304" pitchFamily="18" charset="0"/>
+                <a:cs typeface="Times New Roman" panose="02020603050405020304" pitchFamily="18" charset="0"/>
+              </a:rPr>
+              <a:t>ADN du Mlle Rose</a:t>
+            </a:r>
+          </a:p>
+          <a:p>
+            <a:r>
+              <a:rPr lang="fr-FR" dirty="0"/>
+              <a:t>CTCCTGATGCTCCTCGCTTGGTGGTTTGAGTGGACCTCCCAGGCCAGTGCCGGGCCCCTCATAGGAGAGG</a:t>
+            </a:r>
+            <a:endParaRPr lang="fr-FR" dirty="0">
+              <a:latin typeface="Times New Roman" panose="02020603050405020304" pitchFamily="18" charset="0"/>
+              <a:cs typeface="Times New Roman" panose="02020603050405020304" pitchFamily="18" charset="0"/>
+            </a:endParaRPr>
+          </a:p>
+        </p:txBody>
+      </p:sp>
+      <p:sp>
+        <p:nvSpPr>
+          <p:cNvPr id="9" name="ZoneTexte 8">
+            <a:extLst>
+              <a:ext uri="{FF2B5EF4-FFF2-40B4-BE49-F238E27FC236}">
+                <a16:creationId xmlns:a16="http://schemas.microsoft.com/office/drawing/2014/main" id="{70CADEEA-B8BD-4059-237C-DF5641FE8781}"/>
+              </a:ext>
+            </a:extLst>
+          </p:cNvPr>
+          <p:cNvSpPr txBox="1"/>
+          <p:nvPr/>
+        </p:nvSpPr>
+        <p:spPr>
+          <a:xfrm>
+            <a:off x="326280" y="3987423"/>
+            <a:ext cx="11088982" cy="1015663"/>
+          </a:xfrm>
+          <a:prstGeom prst="rect">
+            <a:avLst/>
+          </a:prstGeom>
+          <a:noFill/>
+        </p:spPr>
+        <p:txBody>
+          <a:bodyPr wrap="square" rtlCol="0">
+            <a:spAutoFit/>
+          </a:bodyPr>
+          <a:lstStyle>
+            <a:defPPr>
+              <a:defRPr lang="en-US"/>
+            </a:defPPr>
+            <a:lvl1pPr>
+              <a:defRPr sz="2000"/>
+            </a:lvl1pPr>
+          </a:lstStyle>
+          <a:p>
+            <a:r>
+              <a:rPr lang="fr-FR" dirty="0">
+                <a:latin typeface="Times New Roman" panose="02020603050405020304" pitchFamily="18" charset="0"/>
+                <a:cs typeface="Times New Roman" panose="02020603050405020304" pitchFamily="18" charset="0"/>
+              </a:rPr>
+              <a:t>ADN du Mr Bob</a:t>
+            </a:r>
+          </a:p>
+          <a:p>
+            <a:r>
+              <a:rPr lang="fr-FR" dirty="0"/>
+              <a:t>AAGCTCGGGAGGTGGCCAGGCGGCAGGAAGGCGCACCCCCCCAGTACTCCGCGCGCCGGGACAGAATGCC</a:t>
+            </a:r>
+            <a:endParaRPr lang="fr-FR" dirty="0">
+              <a:latin typeface="Times New Roman" panose="02020603050405020304" pitchFamily="18" charset="0"/>
+              <a:cs typeface="Times New Roman" panose="02020603050405020304" pitchFamily="18" charset="0"/>
+            </a:endParaRPr>
+          </a:p>
+        </p:txBody>
+      </p:sp>
+      <p:sp>
+        <p:nvSpPr>
+          <p:cNvPr id="10" name="ZoneTexte 9">
+            <a:extLst>
+              <a:ext uri="{FF2B5EF4-FFF2-40B4-BE49-F238E27FC236}">
+                <a16:creationId xmlns:a16="http://schemas.microsoft.com/office/drawing/2014/main" id="{0CC0C452-B14A-D713-32C0-4EEAE8D83C06}"/>
+              </a:ext>
+            </a:extLst>
+          </p:cNvPr>
+          <p:cNvSpPr txBox="1"/>
+          <p:nvPr/>
+        </p:nvSpPr>
+        <p:spPr>
+          <a:xfrm>
+            <a:off x="397564" y="5125917"/>
+            <a:ext cx="11088982" cy="1015663"/>
+          </a:xfrm>
+          <a:prstGeom prst="rect">
+            <a:avLst/>
+          </a:prstGeom>
+          <a:noFill/>
+        </p:spPr>
+        <p:txBody>
+          <a:bodyPr wrap="square" rtlCol="0">
+            <a:spAutoFit/>
+          </a:bodyPr>
+          <a:lstStyle>
+            <a:defPPr>
+              <a:defRPr lang="en-US"/>
+            </a:defPPr>
+            <a:lvl1pPr>
+              <a:defRPr sz="2000"/>
+            </a:lvl1pPr>
+          </a:lstStyle>
+          <a:p>
+            <a:r>
+              <a:rPr lang="fr-FR" dirty="0">
+                <a:latin typeface="Times New Roman" panose="02020603050405020304" pitchFamily="18" charset="0"/>
+                <a:cs typeface="Times New Roman" panose="02020603050405020304" pitchFamily="18" charset="0"/>
+              </a:rPr>
+              <a:t>ADN du Mme Prouesse</a:t>
+            </a:r>
+          </a:p>
+          <a:p>
+            <a:r>
+              <a:rPr lang="fr-FR" dirty="0"/>
+              <a:t>CTGCAGGAACTTCTTCTGGAAGTACTTCTCCTCCTGCAAATAAAACCTCACCCATGAATGCTCACGCAAG</a:t>
+            </a:r>
+            <a:endParaRPr lang="fr-FR" dirty="0">
+              <a:latin typeface="Times New Roman" panose="02020603050405020304" pitchFamily="18" charset="0"/>
+              <a:cs typeface="Times New Roman" panose="02020603050405020304" pitchFamily="18" charset="0"/>
+            </a:endParaRPr>
+          </a:p>
+        </p:txBody>
+      </p:sp>
+      <p:sp>
+        <p:nvSpPr>
+          <p:cNvPr id="11" name="ZoneTexte 10">
+            <a:extLst>
+              <a:ext uri="{FF2B5EF4-FFF2-40B4-BE49-F238E27FC236}">
+                <a16:creationId xmlns:a16="http://schemas.microsoft.com/office/drawing/2014/main" id="{67DB418B-C841-7310-7F9E-AD1A86E0D796}"/>
+              </a:ext>
+            </a:extLst>
+          </p:cNvPr>
+          <p:cNvSpPr txBox="1"/>
+          <p:nvPr/>
+        </p:nvSpPr>
+        <p:spPr>
+          <a:xfrm>
+            <a:off x="397564" y="1319871"/>
+            <a:ext cx="11088982" cy="400110"/>
+          </a:xfrm>
+          <a:prstGeom prst="rect">
+            <a:avLst/>
+          </a:prstGeom>
+          <a:noFill/>
+        </p:spPr>
+        <p:txBody>
+          <a:bodyPr wrap="square" rtlCol="0">
+            <a:spAutoFit/>
+          </a:bodyPr>
+          <a:lstStyle>
+            <a:defPPr>
+              <a:defRPr lang="en-US"/>
+            </a:defPPr>
+            <a:lvl1pPr>
+              <a:defRPr sz="2000"/>
+            </a:lvl1pPr>
+          </a:lstStyle>
+          <a:p>
+            <a:r>
+              <a:rPr lang="fr-FR" dirty="0">
+                <a:latin typeface="Times New Roman" panose="02020603050405020304" pitchFamily="18" charset="0"/>
+                <a:cs typeface="Times New Roman" panose="02020603050405020304" pitchFamily="18" charset="0"/>
+              </a:rPr>
+              <a:t>La liste des coupables:</a:t>
+            </a:r>
+          </a:p>
+        </p:txBody>
+      </p:sp>
+    </p:spTree>
+    <p:extLst>
+      <p:ext uri="{BB962C8B-B14F-4D97-AF65-F5344CB8AC3E}">
+        <p14:creationId xmlns:p14="http://schemas.microsoft.com/office/powerpoint/2010/main" val="3738375972"/>
+      </p:ext>
+    </p:extLst>
+  </p:cSld>
+  <p:clrMapOvr>
+    <a:masterClrMapping/>
+  </p:clrMapOvr>
+</p:sld>
+</file>
+
+<file path=ppt/slides/slide27.xml><?xml version="1.0" encoding="utf-8"?>
 <p:sld xmlns:a="http://schemas.openxmlformats.org/drawingml/2006/main" xmlns:r="http://schemas.openxmlformats.org/officeDocument/2006/relationships" xmlns:p="http://schemas.openxmlformats.org/presentationml/2006/main">
   <p:cSld>
     <p:spTree>
@@ -13628,7 +16284,21 @@
                 <a:latin typeface="Times New Roman" panose="02020603050405020304" pitchFamily="18" charset="0"/>
                 <a:cs typeface="Times New Roman" panose="02020603050405020304" pitchFamily="18" charset="0"/>
               </a:rPr>
-              <a:t>Les chaines de caractères vont nous permettre de stocker et traiter des valeurs alphanumériques des chiffres et des lettres comme « Chat, Chien, Toto1,… ». C’est un type d’objet incontournable en programmation.</a:t>
+              <a:t>Les chaines de caractères vont nous permettre de stocker et traiter des valeurs alphanumériques (chiffres et </a:t>
+            </a:r>
+            <a:r>
+              <a:rPr lang="fr-FR" sz="2000" dirty="0" err="1">
+                <a:latin typeface="Times New Roman" panose="02020603050405020304" pitchFamily="18" charset="0"/>
+                <a:cs typeface="Times New Roman" panose="02020603050405020304" pitchFamily="18" charset="0"/>
+              </a:rPr>
+              <a:t>et</a:t>
+            </a:r>
+            <a:r>
+              <a:rPr lang="fr-FR" sz="2000" dirty="0">
+                <a:latin typeface="Times New Roman" panose="02020603050405020304" pitchFamily="18" charset="0"/>
+                <a:cs typeface="Times New Roman" panose="02020603050405020304" pitchFamily="18" charset="0"/>
+              </a:rPr>
+              <a:t> lettres) comme « Chat, Chien, Toto1,… ». C’est un type d’objet incontournable en programmation.</a:t>
             </a:r>
           </a:p>
         </p:txBody>
@@ -14168,7 +16838,7 @@
                 <a:latin typeface="Times New Roman" panose="02020603050405020304" pitchFamily="18" charset="0"/>
                 <a:cs typeface="Times New Roman" panose="02020603050405020304" pitchFamily="18" charset="0"/>
               </a:rPr>
-              <a:t> est issu d’une classe. La classe est une forme de type de donnée qui permet de définir des fonctions et variables propres au type. Dans le cas des chaines de caractères on a les fonctions comme mettre en minuscule, majuscule… fournies par les développeurs de Python.</a:t>
+              <a:t> est issu d’une classe. La classe est une forme de type de données qui permet de définir des fonctions et variables propres au type. Dans le cas des chaines de caractères on a les fonctions comme mettre en minuscule, majuscule… fournies par les développeurs de Python.</a:t>
             </a:r>
           </a:p>
         </p:txBody>
@@ -15341,8 +18011,8 @@
         </p:blipFill>
         <p:spPr>
           <a:xfrm>
-            <a:off x="3506076" y="5306400"/>
-            <a:ext cx="3772910" cy="914479"/>
+            <a:off x="3295066" y="5222573"/>
+            <a:ext cx="3772910" cy="1035919"/>
           </a:xfrm>
           <a:prstGeom prst="rect">
             <a:avLst/>
@@ -15603,7 +18273,7 @@
                 <a:latin typeface="Times New Roman" panose="02020603050405020304" pitchFamily="18" charset="0"/>
                 <a:cs typeface="Times New Roman" panose="02020603050405020304" pitchFamily="18" charset="0"/>
               </a:rPr>
-              <a:t>Par contre pour afficher une chaine avec le contenu d’une ou plusieurs variables, on utilisera les méthodes de formatage de chaînes de caractères.</a:t>
+              <a:t>Cependant pour afficher une chaine avec le contenu d’une ou plusieurs variables, on utilisera les méthodes de formatage de chaînes de caractères.</a:t>
             </a:r>
           </a:p>
         </p:txBody>
@@ -15655,7 +18325,7 @@
                 <a:latin typeface="Times New Roman" panose="02020603050405020304" pitchFamily="18" charset="0"/>
                 <a:cs typeface="Times New Roman" panose="02020603050405020304" pitchFamily="18" charset="0"/>
               </a:rPr>
-              <a:t>qui permet de formatter une chaine.</a:t>
+              <a:t>pour formatter une chaine.</a:t>
             </a:r>
           </a:p>
         </p:txBody>
@@ -15690,8 +18360,8 @@
           </a:prstGeom>
         </p:spPr>
       </p:pic>
-      <mc:AlternateContent xmlns:mc="http://schemas.openxmlformats.org/markup-compatibility/2006" xmlns:a14="http://schemas.microsoft.com/office/drawing/2010/main">
-        <mc:Choice Requires="a14">
+      <mc:AlternateContent xmlns:mc="http://schemas.openxmlformats.org/markup-compatibility/2006">
+        <mc:Choice xmlns:a14="http://schemas.microsoft.com/office/drawing/2010/main" Requires="a14">
           <p:sp>
             <p:nvSpPr>
               <p:cNvPr id="10" name="ZoneTexte 9">
@@ -15725,21 +18395,7 @@
                     <a:latin typeface="Times New Roman" panose="02020603050405020304" pitchFamily="18" charset="0"/>
                     <a:cs typeface="Times New Roman" panose="02020603050405020304" pitchFamily="18" charset="0"/>
                   </a:rPr>
-                  <a:t>La méthode </a:t>
-                </a:r>
-                <a:r>
-                  <a:rPr lang="fr-FR" sz="2000" b="1" dirty="0">
-                    <a:latin typeface="Times New Roman" panose="02020603050405020304" pitchFamily="18" charset="0"/>
-                    <a:cs typeface="Times New Roman" panose="02020603050405020304" pitchFamily="18" charset="0"/>
-                  </a:rPr>
-                  <a:t>format </a:t>
-                </a:r>
-                <a:r>
-                  <a:rPr lang="fr-FR" sz="2000" dirty="0">
-                    <a:latin typeface="Times New Roman" panose="02020603050405020304" pitchFamily="18" charset="0"/>
-                    <a:cs typeface="Times New Roman" panose="02020603050405020304" pitchFamily="18" charset="0"/>
-                  </a:rPr>
-                  <a:t>permet de formater une chaîne de gauche à droite on a:</a:t>
+                  <a:t>De gauche à droite on a:</a:t>
                 </a:r>
               </a:p>
               <a:p>
@@ -15834,7 +18490,7 @@
             </p:txBody>
           </p:sp>
         </mc:Choice>
-        <mc:Fallback xmlns="">
+        <mc:Fallback>
           <p:sp>
             <p:nvSpPr>
               <p:cNvPr id="10" name="ZoneTexte 9">
@@ -16126,8 +18782,8 @@
           </a:prstGeom>
         </p:spPr>
       </p:pic>
-      <mc:AlternateContent xmlns:mc="http://schemas.openxmlformats.org/markup-compatibility/2006" xmlns:a14="http://schemas.microsoft.com/office/drawing/2010/main">
-        <mc:Choice Requires="a14">
+      <mc:AlternateContent xmlns:mc="http://schemas.openxmlformats.org/markup-compatibility/2006">
+        <mc:Choice xmlns:a14="http://schemas.microsoft.com/office/drawing/2010/main" Requires="a14">
           <p:sp>
             <p:nvSpPr>
               <p:cNvPr id="13" name="ZoneTexte 12">
@@ -16161,7 +18817,7 @@
                     <a:latin typeface="Times New Roman" panose="02020603050405020304" pitchFamily="18" charset="0"/>
                     <a:cs typeface="Times New Roman" panose="02020603050405020304" pitchFamily="18" charset="0"/>
                   </a:rPr>
-                  <a:t>L’ordre des entre les accolades {} est importante le premier paramètre de format correspond à l’élément </a:t>
+                  <a:t>L’ordre entre les accolades {} est importante le premier paramètre de format correspond à l’élément </a:t>
                 </a:r>
                 <a14:m>
                   <m:oMath xmlns:m="http://schemas.openxmlformats.org/officeDocument/2006/math">
@@ -16185,7 +18841,7 @@
             </p:txBody>
           </p:sp>
         </mc:Choice>
-        <mc:Fallback xmlns="">
+        <mc:Fallback>
           <p:sp>
             <p:nvSpPr>
               <p:cNvPr id="13" name="ZoneTexte 12">
@@ -16293,7 +18949,7 @@
                 <a:latin typeface="Times New Roman" panose="02020603050405020304" pitchFamily="18" charset="0"/>
                 <a:cs typeface="Times New Roman" panose="02020603050405020304" pitchFamily="18" charset="0"/>
               </a:rPr>
-              <a:t>On peut ne pas spécifier des valeurs dans entre les accolades dans ce cas c’est le format naturel qui sera pris en compte.</a:t>
+              <a:t>On peut ne pas spécifier des valeurs entre les accolades dans ce cas c’est l’ordre de format qui sera pris en compte.</a:t>
             </a:r>
           </a:p>
         </p:txBody>
@@ -16575,7 +19231,7 @@
         </p:nvSpPr>
         <p:spPr>
           <a:xfrm>
-            <a:off x="655028" y="1935392"/>
+            <a:off x="552616" y="1941411"/>
             <a:ext cx="11075082" cy="707886"/>
           </a:xfrm>
           <a:prstGeom prst="rect">
@@ -16594,7 +19250,7 @@
                 <a:latin typeface="Times New Roman" panose="02020603050405020304" pitchFamily="18" charset="0"/>
                 <a:cs typeface="Times New Roman" panose="02020603050405020304" pitchFamily="18" charset="0"/>
               </a:rPr>
-              <a:t>Python propose une autre méthode la </a:t>
+              <a:t>Python propose aussi une autre méthode la </a:t>
             </a:r>
             <a:r>
               <a:rPr lang="fr-FR" sz="2000" b="1" dirty="0">
@@ -16622,7 +19278,7 @@
                 <a:latin typeface="Times New Roman" panose="02020603050405020304" pitchFamily="18" charset="0"/>
                 <a:cs typeface="Times New Roman" panose="02020603050405020304" pitchFamily="18" charset="0"/>
               </a:rPr>
-              <a:t>En plus avec la f-string on peut afficher le nom de variable.</a:t>
+              <a:t>De plus avec la f-string on peut afficher le nom de variable.</a:t>
             </a:r>
           </a:p>
         </p:txBody>
@@ -16671,7 +19327,7 @@
         </p:nvSpPr>
         <p:spPr>
           <a:xfrm>
-            <a:off x="552616" y="5326291"/>
+            <a:off x="552616" y="5300632"/>
             <a:ext cx="11075082" cy="707886"/>
           </a:xfrm>
           <a:prstGeom prst="rect">

</xml_diff>

<commit_message>
Feat (chp3): Correction exo plus
</commit_message>
<xml_diff>
--- a/source/Chapitre 8 - Les chaines de caractères.pptx
+++ b/source/Chapitre 8 - Les chaines de caractères.pptx
@@ -144,7 +144,7 @@
 <file path=ppt/revisionInfo.xml><?xml version="1.0" encoding="utf-8"?>
 <p1510:revInfo xmlns:a="http://schemas.openxmlformats.org/drawingml/2006/main" xmlns:r="http://schemas.openxmlformats.org/officeDocument/2006/relationships" xmlns:p1510="http://schemas.microsoft.com/office/powerpoint/2015/10/main">
   <p1510:revLst>
-    <p1510:client id="{0EB52ED8-BDDA-42B4-90C4-1B322ACD0F02}" v="2783" dt="2024-02-20T14:10:22.272"/>
+    <p1510:client id="{0EB52ED8-BDDA-42B4-90C4-1B322ACD0F02}" v="2786" dt="2024-02-20T16:09:40.954"/>
   </p1510:revLst>
 </p1510:revInfo>
 </file>
@@ -154,18 +154,18 @@
   <pc:docChgLst>
     <pc:chgData name="Ismaël Tuo" userId="fca7baf0e513a1e6" providerId="LiveId" clId="{0EB52ED8-BDDA-42B4-90C4-1B322ACD0F02}"/>
     <pc:docChg chg="undo custSel addSld delSld modSld sldOrd">
-      <pc:chgData name="Ismaël Tuo" userId="fca7baf0e513a1e6" providerId="LiveId" clId="{0EB52ED8-BDDA-42B4-90C4-1B322ACD0F02}" dt="2024-02-20T14:10:38.576" v="23635" actId="1076"/>
+      <pc:chgData name="Ismaël Tuo" userId="fca7baf0e513a1e6" providerId="LiveId" clId="{0EB52ED8-BDDA-42B4-90C4-1B322ACD0F02}" dt="2024-02-20T16:09:40.954" v="23638" actId="20577"/>
       <pc:docMkLst>
         <pc:docMk/>
       </pc:docMkLst>
       <pc:sldChg chg="modSp mod">
-        <pc:chgData name="Ismaël Tuo" userId="fca7baf0e513a1e6" providerId="LiveId" clId="{0EB52ED8-BDDA-42B4-90C4-1B322ACD0F02}" dt="2024-01-14T12:09:16.934" v="35" actId="20577"/>
+        <pc:chgData name="Ismaël Tuo" userId="fca7baf0e513a1e6" providerId="LiveId" clId="{0EB52ED8-BDDA-42B4-90C4-1B322ACD0F02}" dt="2024-02-20T16:09:40.954" v="23638" actId="20577"/>
         <pc:sldMkLst>
           <pc:docMk/>
           <pc:sldMk cId="0" sldId="257"/>
         </pc:sldMkLst>
         <pc:spChg chg="mod">
-          <ac:chgData name="Ismaël Tuo" userId="fca7baf0e513a1e6" providerId="LiveId" clId="{0EB52ED8-BDDA-42B4-90C4-1B322ACD0F02}" dt="2024-01-14T12:09:16.934" v="35" actId="20577"/>
+          <ac:chgData name="Ismaël Tuo" userId="fca7baf0e513a1e6" providerId="LiveId" clId="{0EB52ED8-BDDA-42B4-90C4-1B322ACD0F02}" dt="2024-02-20T16:09:40.954" v="23638" actId="20577"/>
           <ac:spMkLst>
             <pc:docMk/>
             <pc:sldMk cId="0" sldId="257"/>
@@ -5753,8 +5753,21 @@
                   <a:schemeClr val="tx1"/>
                 </a:solidFill>
               </a:rPr>
-              <a:t>Chapitre 8: Les chaînes de caractères</a:t>
-            </a:r>
+              <a:t>Chapitre 8: Les chaînes </a:t>
+            </a:r>
+            <a:r>
+              <a:rPr lang="fr-FR" sz="2800">
+                <a:solidFill>
+                  <a:schemeClr val="tx1"/>
+                </a:solidFill>
+              </a:rPr>
+              <a:t>de caractères </a:t>
+            </a:r>
+            <a:endParaRPr lang="fr-FR" sz="2800" dirty="0">
+              <a:solidFill>
+                <a:schemeClr val="tx1"/>
+              </a:solidFill>
+            </a:endParaRPr>
           </a:p>
         </p:txBody>
       </p:sp>
@@ -7999,8 +8012,8 @@
           </p:sp>
         </p:grpSp>
       </p:grpSp>
-      <mc:AlternateContent xmlns:mc="http://schemas.openxmlformats.org/markup-compatibility/2006">
-        <mc:Choice xmlns:a14="http://schemas.microsoft.com/office/drawing/2010/main" Requires="a14">
+      <mc:AlternateContent xmlns:mc="http://schemas.openxmlformats.org/markup-compatibility/2006" xmlns:a14="http://schemas.microsoft.com/office/drawing/2010/main">
+        <mc:Choice Requires="a14">
           <p:sp>
             <p:nvSpPr>
               <p:cNvPr id="55" name="ZoneTexte 54">
@@ -8093,7 +8106,7 @@
             </p:txBody>
           </p:sp>
         </mc:Choice>
-        <mc:Fallback>
+        <mc:Fallback xmlns="">
           <p:sp>
             <p:nvSpPr>
               <p:cNvPr id="55" name="ZoneTexte 54">
@@ -11205,8 +11218,8 @@
           </p:sp>
         </mc:Fallback>
       </mc:AlternateContent>
-      <mc:AlternateContent xmlns:mc="http://schemas.openxmlformats.org/markup-compatibility/2006">
-        <mc:Choice xmlns:a14="http://schemas.microsoft.com/office/drawing/2010/main" Requires="a14">
+      <mc:AlternateContent xmlns:mc="http://schemas.openxmlformats.org/markup-compatibility/2006" xmlns:a14="http://schemas.microsoft.com/office/drawing/2010/main">
+        <mc:Choice Requires="a14">
           <p:sp>
             <p:nvSpPr>
               <p:cNvPr id="11" name="ZoneTexte 10">
@@ -11264,7 +11277,7 @@
             </p:txBody>
           </p:sp>
         </mc:Choice>
-        <mc:Fallback>
+        <mc:Fallback xmlns="">
           <p:sp>
             <p:nvSpPr>
               <p:cNvPr id="11" name="ZoneTexte 10">
@@ -13163,8 +13176,8 @@
           </a:prstGeom>
         </p:spPr>
       </p:pic>
-      <mc:AlternateContent xmlns:mc="http://schemas.openxmlformats.org/markup-compatibility/2006">
-        <mc:Choice xmlns:a14="http://schemas.microsoft.com/office/drawing/2010/main" Requires="a14">
+      <mc:AlternateContent xmlns:mc="http://schemas.openxmlformats.org/markup-compatibility/2006" xmlns:a14="http://schemas.microsoft.com/office/drawing/2010/main">
+        <mc:Choice Requires="a14">
           <p:sp>
             <p:nvSpPr>
               <p:cNvPr id="18" name="ZoneTexte 17">
@@ -13246,7 +13259,7 @@
             </p:txBody>
           </p:sp>
         </mc:Choice>
-        <mc:Fallback>
+        <mc:Fallback xmlns="">
           <p:sp>
             <p:nvSpPr>
               <p:cNvPr id="18" name="ZoneTexte 17">
@@ -13877,8 +13890,8 @@
           </a:p>
         </p:txBody>
       </p:sp>
-      <mc:AlternateContent xmlns:mc="http://schemas.openxmlformats.org/markup-compatibility/2006">
-        <mc:Choice xmlns:a14="http://schemas.microsoft.com/office/drawing/2010/main" Requires="a14">
+      <mc:AlternateContent xmlns:mc="http://schemas.openxmlformats.org/markup-compatibility/2006" xmlns:a14="http://schemas.microsoft.com/office/drawing/2010/main">
+        <mc:Choice Requires="a14">
           <p:sp>
             <p:nvSpPr>
               <p:cNvPr id="7" name="ZoneTexte 6">
@@ -14264,7 +14277,7 @@
             </p:txBody>
           </p:sp>
         </mc:Choice>
-        <mc:Fallback>
+        <mc:Fallback xmlns="">
           <p:sp>
             <p:nvSpPr>
               <p:cNvPr id="7" name="ZoneTexte 6">
@@ -14518,8 +14531,8 @@
           </a:p>
         </p:txBody>
       </p:sp>
-      <mc:AlternateContent xmlns:mc="http://schemas.openxmlformats.org/markup-compatibility/2006">
-        <mc:Choice xmlns:a14="http://schemas.microsoft.com/office/drawing/2010/main" Requires="a14">
+      <mc:AlternateContent xmlns:mc="http://schemas.openxmlformats.org/markup-compatibility/2006" xmlns:a14="http://schemas.microsoft.com/office/drawing/2010/main">
+        <mc:Choice Requires="a14">
           <p:sp>
             <p:nvSpPr>
               <p:cNvPr id="7" name="ZoneTexte 6">
@@ -14628,7 +14641,7 @@
             </p:txBody>
           </p:sp>
         </mc:Choice>
-        <mc:Fallback>
+        <mc:Fallback xmlns="">
           <p:sp>
             <p:nvSpPr>
               <p:cNvPr id="7" name="ZoneTexte 6">
@@ -18360,8 +18373,8 @@
           </a:prstGeom>
         </p:spPr>
       </p:pic>
-      <mc:AlternateContent xmlns:mc="http://schemas.openxmlformats.org/markup-compatibility/2006">
-        <mc:Choice xmlns:a14="http://schemas.microsoft.com/office/drawing/2010/main" Requires="a14">
+      <mc:AlternateContent xmlns:mc="http://schemas.openxmlformats.org/markup-compatibility/2006" xmlns:a14="http://schemas.microsoft.com/office/drawing/2010/main">
+        <mc:Choice Requires="a14">
           <p:sp>
             <p:nvSpPr>
               <p:cNvPr id="10" name="ZoneTexte 9">
@@ -18490,7 +18503,7 @@
             </p:txBody>
           </p:sp>
         </mc:Choice>
-        <mc:Fallback>
+        <mc:Fallback xmlns="">
           <p:sp>
             <p:nvSpPr>
               <p:cNvPr id="10" name="ZoneTexte 9">
@@ -18782,8 +18795,8 @@
           </a:prstGeom>
         </p:spPr>
       </p:pic>
-      <mc:AlternateContent xmlns:mc="http://schemas.openxmlformats.org/markup-compatibility/2006">
-        <mc:Choice xmlns:a14="http://schemas.microsoft.com/office/drawing/2010/main" Requires="a14">
+      <mc:AlternateContent xmlns:mc="http://schemas.openxmlformats.org/markup-compatibility/2006" xmlns:a14="http://schemas.microsoft.com/office/drawing/2010/main">
+        <mc:Choice Requires="a14">
           <p:sp>
             <p:nvSpPr>
               <p:cNvPr id="13" name="ZoneTexte 12">
@@ -18841,7 +18854,7 @@
             </p:txBody>
           </p:sp>
         </mc:Choice>
-        <mc:Fallback>
+        <mc:Fallback xmlns="">
           <p:sp>
             <p:nvSpPr>
               <p:cNvPr id="13" name="ZoneTexte 12">

</xml_diff>

<commit_message>
Feat: Initialisation des chapitre 9 et 10
Initialisation des fichiers sur les chapitre 9 et 10 listes et tuples
</commit_message>
<xml_diff>
--- a/source/Chapitre 8 - Les chaines de caractères.pptx
+++ b/source/Chapitre 8 - Les chaines de caractères.pptx
@@ -144,7 +144,7 @@
 <file path=ppt/revisionInfo.xml><?xml version="1.0" encoding="utf-8"?>
 <p1510:revInfo xmlns:a="http://schemas.openxmlformats.org/drawingml/2006/main" xmlns:r="http://schemas.openxmlformats.org/officeDocument/2006/relationships" xmlns:p1510="http://schemas.microsoft.com/office/powerpoint/2015/10/main">
   <p1510:revLst>
-    <p1510:client id="{0EB52ED8-BDDA-42B4-90C4-1B322ACD0F02}" v="2786" dt="2024-02-20T16:09:40.954"/>
+    <p1510:client id="{0EB52ED8-BDDA-42B4-90C4-1B322ACD0F02}" v="2790" dt="2024-03-17T12:33:50.960"/>
   </p1510:revLst>
 </p1510:revInfo>
 </file>
@@ -154,7 +154,7 @@
   <pc:docChgLst>
     <pc:chgData name="Ismaël Tuo" userId="fca7baf0e513a1e6" providerId="LiveId" clId="{0EB52ED8-BDDA-42B4-90C4-1B322ACD0F02}"/>
     <pc:docChg chg="undo custSel addSld delSld modSld sldOrd">
-      <pc:chgData name="Ismaël Tuo" userId="fca7baf0e513a1e6" providerId="LiveId" clId="{0EB52ED8-BDDA-42B4-90C4-1B322ACD0F02}" dt="2024-02-20T16:09:40.954" v="23638" actId="20577"/>
+      <pc:chgData name="Ismaël Tuo" userId="fca7baf0e513a1e6" providerId="LiveId" clId="{0EB52ED8-BDDA-42B4-90C4-1B322ACD0F02}" dt="2024-03-17T12:47:21.415" v="23753" actId="33524"/>
       <pc:docMkLst>
         <pc:docMk/>
       </pc:docMkLst>
@@ -204,13 +204,13 @@
         </pc:spChg>
       </pc:sldChg>
       <pc:sldChg chg="addSp delSp modSp mod">
-        <pc:chgData name="Ismaël Tuo" userId="fca7baf0e513a1e6" providerId="LiveId" clId="{0EB52ED8-BDDA-42B4-90C4-1B322ACD0F02}" dt="2024-02-20T11:48:08.510" v="15886" actId="20577"/>
+        <pc:chgData name="Ismaël Tuo" userId="fca7baf0e513a1e6" providerId="LiveId" clId="{0EB52ED8-BDDA-42B4-90C4-1B322ACD0F02}" dt="2024-03-17T12:08:39.819" v="23643" actId="20577"/>
         <pc:sldMkLst>
           <pc:docMk/>
           <pc:sldMk cId="2639441608" sldId="286"/>
         </pc:sldMkLst>
         <pc:spChg chg="add mod">
-          <ac:chgData name="Ismaël Tuo" userId="fca7baf0e513a1e6" providerId="LiveId" clId="{0EB52ED8-BDDA-42B4-90C4-1B322ACD0F02}" dt="2024-02-20T11:48:08.510" v="15886" actId="20577"/>
+          <ac:chgData name="Ismaël Tuo" userId="fca7baf0e513a1e6" providerId="LiveId" clId="{0EB52ED8-BDDA-42B4-90C4-1B322ACD0F02}" dt="2024-03-17T12:06:52.094" v="23641" actId="20577"/>
           <ac:spMkLst>
             <pc:docMk/>
             <pc:sldMk cId="2639441608" sldId="286"/>
@@ -250,7 +250,7 @@
           </ac:spMkLst>
         </pc:spChg>
         <pc:spChg chg="add mod">
-          <ac:chgData name="Ismaël Tuo" userId="fca7baf0e513a1e6" providerId="LiveId" clId="{0EB52ED8-BDDA-42B4-90C4-1B322ACD0F02}" dt="2024-02-18T15:27:55.711" v="7500" actId="1076"/>
+          <ac:chgData name="Ismaël Tuo" userId="fca7baf0e513a1e6" providerId="LiveId" clId="{0EB52ED8-BDDA-42B4-90C4-1B322ACD0F02}" dt="2024-03-17T12:08:39.819" v="23643" actId="20577"/>
           <ac:spMkLst>
             <pc:docMk/>
             <pc:sldMk cId="2639441608" sldId="286"/>
@@ -393,7 +393,7 @@
         </pc:picChg>
       </pc:sldChg>
       <pc:sldChg chg="addSp modSp add mod">
-        <pc:chgData name="Ismaël Tuo" userId="fca7baf0e513a1e6" providerId="LiveId" clId="{0EB52ED8-BDDA-42B4-90C4-1B322ACD0F02}" dt="2024-01-31T15:34:50.227" v="7493" actId="1076"/>
+        <pc:chgData name="Ismaël Tuo" userId="fca7baf0e513a1e6" providerId="LiveId" clId="{0EB52ED8-BDDA-42B4-90C4-1B322ACD0F02}" dt="2024-03-17T12:15:12.539" v="23695" actId="20577"/>
         <pc:sldMkLst>
           <pc:docMk/>
           <pc:sldMk cId="555581175" sldId="289"/>
@@ -407,7 +407,7 @@
           </ac:spMkLst>
         </pc:spChg>
         <pc:spChg chg="add mod">
-          <ac:chgData name="Ismaël Tuo" userId="fca7baf0e513a1e6" providerId="LiveId" clId="{0EB52ED8-BDDA-42B4-90C4-1B322ACD0F02}" dt="2024-01-31T15:34:36.435" v="7489" actId="1076"/>
+          <ac:chgData name="Ismaël Tuo" userId="fca7baf0e513a1e6" providerId="LiveId" clId="{0EB52ED8-BDDA-42B4-90C4-1B322ACD0F02}" dt="2024-03-17T12:15:12.539" v="23695" actId="20577"/>
           <ac:spMkLst>
             <pc:docMk/>
             <pc:sldMk cId="555581175" sldId="289"/>
@@ -440,7 +440,7 @@
         </pc:picChg>
       </pc:sldChg>
       <pc:sldChg chg="addSp delSp modSp add mod">
-        <pc:chgData name="Ismaël Tuo" userId="fca7baf0e513a1e6" providerId="LiveId" clId="{0EB52ED8-BDDA-42B4-90C4-1B322ACD0F02}" dt="2024-02-20T11:58:07.047" v="15958" actId="1076"/>
+        <pc:chgData name="Ismaël Tuo" userId="fca7baf0e513a1e6" providerId="LiveId" clId="{0EB52ED8-BDDA-42B4-90C4-1B322ACD0F02}" dt="2024-03-17T12:16:00.159" v="23709" actId="20577"/>
         <pc:sldMkLst>
           <pc:docMk/>
           <pc:sldMk cId="161855368" sldId="290"/>
@@ -494,7 +494,7 @@
           </ac:spMkLst>
         </pc:spChg>
         <pc:spChg chg="mod">
-          <ac:chgData name="Ismaël Tuo" userId="fca7baf0e513a1e6" providerId="LiveId" clId="{0EB52ED8-BDDA-42B4-90C4-1B322ACD0F02}" dt="2024-02-20T11:57:47.736" v="15957" actId="20577"/>
+          <ac:chgData name="Ismaël Tuo" userId="fca7baf0e513a1e6" providerId="LiveId" clId="{0EB52ED8-BDDA-42B4-90C4-1B322ACD0F02}" dt="2024-03-17T12:16:00.159" v="23709" actId="20577"/>
           <ac:spMkLst>
             <pc:docMk/>
             <pc:sldMk cId="161855368" sldId="290"/>
@@ -855,13 +855,13 @@
         </pc:picChg>
       </pc:sldChg>
       <pc:sldChg chg="addSp modSp add mod">
-        <pc:chgData name="Ismaël Tuo" userId="fca7baf0e513a1e6" providerId="LiveId" clId="{0EB52ED8-BDDA-42B4-90C4-1B322ACD0F02}" dt="2024-02-18T16:26:05.493" v="10229" actId="14100"/>
+        <pc:chgData name="Ismaël Tuo" userId="fca7baf0e513a1e6" providerId="LiveId" clId="{0EB52ED8-BDDA-42B4-90C4-1B322ACD0F02}" dt="2024-03-17T12:18:27.504" v="23710" actId="20577"/>
         <pc:sldMkLst>
           <pc:docMk/>
           <pc:sldMk cId="388590506" sldId="291"/>
         </pc:sldMkLst>
         <pc:spChg chg="add mod">
-          <ac:chgData name="Ismaël Tuo" userId="fca7baf0e513a1e6" providerId="LiveId" clId="{0EB52ED8-BDDA-42B4-90C4-1B322ACD0F02}" dt="2024-02-18T16:21:20.060" v="10177" actId="1076"/>
+          <ac:chgData name="Ismaël Tuo" userId="fca7baf0e513a1e6" providerId="LiveId" clId="{0EB52ED8-BDDA-42B4-90C4-1B322ACD0F02}" dt="2024-03-17T12:18:27.504" v="23710" actId="20577"/>
           <ac:spMkLst>
             <pc:docMk/>
             <pc:sldMk cId="388590506" sldId="291"/>
@@ -910,7 +910,7 @@
         </pc:picChg>
       </pc:sldChg>
       <pc:sldChg chg="addSp delSp modSp add mod">
-        <pc:chgData name="Ismaël Tuo" userId="fca7baf0e513a1e6" providerId="LiveId" clId="{0EB52ED8-BDDA-42B4-90C4-1B322ACD0F02}" dt="2024-02-20T12:01:13.309" v="15983" actId="20577"/>
+        <pc:chgData name="Ismaël Tuo" userId="fca7baf0e513a1e6" providerId="LiveId" clId="{0EB52ED8-BDDA-42B4-90C4-1B322ACD0F02}" dt="2024-03-17T12:33:50.945" v="23731" actId="20577"/>
         <pc:sldMkLst>
           <pc:docMk/>
           <pc:sldMk cId="402679512" sldId="292"/>
@@ -932,7 +932,7 @@
           </ac:spMkLst>
         </pc:spChg>
         <pc:spChg chg="add mod">
-          <ac:chgData name="Ismaël Tuo" userId="fca7baf0e513a1e6" providerId="LiveId" clId="{0EB52ED8-BDDA-42B4-90C4-1B322ACD0F02}" dt="2024-02-18T16:34:53.072" v="10843" actId="113"/>
+          <ac:chgData name="Ismaël Tuo" userId="fca7baf0e513a1e6" providerId="LiveId" clId="{0EB52ED8-BDDA-42B4-90C4-1B322ACD0F02}" dt="2024-03-17T12:33:50.945" v="23731" actId="20577"/>
           <ac:spMkLst>
             <pc:docMk/>
             <pc:sldMk cId="402679512" sldId="292"/>
@@ -948,7 +948,7 @@
           </ac:spMkLst>
         </pc:spChg>
         <pc:spChg chg="mod">
-          <ac:chgData name="Ismaël Tuo" userId="fca7baf0e513a1e6" providerId="LiveId" clId="{0EB52ED8-BDDA-42B4-90C4-1B322ACD0F02}" dt="2024-02-18T16:29:15.865" v="10364" actId="14100"/>
+          <ac:chgData name="Ismaël Tuo" userId="fca7baf0e513a1e6" providerId="LiveId" clId="{0EB52ED8-BDDA-42B4-90C4-1B322ACD0F02}" dt="2024-03-17T12:19:06.232" v="23729" actId="20577"/>
           <ac:spMkLst>
             <pc:docMk/>
             <pc:sldMk cId="402679512" sldId="292"/>
@@ -965,7 +965,7 @@
         </pc:picChg>
       </pc:sldChg>
       <pc:sldChg chg="addSp delSp modSp add mod">
-        <pc:chgData name="Ismaël Tuo" userId="fca7baf0e513a1e6" providerId="LiveId" clId="{0EB52ED8-BDDA-42B4-90C4-1B322ACD0F02}" dt="2024-02-20T13:53:24.297" v="23532" actId="1076"/>
+        <pc:chgData name="Ismaël Tuo" userId="fca7baf0e513a1e6" providerId="LiveId" clId="{0EB52ED8-BDDA-42B4-90C4-1B322ACD0F02}" dt="2024-03-17T12:45:18.973" v="23752" actId="1076"/>
         <pc:sldMkLst>
           <pc:docMk/>
           <pc:sldMk cId="1332028687" sldId="293"/>
@@ -1003,7 +1003,7 @@
           </ac:spMkLst>
         </pc:spChg>
         <pc:spChg chg="add mod">
-          <ac:chgData name="Ismaël Tuo" userId="fca7baf0e513a1e6" providerId="LiveId" clId="{0EB52ED8-BDDA-42B4-90C4-1B322ACD0F02}" dt="2024-02-20T13:53:24.297" v="23532" actId="1076"/>
+          <ac:chgData name="Ismaël Tuo" userId="fca7baf0e513a1e6" providerId="LiveId" clId="{0EB52ED8-BDDA-42B4-90C4-1B322ACD0F02}" dt="2024-03-17T12:45:18.973" v="23752" actId="1076"/>
           <ac:spMkLst>
             <pc:docMk/>
             <pc:sldMk cId="1332028687" sldId="293"/>
@@ -1020,7 +1020,7 @@
         </pc:spChg>
       </pc:sldChg>
       <pc:sldChg chg="addSp delSp modSp add mod">
-        <pc:chgData name="Ismaël Tuo" userId="fca7baf0e513a1e6" providerId="LiveId" clId="{0EB52ED8-BDDA-42B4-90C4-1B322ACD0F02}" dt="2024-02-20T11:49:51.994" v="15887" actId="20577"/>
+        <pc:chgData name="Ismaël Tuo" userId="fca7baf0e513a1e6" providerId="LiveId" clId="{0EB52ED8-BDDA-42B4-90C4-1B322ACD0F02}" dt="2024-03-17T12:09:20.544" v="23645" actId="20577"/>
         <pc:sldMkLst>
           <pc:docMk/>
           <pc:sldMk cId="2976560216" sldId="294"/>
@@ -1066,7 +1066,7 @@
           </ac:spMkLst>
         </pc:spChg>
         <pc:spChg chg="add mod">
-          <ac:chgData name="Ismaël Tuo" userId="fca7baf0e513a1e6" providerId="LiveId" clId="{0EB52ED8-BDDA-42B4-90C4-1B322ACD0F02}" dt="2024-01-31T13:48:42.747" v="2648" actId="1076"/>
+          <ac:chgData name="Ismaël Tuo" userId="fca7baf0e513a1e6" providerId="LiveId" clId="{0EB52ED8-BDDA-42B4-90C4-1B322ACD0F02}" dt="2024-03-17T12:09:20.544" v="23645" actId="20577"/>
           <ac:spMkLst>
             <pc:docMk/>
             <pc:sldMk cId="2976560216" sldId="294"/>
@@ -1210,7 +1210,7 @@
         </pc:picChg>
       </pc:sldChg>
       <pc:sldChg chg="addSp delSp modSp add mod">
-        <pc:chgData name="Ismaël Tuo" userId="fca7baf0e513a1e6" providerId="LiveId" clId="{0EB52ED8-BDDA-42B4-90C4-1B322ACD0F02}" dt="2024-02-20T11:55:24.202" v="15946" actId="20577"/>
+        <pc:chgData name="Ismaël Tuo" userId="fca7baf0e513a1e6" providerId="LiveId" clId="{0EB52ED8-BDDA-42B4-90C4-1B322ACD0F02}" dt="2024-03-17T12:13:27.587" v="23685" actId="1076"/>
         <pc:sldMkLst>
           <pc:docMk/>
           <pc:sldMk cId="4258654424" sldId="296"/>
@@ -1248,7 +1248,7 @@
           </ac:spMkLst>
         </pc:spChg>
         <pc:spChg chg="add mod">
-          <ac:chgData name="Ismaël Tuo" userId="fca7baf0e513a1e6" providerId="LiveId" clId="{0EB52ED8-BDDA-42B4-90C4-1B322ACD0F02}" dt="2024-02-20T11:54:52.369" v="15916" actId="20577"/>
+          <ac:chgData name="Ismaël Tuo" userId="fca7baf0e513a1e6" providerId="LiveId" clId="{0EB52ED8-BDDA-42B4-90C4-1B322ACD0F02}" dt="2024-03-17T12:12:34.856" v="23646" actId="114"/>
           <ac:spMkLst>
             <pc:docMk/>
             <pc:sldMk cId="4258654424" sldId="296"/>
@@ -1256,7 +1256,7 @@
           </ac:spMkLst>
         </pc:spChg>
         <pc:spChg chg="add mod">
-          <ac:chgData name="Ismaël Tuo" userId="fca7baf0e513a1e6" providerId="LiveId" clId="{0EB52ED8-BDDA-42B4-90C4-1B322ACD0F02}" dt="2024-02-20T11:55:24.202" v="15946" actId="20577"/>
+          <ac:chgData name="Ismaël Tuo" userId="fca7baf0e513a1e6" providerId="LiveId" clId="{0EB52ED8-BDDA-42B4-90C4-1B322ACD0F02}" dt="2024-03-17T12:13:27.587" v="23685" actId="1076"/>
           <ac:spMkLst>
             <pc:docMk/>
             <pc:sldMk cId="4258654424" sldId="296"/>
@@ -1288,7 +1288,7 @@
           </ac:picMkLst>
         </pc:picChg>
         <pc:picChg chg="add mod">
-          <ac:chgData name="Ismaël Tuo" userId="fca7baf0e513a1e6" providerId="LiveId" clId="{0EB52ED8-BDDA-42B4-90C4-1B322ACD0F02}" dt="2024-01-31T14:58:59.381" v="6026" actId="1076"/>
+          <ac:chgData name="Ismaël Tuo" userId="fca7baf0e513a1e6" providerId="LiveId" clId="{0EB52ED8-BDDA-42B4-90C4-1B322ACD0F02}" dt="2024-03-17T12:13:22.939" v="23683" actId="1076"/>
           <ac:picMkLst>
             <pc:docMk/>
             <pc:sldMk cId="4258654424" sldId="296"/>
@@ -1297,13 +1297,13 @@
         </pc:picChg>
       </pc:sldChg>
       <pc:sldChg chg="addSp delSp modSp add mod">
-        <pc:chgData name="Ismaël Tuo" userId="fca7baf0e513a1e6" providerId="LiveId" clId="{0EB52ED8-BDDA-42B4-90C4-1B322ACD0F02}" dt="2024-02-20T11:56:10.747" v="15956" actId="20577"/>
+        <pc:chgData name="Ismaël Tuo" userId="fca7baf0e513a1e6" providerId="LiveId" clId="{0EB52ED8-BDDA-42B4-90C4-1B322ACD0F02}" dt="2024-03-17T12:14:22.858" v="23694" actId="113"/>
         <pc:sldMkLst>
           <pc:docMk/>
           <pc:sldMk cId="1523225851" sldId="297"/>
         </pc:sldMkLst>
         <pc:spChg chg="add mod">
-          <ac:chgData name="Ismaël Tuo" userId="fca7baf0e513a1e6" providerId="LiveId" clId="{0EB52ED8-BDDA-42B4-90C4-1B322ACD0F02}" dt="2024-02-20T11:56:10.747" v="15956" actId="20577"/>
+          <ac:chgData name="Ismaël Tuo" userId="fca7baf0e513a1e6" providerId="LiveId" clId="{0EB52ED8-BDDA-42B4-90C4-1B322ACD0F02}" dt="2024-03-17T12:14:04.319" v="23691" actId="20577"/>
           <ac:spMkLst>
             <pc:docMk/>
             <pc:sldMk cId="1523225851" sldId="297"/>
@@ -1311,7 +1311,7 @@
           </ac:spMkLst>
         </pc:spChg>
         <pc:spChg chg="mod">
-          <ac:chgData name="Ismaël Tuo" userId="fca7baf0e513a1e6" providerId="LiveId" clId="{0EB52ED8-BDDA-42B4-90C4-1B322ACD0F02}" dt="2024-01-31T15:01:58.040" v="6140" actId="20577"/>
+          <ac:chgData name="Ismaël Tuo" userId="fca7baf0e513a1e6" providerId="LiveId" clId="{0EB52ED8-BDDA-42B4-90C4-1B322ACD0F02}" dt="2024-03-17T12:13:42.486" v="23688" actId="20577"/>
           <ac:spMkLst>
             <pc:docMk/>
             <pc:sldMk cId="1523225851" sldId="297"/>
@@ -1327,7 +1327,7 @@
           </ac:spMkLst>
         </pc:spChg>
         <pc:spChg chg="add mod">
-          <ac:chgData name="Ismaël Tuo" userId="fca7baf0e513a1e6" providerId="LiveId" clId="{0EB52ED8-BDDA-42B4-90C4-1B322ACD0F02}" dt="2024-02-20T11:55:37.691" v="15948" actId="1076"/>
+          <ac:chgData name="Ismaël Tuo" userId="fca7baf0e513a1e6" providerId="LiveId" clId="{0EB52ED8-BDDA-42B4-90C4-1B322ACD0F02}" dt="2024-03-17T12:14:22.858" v="23694" actId="113"/>
           <ac:spMkLst>
             <pc:docMk/>
             <pc:sldMk cId="1523225851" sldId="297"/>
@@ -1351,7 +1351,7 @@
           </ac:picMkLst>
         </pc:picChg>
         <pc:picChg chg="add mod">
-          <ac:chgData name="Ismaël Tuo" userId="fca7baf0e513a1e6" providerId="LiveId" clId="{0EB52ED8-BDDA-42B4-90C4-1B322ACD0F02}" dt="2024-01-31T15:20:53.842" v="6734" actId="1076"/>
+          <ac:chgData name="Ismaël Tuo" userId="fca7baf0e513a1e6" providerId="LiveId" clId="{0EB52ED8-BDDA-42B4-90C4-1B322ACD0F02}" dt="2024-03-17T12:14:14.560" v="23693" actId="1076"/>
           <ac:picMkLst>
             <pc:docMk/>
             <pc:sldMk cId="1523225851" sldId="297"/>
@@ -1384,7 +1384,7 @@
         </pc:picChg>
       </pc:sldChg>
       <pc:sldChg chg="addSp modSp add mod">
-        <pc:chgData name="Ismaël Tuo" userId="fca7baf0e513a1e6" providerId="LiveId" clId="{0EB52ED8-BDDA-42B4-90C4-1B322ACD0F02}" dt="2024-02-20T12:01:51.946" v="15991" actId="20577"/>
+        <pc:chgData name="Ismaël Tuo" userId="fca7baf0e513a1e6" providerId="LiveId" clId="{0EB52ED8-BDDA-42B4-90C4-1B322ACD0F02}" dt="2024-03-17T12:34:48.496" v="23745" actId="20577"/>
         <pc:sldMkLst>
           <pc:docMk/>
           <pc:sldMk cId="4166790313" sldId="298"/>
@@ -1406,7 +1406,7 @@
           </ac:spMkLst>
         </pc:spChg>
         <pc:spChg chg="add mod">
-          <ac:chgData name="Ismaël Tuo" userId="fca7baf0e513a1e6" providerId="LiveId" clId="{0EB52ED8-BDDA-42B4-90C4-1B322ACD0F02}" dt="2024-02-18T16:48:10.841" v="11877" actId="20577"/>
+          <ac:chgData name="Ismaël Tuo" userId="fca7baf0e513a1e6" providerId="LiveId" clId="{0EB52ED8-BDDA-42B4-90C4-1B322ACD0F02}" dt="2024-03-17T12:34:48.496" v="23745" actId="20577"/>
           <ac:spMkLst>
             <pc:docMk/>
             <pc:sldMk cId="4166790313" sldId="298"/>
@@ -1723,7 +1723,7 @@
         </pc:picChg>
       </pc:sldChg>
       <pc:sldChg chg="addSp delSp modSp add mod">
-        <pc:chgData name="Ismaël Tuo" userId="fca7baf0e513a1e6" providerId="LiveId" clId="{0EB52ED8-BDDA-42B4-90C4-1B322ACD0F02}" dt="2024-02-20T12:06:40.544" v="16338" actId="20577"/>
+        <pc:chgData name="Ismaël Tuo" userId="fca7baf0e513a1e6" providerId="LiveId" clId="{0EB52ED8-BDDA-42B4-90C4-1B322ACD0F02}" dt="2024-03-17T12:39:29.819" v="23751" actId="1076"/>
         <pc:sldMkLst>
           <pc:docMk/>
           <pc:sldMk cId="1239094899" sldId="303"/>
@@ -1777,7 +1777,15 @@
           </ac:picMkLst>
         </pc:picChg>
         <pc:picChg chg="add mod">
-          <ac:chgData name="Ismaël Tuo" userId="fca7baf0e513a1e6" providerId="LiveId" clId="{0EB52ED8-BDDA-42B4-90C4-1B322ACD0F02}" dt="2024-02-18T17:21:14.135" v="13637" actId="1076"/>
+          <ac:chgData name="Ismaël Tuo" userId="fca7baf0e513a1e6" providerId="LiveId" clId="{0EB52ED8-BDDA-42B4-90C4-1B322ACD0F02}" dt="2024-03-17T12:39:29.819" v="23751" actId="1076"/>
+          <ac:picMkLst>
+            <pc:docMk/>
+            <pc:sldMk cId="1239094899" sldId="303"/>
+            <ac:picMk id="7" creationId="{5EF44BC5-733E-BA24-62A6-23C8E49DD4D1}"/>
+          </ac:picMkLst>
+        </pc:picChg>
+        <pc:picChg chg="add del mod">
+          <ac:chgData name="Ismaël Tuo" userId="fca7baf0e513a1e6" providerId="LiveId" clId="{0EB52ED8-BDDA-42B4-90C4-1B322ACD0F02}" dt="2024-03-17T12:39:22.907" v="23746" actId="478"/>
           <ac:picMkLst>
             <pc:docMk/>
             <pc:sldMk cId="1239094899" sldId="303"/>
@@ -1873,7 +1881,7 @@
         </pc:picChg>
       </pc:sldChg>
       <pc:sldChg chg="addSp delSp modSp add mod">
-        <pc:chgData name="Ismaël Tuo" userId="fca7baf0e513a1e6" providerId="LiveId" clId="{0EB52ED8-BDDA-42B4-90C4-1B322ACD0F02}" dt="2024-02-20T14:01:39.869" v="23593" actId="20577"/>
+        <pc:chgData name="Ismaël Tuo" userId="fca7baf0e513a1e6" providerId="LiveId" clId="{0EB52ED8-BDDA-42B4-90C4-1B322ACD0F02}" dt="2024-03-17T12:47:21.415" v="23753" actId="33524"/>
         <pc:sldMkLst>
           <pc:docMk/>
           <pc:sldMk cId="2465630299" sldId="305"/>
@@ -1927,7 +1935,7 @@
           </ac:spMkLst>
         </pc:spChg>
         <pc:spChg chg="add mod">
-          <ac:chgData name="Ismaël Tuo" userId="fca7baf0e513a1e6" providerId="LiveId" clId="{0EB52ED8-BDDA-42B4-90C4-1B322ACD0F02}" dt="2024-02-20T14:01:39.869" v="23593" actId="20577"/>
+          <ac:chgData name="Ismaël Tuo" userId="fca7baf0e513a1e6" providerId="LiveId" clId="{0EB52ED8-BDDA-42B4-90C4-1B322ACD0F02}" dt="2024-03-17T12:47:21.415" v="23753" actId="33524"/>
           <ac:spMkLst>
             <pc:docMk/>
             <pc:sldMk cId="2465630299" sldId="305"/>
@@ -2161,7 +2169,7 @@
           <a:p>
             <a:fld id="{5D1B8971-FAD5-A544-A565-5C81831E2E08}" type="datetimeFigureOut">
               <a:rPr lang="fr-FR" smtClean="0"/>
-              <a:t>20/02/2024</a:t>
+              <a:t>17/03/2024</a:t>
             </a:fld>
             <a:endParaRPr lang="fr-FR"/>
           </a:p>
@@ -2591,7 +2599,7 @@
           <a:p>
             <a:fld id="{446AF453-C717-E044-9B61-C449088DBB9F}" type="datetime1">
               <a:rPr lang="fr-FR" smtClean="0"/>
-              <a:t>20/02/2024</a:t>
+              <a:t>17/03/2024</a:t>
             </a:fld>
             <a:endParaRPr lang="fr-FR"/>
           </a:p>
@@ -2765,7 +2773,7 @@
           <a:p>
             <a:fld id="{0AD74B8B-4B66-A54B-A7E1-EB9F6C09CE67}" type="datetime1">
               <a:rPr lang="fr-FR" smtClean="0"/>
-              <a:t>20/02/2024</a:t>
+              <a:t>17/03/2024</a:t>
             </a:fld>
             <a:endParaRPr lang="fr-FR"/>
           </a:p>
@@ -2949,7 +2957,7 @@
           <a:p>
             <a:fld id="{9584F9F2-42A0-CD42-8013-986AEAF97421}" type="datetime1">
               <a:rPr lang="fr-FR" smtClean="0"/>
-              <a:t>20/02/2024</a:t>
+              <a:t>17/03/2024</a:t>
             </a:fld>
             <a:endParaRPr lang="fr-FR"/>
           </a:p>
@@ -3123,7 +3131,7 @@
           <a:p>
             <a:fld id="{DAB9BD9F-3179-BB4C-96AB-C40862581685}" type="datetime1">
               <a:rPr lang="fr-FR" smtClean="0"/>
-              <a:t>20/02/2024</a:t>
+              <a:t>17/03/2024</a:t>
             </a:fld>
             <a:endParaRPr lang="fr-FR"/>
           </a:p>
@@ -3395,7 +3403,7 @@
           <a:p>
             <a:fld id="{A664DE96-64FF-BC43-8A9C-18ED43A528D6}" type="datetime1">
               <a:rPr lang="fr-FR" smtClean="0"/>
-              <a:t>20/02/2024</a:t>
+              <a:t>17/03/2024</a:t>
             </a:fld>
             <a:endParaRPr lang="fr-FR"/>
           </a:p>
@@ -3631,7 +3639,7 @@
           <a:p>
             <a:fld id="{2C8FE800-9F9B-1C4F-A1CD-9EF46842C4CA}" type="datetime1">
               <a:rPr lang="fr-FR" smtClean="0"/>
-              <a:t>20/02/2024</a:t>
+              <a:t>17/03/2024</a:t>
             </a:fld>
             <a:endParaRPr lang="fr-FR"/>
           </a:p>
@@ -3994,7 +4002,7 @@
           <a:p>
             <a:fld id="{0F7DED4E-8CB4-EF40-A349-EFC02EC7784E}" type="datetime1">
               <a:rPr lang="fr-FR" smtClean="0"/>
-              <a:t>20/02/2024</a:t>
+              <a:t>17/03/2024</a:t>
             </a:fld>
             <a:endParaRPr lang="fr-FR"/>
           </a:p>
@@ -4139,7 +4147,7 @@
           <a:p>
             <a:fld id="{5BB88D77-E8A2-E24F-81D2-817E60779F3E}" type="datetime1">
               <a:rPr lang="fr-FR" smtClean="0"/>
-              <a:t>20/02/2024</a:t>
+              <a:t>17/03/2024</a:t>
             </a:fld>
             <a:endParaRPr lang="fr-FR"/>
           </a:p>
@@ -4238,7 +4246,7 @@
           <a:p>
             <a:fld id="{817F964E-5B57-884A-A1B8-925BFA5276AF}" type="datetime1">
               <a:rPr lang="fr-FR" smtClean="0"/>
-              <a:t>20/02/2024</a:t>
+              <a:t>17/03/2024</a:t>
             </a:fld>
             <a:endParaRPr lang="fr-FR"/>
           </a:p>
@@ -4599,7 +4607,7 @@
           <a:p>
             <a:fld id="{D5636CD0-A2E6-1543-A0E5-C829C16FEE55}" type="datetime1">
               <a:rPr lang="fr-FR" smtClean="0"/>
-              <a:t>20/02/2024</a:t>
+              <a:t>17/03/2024</a:t>
             </a:fld>
             <a:endParaRPr lang="fr-FR"/>
           </a:p>
@@ -4960,7 +4968,7 @@
           <a:p>
             <a:fld id="{CEE5CE4A-5B1A-1846-BA66-722BDB7A9525}" type="datetime1">
               <a:rPr lang="fr-FR" smtClean="0"/>
-              <a:t>20/02/2024</a:t>
+              <a:t>17/03/2024</a:t>
             </a:fld>
             <a:endParaRPr lang="fr-FR"/>
           </a:p>
@@ -5207,7 +5215,7 @@
           <a:p>
             <a:fld id="{55A13D9C-CA6E-9C45-8634-4423EBFFD553}" type="datetime1">
               <a:rPr lang="fr-FR" smtClean="0"/>
-              <a:t>20/02/2024</a:t>
+              <a:t>17/03/2024</a:t>
             </a:fld>
             <a:endParaRPr lang="fr-FR"/>
           </a:p>
@@ -6281,7 +6289,7 @@
                 <a:latin typeface="Times New Roman" panose="02020603050405020304" pitchFamily="18" charset="0"/>
                 <a:cs typeface="Times New Roman" panose="02020603050405020304" pitchFamily="18" charset="0"/>
               </a:rPr>
-              <a:t>La concaténation ne marche que sur les types chaine de caractères si on essaie de faire une concaténation entre un type chaine de caractères et un nombre Python lève une exception car ambiguë Python ne sait pas s’il doit faire une opération de nombre ou une concaténation de chaines. On utilisera la fonction </a:t>
+              <a:t>La concaténation ne marche que sur les types chaine de caractères si on essaie de faire une concaténation entre un type chaine de caractères et un nombre, Python lève une exception car ambiguë Python ne sait pas s’il doit faire une opération de nombre ou une concaténation de chaines. On utilisera la fonction </a:t>
             </a:r>
             <a:r>
               <a:rPr lang="fr-FR" sz="2000" b="1" dirty="0" err="1">
@@ -6496,7 +6504,7 @@
                 <a:latin typeface="Times New Roman" panose="02020603050405020304" pitchFamily="18" charset="0"/>
                 <a:cs typeface="Times New Roman" panose="02020603050405020304" pitchFamily="18" charset="0"/>
               </a:rPr>
-              <a:t>Une chaîne de caractères par définition est une séquence de caractères. Chaque caractère dans une chaîne de caractères est identifié par une position appelée indice dont le premier est 0.</a:t>
+              <a:t>Une chaîne de caractères par définition est une séquence de caractères. Chaque caractère dans une chaîne est identifié par une position appelée indice dont le premier est 0.</a:t>
             </a:r>
           </a:p>
         </p:txBody>
@@ -9431,8 +9439,8 @@
           </a:fontRef>
         </p:style>
       </p:cxnSp>
-      <mc:AlternateContent xmlns:mc="http://schemas.openxmlformats.org/markup-compatibility/2006" xmlns:a14="http://schemas.microsoft.com/office/drawing/2010/main">
-        <mc:Choice Requires="a14">
+      <mc:AlternateContent xmlns:mc="http://schemas.openxmlformats.org/markup-compatibility/2006">
+        <mc:Choice xmlns:a14="http://schemas.microsoft.com/office/drawing/2010/main" Requires="a14">
           <p:sp>
             <p:nvSpPr>
               <p:cNvPr id="2" name="ZoneTexte 1">
@@ -9466,7 +9474,7 @@
                     <a:latin typeface="Times New Roman" panose="02020603050405020304" pitchFamily="18" charset="0"/>
                     <a:cs typeface="Times New Roman" panose="02020603050405020304" pitchFamily="18" charset="0"/>
                   </a:rPr>
-                  <a:t>L’une des méthodes les plus couramment utilisée est d’utiliser la boucle </a:t>
+                  <a:t>L’une des méthodes les plus couramment utilisée est la boucle </a:t>
                 </a:r>
                 <a14:m>
                   <m:oMath xmlns:m="http://schemas.openxmlformats.org/officeDocument/2006/math">
@@ -9490,7 +9498,7 @@
             </p:txBody>
           </p:sp>
         </mc:Choice>
-        <mc:Fallback xmlns="">
+        <mc:Fallback>
           <p:sp>
             <p:nvSpPr>
               <p:cNvPr id="2" name="ZoneTexte 1">
@@ -9803,7 +9811,7 @@
                 <a:latin typeface="Times New Roman" panose="02020603050405020304" pitchFamily="18" charset="0"/>
                 <a:cs typeface="Times New Roman" panose="02020603050405020304" pitchFamily="18" charset="0"/>
               </a:rPr>
-              <a:t>Python permet aussi d’extraire tout une partie d’une chaine en utilisant la syntaxe suivante:</a:t>
+              <a:t>Python permet aussi d’extraire une partie d’une chaine en utilisant la syntaxe suivante:</a:t>
             </a:r>
           </a:p>
         </p:txBody>
@@ -9847,8 +9855,8 @@
           </a:fontRef>
         </p:style>
       </p:cxnSp>
-      <mc:AlternateContent xmlns:mc="http://schemas.openxmlformats.org/markup-compatibility/2006" xmlns:a14="http://schemas.microsoft.com/office/drawing/2010/main">
-        <mc:Choice Requires="a14">
+      <mc:AlternateContent xmlns:mc="http://schemas.openxmlformats.org/markup-compatibility/2006">
+        <mc:Choice xmlns:a14="http://schemas.microsoft.com/office/drawing/2010/main" Requires="a14">
           <p:sp>
             <p:nvSpPr>
               <p:cNvPr id="7" name="ZoneTexte 6">
@@ -9932,7 +9940,7 @@
                     <a:latin typeface="Times New Roman" panose="02020603050405020304" pitchFamily="18" charset="0"/>
                     <a:cs typeface="Times New Roman" panose="02020603050405020304" pitchFamily="18" charset="0"/>
                   </a:rPr>
-                  <a:t>: renvoie la chaîne composée des caractères situés de l’indice de départ jusqu’à l’indice de fin exclus.</a:t>
+                  <a:t>: renvoie la chaîne composée des caractères situés de l’indice de départ jusqu’à l’indice de fin exclu.</a:t>
                 </a:r>
               </a:p>
               <a:p>
@@ -10064,13 +10072,13 @@
                     <a:latin typeface="Times New Roman" panose="02020603050405020304" pitchFamily="18" charset="0"/>
                     <a:cs typeface="Times New Roman" panose="02020603050405020304" pitchFamily="18" charset="0"/>
                   </a:rPr>
-                  <a:t> renvoie la chaine composée des caractères de l’indice de départ jusqu'à l’indice de fin spécifié exclus.</a:t>
+                  <a:t> renvoie la chaine composée des caractères de l’indice de départ jusqu'à l’indice de fin spécifié exclu.</a:t>
                 </a:r>
               </a:p>
             </p:txBody>
           </p:sp>
         </mc:Choice>
-        <mc:Fallback xmlns="">
+        <mc:Fallback>
           <p:sp>
             <p:nvSpPr>
               <p:cNvPr id="7" name="ZoneTexte 6">
@@ -10568,7 +10576,7 @@
                 <a:latin typeface="Times New Roman" panose="02020603050405020304" pitchFamily="18" charset="0"/>
                 <a:cs typeface="Times New Roman" panose="02020603050405020304" pitchFamily="18" charset="0"/>
               </a:rPr>
-              <a:t> permettra d’avoir le numéro de la case ou est stockée la valeur d’une variable.</a:t>
+              <a:t> permettra d’avoir le numéro de la case où est stockée la valeur de la variable.</a:t>
             </a:r>
           </a:p>
         </p:txBody>
@@ -11361,12 +11369,88 @@
           </a:fontRef>
         </p:style>
       </p:cxnSp>
+      <p:sp>
+        <p:nvSpPr>
+          <p:cNvPr id="10" name="ZoneTexte 9">
+            <a:extLst>
+              <a:ext uri="{FF2B5EF4-FFF2-40B4-BE49-F238E27FC236}">
+                <a16:creationId xmlns:a16="http://schemas.microsoft.com/office/drawing/2014/main" id="{6C12B1ED-A7DC-1285-5A72-57FD58E762F9}"/>
+              </a:ext>
+            </a:extLst>
+          </p:cNvPr>
+          <p:cNvSpPr txBox="1"/>
+          <p:nvPr/>
+        </p:nvSpPr>
+        <p:spPr>
+          <a:xfrm>
+            <a:off x="500932" y="4073352"/>
+            <a:ext cx="11359108" cy="707886"/>
+          </a:xfrm>
+          <a:prstGeom prst="rect">
+            <a:avLst/>
+          </a:prstGeom>
+          <a:noFill/>
+        </p:spPr>
+        <p:txBody>
+          <a:bodyPr wrap="square" rtlCol="0">
+            <a:spAutoFit/>
+          </a:bodyPr>
+          <a:lstStyle/>
+          <a:p>
+            <a:r>
+              <a:rPr lang="fr-FR" sz="2000" dirty="0">
+                <a:latin typeface="Times New Roman" panose="02020603050405020304" pitchFamily="18" charset="0"/>
+                <a:cs typeface="Times New Roman" panose="02020603050405020304" pitchFamily="18" charset="0"/>
+              </a:rPr>
+              <a:t>Les deux variables malgré qu’elles contiennent des valeurs identiques sont stockées dans des cases mémoires différentes. En un mot les valeurs sont dupliquées.</a:t>
+            </a:r>
+          </a:p>
+        </p:txBody>
+      </p:sp>
+      <p:sp>
+        <p:nvSpPr>
+          <p:cNvPr id="13" name="ZoneTexte 12">
+            <a:extLst>
+              <a:ext uri="{FF2B5EF4-FFF2-40B4-BE49-F238E27FC236}">
+                <a16:creationId xmlns:a16="http://schemas.microsoft.com/office/drawing/2014/main" id="{CE2100EA-F0D8-4A46-6113-92A7808CB80A}"/>
+              </a:ext>
+            </a:extLst>
+          </p:cNvPr>
+          <p:cNvSpPr txBox="1"/>
+          <p:nvPr/>
+        </p:nvSpPr>
+        <p:spPr>
+          <a:xfrm>
+            <a:off x="500932" y="4934440"/>
+            <a:ext cx="11359108" cy="707886"/>
+          </a:xfrm>
+          <a:prstGeom prst="rect">
+            <a:avLst/>
+          </a:prstGeom>
+          <a:noFill/>
+        </p:spPr>
+        <p:txBody>
+          <a:bodyPr wrap="square" rtlCol="0">
+            <a:spAutoFit/>
+          </a:bodyPr>
+          <a:lstStyle/>
+          <a:p>
+            <a:r>
+              <a:rPr lang="fr-FR" sz="2000" b="1" dirty="0">
+                <a:latin typeface="Times New Roman" panose="02020603050405020304" pitchFamily="18" charset="0"/>
+                <a:cs typeface="Times New Roman" panose="02020603050405020304" pitchFamily="18" charset="0"/>
+              </a:rPr>
+              <a:t>La méthode d’allocation des cases mémoires n’est pas la même pour tous les types de données la méthode est différente pour les types primitifs et les types complexes comme les strings…   </a:t>
+            </a:r>
+          </a:p>
+        </p:txBody>
+      </p:sp>
       <p:pic>
         <p:nvPicPr>
-          <p:cNvPr id="9" name="Image 8">
+          <p:cNvPr id="7" name="Image 6">
             <a:extLst>
               <a:ext uri="{FF2B5EF4-FFF2-40B4-BE49-F238E27FC236}">
-                <a16:creationId xmlns:a16="http://schemas.microsoft.com/office/drawing/2014/main" id="{839E2A34-D06A-01A2-142B-3F6524AD25CB}"/>
+                <a16:creationId xmlns:a16="http://schemas.microsoft.com/office/drawing/2014/main" id="{5EF44BC5-733E-BA24-62A6-23C8E49DD4D1}"/>
               </a:ext>
             </a:extLst>
           </p:cNvPr>
@@ -11383,90 +11467,14 @@
         </p:blipFill>
         <p:spPr>
           <a:xfrm>
-            <a:off x="2517741" y="1603520"/>
-            <a:ext cx="7144832" cy="2316630"/>
+            <a:off x="2164320" y="1600006"/>
+            <a:ext cx="6729043" cy="2473346"/>
           </a:xfrm>
           <a:prstGeom prst="rect">
             <a:avLst/>
           </a:prstGeom>
         </p:spPr>
       </p:pic>
-      <p:sp>
-        <p:nvSpPr>
-          <p:cNvPr id="10" name="ZoneTexte 9">
-            <a:extLst>
-              <a:ext uri="{FF2B5EF4-FFF2-40B4-BE49-F238E27FC236}">
-                <a16:creationId xmlns:a16="http://schemas.microsoft.com/office/drawing/2014/main" id="{6C12B1ED-A7DC-1285-5A72-57FD58E762F9}"/>
-              </a:ext>
-            </a:extLst>
-          </p:cNvPr>
-          <p:cNvSpPr txBox="1"/>
-          <p:nvPr/>
-        </p:nvSpPr>
-        <p:spPr>
-          <a:xfrm>
-            <a:off x="500932" y="4073352"/>
-            <a:ext cx="11359108" cy="707886"/>
-          </a:xfrm>
-          <a:prstGeom prst="rect">
-            <a:avLst/>
-          </a:prstGeom>
-          <a:noFill/>
-        </p:spPr>
-        <p:txBody>
-          <a:bodyPr wrap="square" rtlCol="0">
-            <a:spAutoFit/>
-          </a:bodyPr>
-          <a:lstStyle/>
-          <a:p>
-            <a:r>
-              <a:rPr lang="fr-FR" sz="2000" dirty="0">
-                <a:latin typeface="Times New Roman" panose="02020603050405020304" pitchFamily="18" charset="0"/>
-                <a:cs typeface="Times New Roman" panose="02020603050405020304" pitchFamily="18" charset="0"/>
-              </a:rPr>
-              <a:t>Les deux variables malgré qu’elles contiennent des valeurs identiques sont stockées dans des cases mémoires différentes. En un mot les valeurs sont dupliquées.</a:t>
-            </a:r>
-          </a:p>
-        </p:txBody>
-      </p:sp>
-      <p:sp>
-        <p:nvSpPr>
-          <p:cNvPr id="13" name="ZoneTexte 12">
-            <a:extLst>
-              <a:ext uri="{FF2B5EF4-FFF2-40B4-BE49-F238E27FC236}">
-                <a16:creationId xmlns:a16="http://schemas.microsoft.com/office/drawing/2014/main" id="{CE2100EA-F0D8-4A46-6113-92A7808CB80A}"/>
-              </a:ext>
-            </a:extLst>
-          </p:cNvPr>
-          <p:cNvSpPr txBox="1"/>
-          <p:nvPr/>
-        </p:nvSpPr>
-        <p:spPr>
-          <a:xfrm>
-            <a:off x="500932" y="4934440"/>
-            <a:ext cx="11359108" cy="707886"/>
-          </a:xfrm>
-          <a:prstGeom prst="rect">
-            <a:avLst/>
-          </a:prstGeom>
-          <a:noFill/>
-        </p:spPr>
-        <p:txBody>
-          <a:bodyPr wrap="square" rtlCol="0">
-            <a:spAutoFit/>
-          </a:bodyPr>
-          <a:lstStyle/>
-          <a:p>
-            <a:r>
-              <a:rPr lang="fr-FR" sz="2000" b="1" dirty="0">
-                <a:latin typeface="Times New Roman" panose="02020603050405020304" pitchFamily="18" charset="0"/>
-                <a:cs typeface="Times New Roman" panose="02020603050405020304" pitchFamily="18" charset="0"/>
-              </a:rPr>
-              <a:t>La méthode d’allocation des cases mémoires n’est pas la même pour tous les types de données la méthode est différente pour les types primitifs et les types complexes comme les strings…   </a:t>
-            </a:r>
-          </a:p>
-        </p:txBody>
-      </p:sp>
     </p:spTree>
     <p:extLst>
       <p:ext uri="{BB962C8B-B14F-4D97-AF65-F5344CB8AC3E}">
@@ -13650,7 +13658,7 @@
         </p:nvSpPr>
         <p:spPr>
           <a:xfrm>
-            <a:off x="500932" y="4045540"/>
+            <a:off x="397564" y="4045540"/>
             <a:ext cx="11088982" cy="1631216"/>
           </a:xfrm>
           <a:prstGeom prst="rect">
@@ -14787,7 +14795,7 @@
                 <a:latin typeface="Times New Roman" panose="02020603050405020304" pitchFamily="18" charset="0"/>
                 <a:cs typeface="Times New Roman" panose="02020603050405020304" pitchFamily="18" charset="0"/>
               </a:rPr>
-              <a:t>Un palindrome est un mot qui s’écrit indifféremment de gauche à droite ou de droite à gauche. Peu importe le sens de lecture ou d’écriture on obtient le même mot. Par exemple « SOS » ou « RADAR » est un palindrome par contre « TOTO » n’est pas un palindrome car l’inverse donne « OTOT ».</a:t>
+              <a:t>Un palindrome est un mot qui s’écrit indifféremment de gauche à droite ou de droite à gauche. Peu importe le sens de lecture ou d’écriture on obtient le même mot. Par exemple « SOS » ou « RADAR » est un palindrome cependant « TOTO » n’est pas un palindrome car l’inverse donne « OTOT ».</a:t>
             </a:r>
           </a:p>
           <a:p>
@@ -16297,21 +16305,7 @@
                 <a:latin typeface="Times New Roman" panose="02020603050405020304" pitchFamily="18" charset="0"/>
                 <a:cs typeface="Times New Roman" panose="02020603050405020304" pitchFamily="18" charset="0"/>
               </a:rPr>
-              <a:t>Les chaines de caractères vont nous permettre de stocker et traiter des valeurs alphanumériques (chiffres et </a:t>
-            </a:r>
-            <a:r>
-              <a:rPr lang="fr-FR" sz="2000" dirty="0" err="1">
-                <a:latin typeface="Times New Roman" panose="02020603050405020304" pitchFamily="18" charset="0"/>
-                <a:cs typeface="Times New Roman" panose="02020603050405020304" pitchFamily="18" charset="0"/>
-              </a:rPr>
-              <a:t>et</a:t>
-            </a:r>
-            <a:r>
-              <a:rPr lang="fr-FR" sz="2000" dirty="0">
-                <a:latin typeface="Times New Roman" panose="02020603050405020304" pitchFamily="18" charset="0"/>
-                <a:cs typeface="Times New Roman" panose="02020603050405020304" pitchFamily="18" charset="0"/>
-              </a:rPr>
-              <a:t> lettres) comme « Chat, Chien, Toto1,… ». C’est un type d’objet incontournable en programmation.</a:t>
+              <a:t>Les chaines de caractères vont nous permettre de stocker et traiter des valeurs alphanumériques (chiffres et lettres) comme « Chat, Chien, Toto1,… ». C’est un type d’objet incontournable en programmation.</a:t>
             </a:r>
           </a:p>
         </p:txBody>
@@ -16769,7 +16763,7 @@
                 <a:latin typeface="Times New Roman" panose="02020603050405020304" pitchFamily="18" charset="0"/>
                 <a:cs typeface="Times New Roman" panose="02020603050405020304" pitchFamily="18" charset="0"/>
               </a:rPr>
-              <a:t>Python ne fait pas cette distinction, tout contenu d’une variable entourée par les guillemets simples ou double est considérée comme chaine de caractères.</a:t>
+              <a:t>Python ne fait pas cette distinction, tout contenu d’une variable entourée par des guillemets simples ou double est considérée comme chaine de caractères.</a:t>
             </a:r>
           </a:p>
         </p:txBody>
@@ -18795,8 +18789,8 @@
           </a:prstGeom>
         </p:spPr>
       </p:pic>
-      <mc:AlternateContent xmlns:mc="http://schemas.openxmlformats.org/markup-compatibility/2006" xmlns:a14="http://schemas.microsoft.com/office/drawing/2010/main">
-        <mc:Choice Requires="a14">
+      <mc:AlternateContent xmlns:mc="http://schemas.openxmlformats.org/markup-compatibility/2006">
+        <mc:Choice xmlns:a14="http://schemas.microsoft.com/office/drawing/2010/main" Requires="a14">
           <p:sp>
             <p:nvSpPr>
               <p:cNvPr id="13" name="ZoneTexte 12">
@@ -18830,7 +18824,21 @@
                     <a:latin typeface="Times New Roman" panose="02020603050405020304" pitchFamily="18" charset="0"/>
                     <a:cs typeface="Times New Roman" panose="02020603050405020304" pitchFamily="18" charset="0"/>
                   </a:rPr>
-                  <a:t>L’ordre entre les accolades {} est importante le premier paramètre de format correspond à l’élément </a:t>
+                  <a:t>L’ordre entre les accolades {} est importante le premier paramètre de </a:t>
+                </a:r>
+                <a:r>
+                  <a:rPr lang="fr-FR" sz="2000" i="1" dirty="0">
+                    <a:latin typeface="Times New Roman" panose="02020603050405020304" pitchFamily="18" charset="0"/>
+                    <a:cs typeface="Times New Roman" panose="02020603050405020304" pitchFamily="18" charset="0"/>
+                  </a:rPr>
+                  <a:t>format</a:t>
+                </a:r>
+                <a:r>
+                  <a:rPr lang="fr-FR" sz="2000" dirty="0">
+                    <a:latin typeface="Times New Roman" panose="02020603050405020304" pitchFamily="18" charset="0"/>
+                    <a:cs typeface="Times New Roman" panose="02020603050405020304" pitchFamily="18" charset="0"/>
+                  </a:rPr>
+                  <a:t> correspond à l’élément </a:t>
                 </a:r>
                 <a14:m>
                   <m:oMath xmlns:m="http://schemas.openxmlformats.org/officeDocument/2006/math">
@@ -18854,7 +18862,7 @@
             </p:txBody>
           </p:sp>
         </mc:Choice>
-        <mc:Fallback xmlns="">
+        <mc:Fallback>
           <p:sp>
             <p:nvSpPr>
               <p:cNvPr id="13" name="ZoneTexte 12">
@@ -18943,7 +18951,7 @@
         </p:nvSpPr>
         <p:spPr>
           <a:xfrm>
-            <a:off x="500932" y="4365946"/>
+            <a:off x="500932" y="4430343"/>
             <a:ext cx="10971714" cy="707886"/>
           </a:xfrm>
           <a:prstGeom prst="rect">
@@ -18962,7 +18970,7 @@
                 <a:latin typeface="Times New Roman" panose="02020603050405020304" pitchFamily="18" charset="0"/>
                 <a:cs typeface="Times New Roman" panose="02020603050405020304" pitchFamily="18" charset="0"/>
               </a:rPr>
-              <a:t>On peut ne pas spécifier des valeurs entre les accolades dans ce cas c’est l’ordre de format qui sera pris en compte.</a:t>
+              <a:t>Si on ne spécifie pas des valeurs entre les accolades dans ce cas c’est l’ordre de format qui sera pris en compte.</a:t>
             </a:r>
           </a:p>
         </p:txBody>
@@ -18989,7 +18997,7 @@
         </p:blipFill>
         <p:spPr>
           <a:xfrm>
-            <a:off x="3661883" y="4975829"/>
+            <a:off x="3725505" y="5192204"/>
             <a:ext cx="3558848" cy="936054"/>
           </a:xfrm>
           <a:prstGeom prst="rect">
@@ -19156,7 +19164,7 @@
                 <a:latin typeface="Times New Roman" panose="02020603050405020304" pitchFamily="18" charset="0"/>
                 <a:cs typeface="Times New Roman" panose="02020603050405020304" pitchFamily="18" charset="0"/>
               </a:rPr>
-              <a:t>On peut également nommer les variables que l’on va afficher qui est plus intuitif que leur indice.</a:t>
+              <a:t>On peut également nommer les variables que l’on va afficher ce qui est plus intuitif que leur indice.</a:t>
             </a:r>
           </a:p>
         </p:txBody>
@@ -19291,7 +19299,7 @@
                 <a:latin typeface="Times New Roman" panose="02020603050405020304" pitchFamily="18" charset="0"/>
                 <a:cs typeface="Times New Roman" panose="02020603050405020304" pitchFamily="18" charset="0"/>
               </a:rPr>
-              <a:t>De plus avec la f-string on peut afficher le nom de variable.</a:t>
+              <a:t>De plus avec la f-string on peut afficher le nom de la variable.</a:t>
             </a:r>
           </a:p>
         </p:txBody>
@@ -19318,7 +19326,7 @@
         </p:blipFill>
         <p:spPr>
           <a:xfrm>
-            <a:off x="2701785" y="2857550"/>
+            <a:off x="2701785" y="2786641"/>
             <a:ext cx="5901190" cy="2376647"/>
           </a:xfrm>
           <a:prstGeom prst="rect">
@@ -19373,7 +19381,21 @@
                 <a:latin typeface="Times New Roman" panose="02020603050405020304" pitchFamily="18" charset="0"/>
                 <a:cs typeface="Times New Roman" panose="02020603050405020304" pitchFamily="18" charset="0"/>
               </a:rPr>
-              <a:t>avec la f-string on n'a pas besoin de spécifier ici l’ordre d’insertion des valeurs des variables lors du formatage de la chaine de caractères.</a:t>
+              <a:t>avec la </a:t>
+            </a:r>
+            <a:r>
+              <a:rPr lang="fr-FR" sz="2000" b="1" dirty="0">
+                <a:latin typeface="Times New Roman" panose="02020603050405020304" pitchFamily="18" charset="0"/>
+                <a:cs typeface="Times New Roman" panose="02020603050405020304" pitchFamily="18" charset="0"/>
+              </a:rPr>
+              <a:t>f-string</a:t>
+            </a:r>
+            <a:r>
+              <a:rPr lang="fr-FR" sz="2000" dirty="0">
+                <a:latin typeface="Times New Roman" panose="02020603050405020304" pitchFamily="18" charset="0"/>
+                <a:cs typeface="Times New Roman" panose="02020603050405020304" pitchFamily="18" charset="0"/>
+              </a:rPr>
+              <a:t> on n'a pas besoin de spécifier ici l’ordre d’insertion des valeurs des variables lors du formatage de la chaine de caractères.</a:t>
             </a:r>
           </a:p>
         </p:txBody>

</xml_diff>

<commit_message>
Fix: Correction des erreurs sur le chapitre 8
</commit_message>
<xml_diff>
--- a/source/Chapitre 8 - Les chaines de caractères.pptx
+++ b/source/Chapitre 8 - Les chaines de caractères.pptx
@@ -144,7 +144,7 @@
 <file path=ppt/revisionInfo.xml><?xml version="1.0" encoding="utf-8"?>
 <p1510:revInfo xmlns:a="http://schemas.openxmlformats.org/drawingml/2006/main" xmlns:r="http://schemas.openxmlformats.org/officeDocument/2006/relationships" xmlns:p1510="http://schemas.microsoft.com/office/powerpoint/2015/10/main">
   <p1510:revLst>
-    <p1510:client id="{0EB52ED8-BDDA-42B4-90C4-1B322ACD0F02}" v="2790" dt="2024-03-17T12:33:50.960"/>
+    <p1510:client id="{0EB52ED8-BDDA-42B4-90C4-1B322ACD0F02}" v="2833" dt="2024-03-17T15:59:04.580"/>
   </p1510:revLst>
 </p1510:revInfo>
 </file>
@@ -154,7 +154,7 @@
   <pc:docChgLst>
     <pc:chgData name="Ismaël Tuo" userId="fca7baf0e513a1e6" providerId="LiveId" clId="{0EB52ED8-BDDA-42B4-90C4-1B322ACD0F02}"/>
     <pc:docChg chg="undo custSel addSld delSld modSld sldOrd">
-      <pc:chgData name="Ismaël Tuo" userId="fca7baf0e513a1e6" providerId="LiveId" clId="{0EB52ED8-BDDA-42B4-90C4-1B322ACD0F02}" dt="2024-03-17T12:47:21.415" v="23753" actId="33524"/>
+      <pc:chgData name="Ismaël Tuo" userId="fca7baf0e513a1e6" providerId="LiveId" clId="{0EB52ED8-BDDA-42B4-90C4-1B322ACD0F02}" dt="2024-03-17T15:59:12.407" v="23811" actId="20577"/>
       <pc:docMkLst>
         <pc:docMk/>
       </pc:docMkLst>
@@ -1384,7 +1384,7 @@
         </pc:picChg>
       </pc:sldChg>
       <pc:sldChg chg="addSp modSp add mod">
-        <pc:chgData name="Ismaël Tuo" userId="fca7baf0e513a1e6" providerId="LiveId" clId="{0EB52ED8-BDDA-42B4-90C4-1B322ACD0F02}" dt="2024-03-17T12:34:48.496" v="23745" actId="20577"/>
+        <pc:chgData name="Ismaël Tuo" userId="fca7baf0e513a1e6" providerId="LiveId" clId="{0EB52ED8-BDDA-42B4-90C4-1B322ACD0F02}" dt="2024-03-17T14:24:00.685" v="23754" actId="1076"/>
         <pc:sldMkLst>
           <pc:docMk/>
           <pc:sldMk cId="4166790313" sldId="298"/>
@@ -1406,7 +1406,7 @@
           </ac:spMkLst>
         </pc:spChg>
         <pc:spChg chg="add mod">
-          <ac:chgData name="Ismaël Tuo" userId="fca7baf0e513a1e6" providerId="LiveId" clId="{0EB52ED8-BDDA-42B4-90C4-1B322ACD0F02}" dt="2024-03-17T12:34:48.496" v="23745" actId="20577"/>
+          <ac:chgData name="Ismaël Tuo" userId="fca7baf0e513a1e6" providerId="LiveId" clId="{0EB52ED8-BDDA-42B4-90C4-1B322ACD0F02}" dt="2024-03-17T14:24:00.685" v="23754" actId="1076"/>
           <ac:spMkLst>
             <pc:docMk/>
             <pc:sldMk cId="4166790313" sldId="298"/>
@@ -1597,7 +1597,7 @@
         </pc:picChg>
       </pc:sldChg>
       <pc:sldChg chg="addSp modSp add mod">
-        <pc:chgData name="Ismaël Tuo" userId="fca7baf0e513a1e6" providerId="LiveId" clId="{0EB52ED8-BDDA-42B4-90C4-1B322ACD0F02}" dt="2024-02-18T17:32:58.737" v="15447" actId="1076"/>
+        <pc:chgData name="Ismaël Tuo" userId="fca7baf0e513a1e6" providerId="LiveId" clId="{0EB52ED8-BDDA-42B4-90C4-1B322ACD0F02}" dt="2024-03-17T15:59:12.407" v="23811" actId="20577"/>
         <pc:sldMkLst>
           <pc:docMk/>
           <pc:sldMk cId="1118991029" sldId="301"/>
@@ -1611,7 +1611,7 @@
           </ac:spMkLst>
         </pc:spChg>
         <pc:spChg chg="add mod">
-          <ac:chgData name="Ismaël Tuo" userId="fca7baf0e513a1e6" providerId="LiveId" clId="{0EB52ED8-BDDA-42B4-90C4-1B322ACD0F02}" dt="2024-02-18T17:32:58.737" v="15447" actId="1076"/>
+          <ac:chgData name="Ismaël Tuo" userId="fca7baf0e513a1e6" providerId="LiveId" clId="{0EB52ED8-BDDA-42B4-90C4-1B322ACD0F02}" dt="2024-03-17T15:59:12.407" v="23811" actId="20577"/>
           <ac:spMkLst>
             <pc:docMk/>
             <pc:sldMk cId="1118991029" sldId="301"/>
@@ -1619,7 +1619,7 @@
           </ac:spMkLst>
         </pc:spChg>
         <pc:spChg chg="add mod">
-          <ac:chgData name="Ismaël Tuo" userId="fca7baf0e513a1e6" providerId="LiveId" clId="{0EB52ED8-BDDA-42B4-90C4-1B322ACD0F02}" dt="2024-02-18T17:32:56.101" v="15446" actId="1076"/>
+          <ac:chgData name="Ismaël Tuo" userId="fca7baf0e513a1e6" providerId="LiveId" clId="{0EB52ED8-BDDA-42B4-90C4-1B322ACD0F02}" dt="2024-03-17T15:59:04.580" v="23797" actId="20577"/>
           <ac:spMkLst>
             <pc:docMk/>
             <pc:sldMk cId="1118991029" sldId="301"/>
@@ -9439,8 +9439,8 @@
           </a:fontRef>
         </p:style>
       </p:cxnSp>
-      <mc:AlternateContent xmlns:mc="http://schemas.openxmlformats.org/markup-compatibility/2006">
-        <mc:Choice xmlns:a14="http://schemas.microsoft.com/office/drawing/2010/main" Requires="a14">
+      <mc:AlternateContent xmlns:mc="http://schemas.openxmlformats.org/markup-compatibility/2006" xmlns:a14="http://schemas.microsoft.com/office/drawing/2010/main">
+        <mc:Choice Requires="a14">
           <p:sp>
             <p:nvSpPr>
               <p:cNvPr id="2" name="ZoneTexte 1">
@@ -9498,7 +9498,7 @@
             </p:txBody>
           </p:sp>
         </mc:Choice>
-        <mc:Fallback>
+        <mc:Fallback xmlns="">
           <p:sp>
             <p:nvSpPr>
               <p:cNvPr id="2" name="ZoneTexte 1">
@@ -9855,8 +9855,8 @@
           </a:fontRef>
         </p:style>
       </p:cxnSp>
-      <mc:AlternateContent xmlns:mc="http://schemas.openxmlformats.org/markup-compatibility/2006">
-        <mc:Choice xmlns:a14="http://schemas.microsoft.com/office/drawing/2010/main" Requires="a14">
+      <mc:AlternateContent xmlns:mc="http://schemas.openxmlformats.org/markup-compatibility/2006" xmlns:a14="http://schemas.microsoft.com/office/drawing/2010/main">
+        <mc:Choice Requires="a14">
           <p:sp>
             <p:nvSpPr>
               <p:cNvPr id="7" name="ZoneTexte 6">
@@ -10078,7 +10078,7 @@
             </p:txBody>
           </p:sp>
         </mc:Choice>
-        <mc:Fallback>
+        <mc:Fallback xmlns="">
           <p:sp>
             <p:nvSpPr>
               <p:cNvPr id="7" name="ZoneTexte 6">
@@ -10543,7 +10543,7 @@
         </p:nvSpPr>
         <p:spPr>
           <a:xfrm>
-            <a:off x="500932" y="2333365"/>
+            <a:off x="397564" y="2319874"/>
             <a:ext cx="11359108" cy="707886"/>
           </a:xfrm>
           <a:prstGeom prst="rect">
@@ -11941,7 +11941,21 @@
                 <a:latin typeface="Times New Roman" panose="02020603050405020304" pitchFamily="18" charset="0"/>
                 <a:cs typeface="Times New Roman" panose="02020603050405020304" pitchFamily="18" charset="0"/>
               </a:rPr>
-              <a:t>font une comparaison des cases mémoire pas des valeurs des variables. Ces méthodes vérifient que deux variables sont stockées dans la même case mémoire. Pour comparer les valeurs on utilisera </a:t>
+              <a:t>font une comparaison des cases mémoire pas des valeurs des variables. </a:t>
+            </a:r>
+            <a:r>
+              <a:rPr lang="fr-FR" sz="2000">
+                <a:latin typeface="Times New Roman" panose="02020603050405020304" pitchFamily="18" charset="0"/>
+                <a:cs typeface="Times New Roman" panose="02020603050405020304" pitchFamily="18" charset="0"/>
+              </a:rPr>
+              <a:t>Ces mot clés </a:t>
+            </a:r>
+            <a:r>
+              <a:rPr lang="fr-FR" sz="2000" dirty="0">
+                <a:latin typeface="Times New Roman" panose="02020603050405020304" pitchFamily="18" charset="0"/>
+                <a:cs typeface="Times New Roman" panose="02020603050405020304" pitchFamily="18" charset="0"/>
+              </a:rPr>
+              <a:t>vérifient que deux variables sont stockées dans la même case mémoire. Pour comparer les valeurs on utilisera </a:t>
             </a:r>
             <a:r>
               <a:rPr lang="fr-FR" sz="2000" b="1" dirty="0">
@@ -11960,8 +11974,8 @@
           </a:p>
         </p:txBody>
       </p:sp>
-      <mc:AlternateContent xmlns:mc="http://schemas.openxmlformats.org/markup-compatibility/2006" xmlns:a14="http://schemas.microsoft.com/office/drawing/2010/main">
-        <mc:Choice Requires="a14">
+      <mc:AlternateContent xmlns:mc="http://schemas.openxmlformats.org/markup-compatibility/2006">
+        <mc:Choice xmlns:a14="http://schemas.microsoft.com/office/drawing/2010/main" Requires="a14">
           <p:sp>
             <p:nvSpPr>
               <p:cNvPr id="8" name="ZoneTexte 7">
@@ -12087,7 +12101,7 @@
                 <a14:m>
                   <m:oMath xmlns:m="http://schemas.openxmlformats.org/officeDocument/2006/math">
                     <m:r>
-                      <a:rPr lang="fr-FR" sz="2000" b="0" i="1" smtClean="0">
+                      <a:rPr lang="fr-FR" sz="2000" b="1" i="1" smtClean="0">
                         <a:latin typeface="Cambria Math" panose="02040503050406030204" pitchFamily="18" charset="0"/>
                         <a:cs typeface="Times New Roman" panose="02020603050405020304" pitchFamily="18" charset="0"/>
                       </a:rPr>
@@ -12121,7 +12135,7 @@
                     <a:latin typeface="Times New Roman" panose="02020603050405020304" pitchFamily="18" charset="0"/>
                     <a:cs typeface="Times New Roman" panose="02020603050405020304" pitchFamily="18" charset="0"/>
                   </a:rPr>
-                  <a:t>pour les variables de types simples car ces valeurs sont mutables les identifiants de case mémoire change quand les valeurs sont identiques plusieurs variables avec la même valeur auront la même case mémoire.</a:t>
+                  <a:t>pour les variables de types simples car ces valeurs sont mutables, les identifiants de case mémoire change quand les valeurs sont identiques. Plusieurs variables avec la même valeur auront la même case mémoire.</a:t>
                 </a:r>
               </a:p>
               <a:p>
@@ -12208,7 +12222,7 @@
                     <a:latin typeface="Times New Roman" panose="02020603050405020304" pitchFamily="18" charset="0"/>
                     <a:cs typeface="Times New Roman" panose="02020603050405020304" pitchFamily="18" charset="0"/>
                   </a:rPr>
-                  <a:t>est différent de </a:t>
+                  <a:t>sont différents de </a:t>
                 </a:r>
                 <a14:m>
                   <m:oMath xmlns:m="http://schemas.openxmlformats.org/officeDocument/2006/math">
@@ -12297,7 +12311,7 @@
                     <a:latin typeface="Times New Roman" panose="02020603050405020304" pitchFamily="18" charset="0"/>
                     <a:cs typeface="Times New Roman" panose="02020603050405020304" pitchFamily="18" charset="0"/>
                   </a:rPr>
-                  <a:t>pour vérifier la différence entre les valeurs des variables de type chaine.</a:t>
+                  <a:t>pour vérifier la différence entre les valeurs.</a:t>
                 </a:r>
                 <a:endParaRPr lang="fr-FR" sz="2000" b="1" dirty="0">
                   <a:latin typeface="Times New Roman" panose="02020603050405020304" pitchFamily="18" charset="0"/>
@@ -12307,7 +12321,7 @@
             </p:txBody>
           </p:sp>
         </mc:Choice>
-        <mc:Fallback xmlns="">
+        <mc:Fallback>
           <p:sp>
             <p:nvSpPr>
               <p:cNvPr id="8" name="ZoneTexte 7">
@@ -12333,7 +12347,7 @@
               <a:blipFill>
                 <a:blip r:embed="rId3"/>
                 <a:stretch>
-                  <a:fillRect l="-545" t="-1432" b="-3341"/>
+                  <a:fillRect l="-545" t="-1432" r="-491" b="-3341"/>
                 </a:stretch>
               </a:blipFill>
             </p:spPr>
@@ -18789,8 +18803,8 @@
           </a:prstGeom>
         </p:spPr>
       </p:pic>
-      <mc:AlternateContent xmlns:mc="http://schemas.openxmlformats.org/markup-compatibility/2006">
-        <mc:Choice xmlns:a14="http://schemas.microsoft.com/office/drawing/2010/main" Requires="a14">
+      <mc:AlternateContent xmlns:mc="http://schemas.openxmlformats.org/markup-compatibility/2006" xmlns:a14="http://schemas.microsoft.com/office/drawing/2010/main">
+        <mc:Choice Requires="a14">
           <p:sp>
             <p:nvSpPr>
               <p:cNvPr id="13" name="ZoneTexte 12">
@@ -18862,7 +18876,7 @@
             </p:txBody>
           </p:sp>
         </mc:Choice>
-        <mc:Fallback>
+        <mc:Fallback xmlns="">
           <p:sp>
             <p:nvSpPr>
               <p:cNvPr id="13" name="ZoneTexte 12">

</xml_diff>